<commit_message>
Updated Figs 4 and 5
</commit_message>
<xml_diff>
--- a/slides/figures_191206.pptx
+++ b/slides/figures_191206.pptx
@@ -5,7 +5,7 @@
     <p:sldMasterId id="2147483684" r:id="rId1"/>
   </p:sldMasterIdLst>
   <p:notesMasterIdLst>
-    <p:notesMasterId r:id="rId11"/>
+    <p:notesMasterId r:id="rId12"/>
   </p:notesMasterIdLst>
   <p:sldIdLst>
     <p:sldId id="256" r:id="rId2"/>
@@ -17,6 +17,7 @@
     <p:sldId id="258" r:id="rId8"/>
     <p:sldId id="259" r:id="rId9"/>
     <p:sldId id="260" r:id="rId10"/>
+    <p:sldId id="265" r:id="rId11"/>
   </p:sldIdLst>
   <p:sldSz cx="7918450" cy="6483350"/>
   <p:notesSz cx="6858000" cy="9144000"/>
@@ -205,7 +206,7 @@
           <a:p>
             <a:fld id="{5E7D9203-8D15-1F45-AFEF-29CE894B8122}" type="datetimeFigureOut">
               <a:rPr lang="en-US" smtClean="0"/>
-              <a:t>12/13/19</a:t>
+              <a:t>12/14/19</a:t>
             </a:fld>
             <a:endParaRPr lang="en-US"/>
           </a:p>
@@ -564,6 +565,98 @@
 </p:notes>
 </file>
 
+<file path=ppt/notesSlides/notesSlide10.xml><?xml version="1.0" encoding="utf-8"?>
+<p:notes xmlns:a="http://schemas.openxmlformats.org/drawingml/2006/main" xmlns:r="http://schemas.openxmlformats.org/officeDocument/2006/relationships" xmlns:p="http://schemas.openxmlformats.org/presentationml/2006/main">
+  <p:cSld>
+    <p:spTree>
+      <p:nvGrpSpPr>
+        <p:cNvPr id="1" name=""/>
+        <p:cNvGrpSpPr/>
+        <p:nvPr/>
+      </p:nvGrpSpPr>
+      <p:grpSpPr>
+        <a:xfrm>
+          <a:off x="0" y="0"/>
+          <a:ext cx="0" cy="0"/>
+          <a:chOff x="0" y="0"/>
+          <a:chExt cx="0" cy="0"/>
+        </a:xfrm>
+      </p:grpSpPr>
+      <p:sp>
+        <p:nvSpPr>
+          <p:cNvPr id="2" name="Slide Image Placeholder 1"/>
+          <p:cNvSpPr>
+            <a:spLocks noGrp="1" noRot="1" noChangeAspect="1"/>
+          </p:cNvSpPr>
+          <p:nvPr>
+            <p:ph type="sldImg"/>
+          </p:nvPr>
+        </p:nvSpPr>
+        <p:spPr>
+          <a:xfrm>
+            <a:off x="1544638" y="1143000"/>
+            <a:ext cx="3768725" cy="3086100"/>
+          </a:xfrm>
+        </p:spPr>
+      </p:sp>
+      <p:sp>
+        <p:nvSpPr>
+          <p:cNvPr id="3" name="Notes Placeholder 2"/>
+          <p:cNvSpPr>
+            <a:spLocks noGrp="1"/>
+          </p:cNvSpPr>
+          <p:nvPr>
+            <p:ph type="body" idx="1"/>
+          </p:nvPr>
+        </p:nvSpPr>
+        <p:spPr/>
+        <p:txBody>
+          <a:bodyPr/>
+          <a:lstStyle/>
+          <a:p>
+            <a:r>
+              <a:rPr lang="en-US" dirty="0"/>
+              <a:t>12/06/19 Fig. S4</a:t>
+            </a:r>
+          </a:p>
+        </p:txBody>
+      </p:sp>
+      <p:sp>
+        <p:nvSpPr>
+          <p:cNvPr id="4" name="Slide Number Placeholder 3"/>
+          <p:cNvSpPr>
+            <a:spLocks noGrp="1"/>
+          </p:cNvSpPr>
+          <p:nvPr>
+            <p:ph type="sldNum" sz="quarter" idx="5"/>
+          </p:nvPr>
+        </p:nvSpPr>
+        <p:spPr/>
+        <p:txBody>
+          <a:bodyPr/>
+          <a:lstStyle/>
+          <a:p>
+            <a:fld id="{A697AF77-229E-5D4A-87D0-A949D969F47C}" type="slidenum">
+              <a:rPr lang="en-US" smtClean="0"/>
+              <a:t>10</a:t>
+            </a:fld>
+            <a:endParaRPr lang="en-US"/>
+          </a:p>
+        </p:txBody>
+      </p:sp>
+    </p:spTree>
+    <p:extLst>
+      <p:ext uri="{BB962C8B-B14F-4D97-AF65-F5344CB8AC3E}">
+        <p14:creationId xmlns:p14="http://schemas.microsoft.com/office/powerpoint/2010/main" val="4193511516"/>
+      </p:ext>
+    </p:extLst>
+  </p:cSld>
+  <p:clrMapOvr>
+    <a:masterClrMapping/>
+  </p:clrMapOvr>
+</p:notes>
+</file>
+
 <file path=ppt/notesSlides/notesSlide2.xml><?xml version="1.0" encoding="utf-8"?>
 <p:notes xmlns:a="http://schemas.openxmlformats.org/drawingml/2006/main" xmlns:r="http://schemas.openxmlformats.org/officeDocument/2006/relationships" xmlns:p="http://schemas.openxmlformats.org/presentationml/2006/main">
   <p:cSld>
@@ -1431,7 +1524,7 @@
           <a:p>
             <a:fld id="{AAC8E564-4E2A-8441-940F-9FCAA67208AC}" type="datetimeFigureOut">
               <a:rPr lang="en-US" smtClean="0"/>
-              <a:t>12/13/19</a:t>
+              <a:t>12/14/19</a:t>
             </a:fld>
             <a:endParaRPr lang="en-US"/>
           </a:p>
@@ -1601,7 +1694,7 @@
           <a:p>
             <a:fld id="{AAC8E564-4E2A-8441-940F-9FCAA67208AC}" type="datetimeFigureOut">
               <a:rPr lang="en-US" smtClean="0"/>
-              <a:t>12/13/19</a:t>
+              <a:t>12/14/19</a:t>
             </a:fld>
             <a:endParaRPr lang="en-US"/>
           </a:p>
@@ -1781,7 +1874,7 @@
           <a:p>
             <a:fld id="{AAC8E564-4E2A-8441-940F-9FCAA67208AC}" type="datetimeFigureOut">
               <a:rPr lang="en-US" smtClean="0"/>
-              <a:t>12/13/19</a:t>
+              <a:t>12/14/19</a:t>
             </a:fld>
             <a:endParaRPr lang="en-US"/>
           </a:p>
@@ -1951,7 +2044,7 @@
           <a:p>
             <a:fld id="{AAC8E564-4E2A-8441-940F-9FCAA67208AC}" type="datetimeFigureOut">
               <a:rPr lang="en-US" smtClean="0"/>
-              <a:t>12/13/19</a:t>
+              <a:t>12/14/19</a:t>
             </a:fld>
             <a:endParaRPr lang="en-US"/>
           </a:p>
@@ -2195,7 +2288,7 @@
           <a:p>
             <a:fld id="{AAC8E564-4E2A-8441-940F-9FCAA67208AC}" type="datetimeFigureOut">
               <a:rPr lang="en-US" smtClean="0"/>
-              <a:t>12/13/19</a:t>
+              <a:t>12/14/19</a:t>
             </a:fld>
             <a:endParaRPr lang="en-US"/>
           </a:p>
@@ -2427,7 +2520,7 @@
           <a:p>
             <a:fld id="{AAC8E564-4E2A-8441-940F-9FCAA67208AC}" type="datetimeFigureOut">
               <a:rPr lang="en-US" smtClean="0"/>
-              <a:t>12/13/19</a:t>
+              <a:t>12/14/19</a:t>
             </a:fld>
             <a:endParaRPr lang="en-US"/>
           </a:p>
@@ -2794,7 +2887,7 @@
           <a:p>
             <a:fld id="{AAC8E564-4E2A-8441-940F-9FCAA67208AC}" type="datetimeFigureOut">
               <a:rPr lang="en-US" smtClean="0"/>
-              <a:t>12/13/19</a:t>
+              <a:t>12/14/19</a:t>
             </a:fld>
             <a:endParaRPr lang="en-US"/>
           </a:p>
@@ -2912,7 +3005,7 @@
           <a:p>
             <a:fld id="{AAC8E564-4E2A-8441-940F-9FCAA67208AC}" type="datetimeFigureOut">
               <a:rPr lang="en-US" smtClean="0"/>
-              <a:t>12/13/19</a:t>
+              <a:t>12/14/19</a:t>
             </a:fld>
             <a:endParaRPr lang="en-US"/>
           </a:p>
@@ -3007,7 +3100,7 @@
           <a:p>
             <a:fld id="{AAC8E564-4E2A-8441-940F-9FCAA67208AC}" type="datetimeFigureOut">
               <a:rPr lang="en-US" smtClean="0"/>
-              <a:t>12/13/19</a:t>
+              <a:t>12/14/19</a:t>
             </a:fld>
             <a:endParaRPr lang="en-US"/>
           </a:p>
@@ -3284,7 +3377,7 @@
           <a:p>
             <a:fld id="{AAC8E564-4E2A-8441-940F-9FCAA67208AC}" type="datetimeFigureOut">
               <a:rPr lang="en-US" smtClean="0"/>
-              <a:t>12/13/19</a:t>
+              <a:t>12/14/19</a:t>
             </a:fld>
             <a:endParaRPr lang="en-US"/>
           </a:p>
@@ -3541,7 +3634,7 @@
           <a:p>
             <a:fld id="{AAC8E564-4E2A-8441-940F-9FCAA67208AC}" type="datetimeFigureOut">
               <a:rPr lang="en-US" smtClean="0"/>
-              <a:t>12/13/19</a:t>
+              <a:t>12/14/19</a:t>
             </a:fld>
             <a:endParaRPr lang="en-US"/>
           </a:p>
@@ -3754,7 +3847,7 @@
           <a:p>
             <a:fld id="{AAC8E564-4E2A-8441-940F-9FCAA67208AC}" type="datetimeFigureOut">
               <a:rPr lang="en-US" smtClean="0"/>
-              <a:t>12/13/19</a:t>
+              <a:t>12/14/19</a:t>
             </a:fld>
             <a:endParaRPr lang="en-US"/>
           </a:p>
@@ -4373,6 +4466,1041 @@
     <p:extLst>
       <p:ext uri="{BB962C8B-B14F-4D97-AF65-F5344CB8AC3E}">
         <p14:creationId xmlns:p14="http://schemas.microsoft.com/office/powerpoint/2010/main" val="3376327410"/>
+      </p:ext>
+    </p:extLst>
+  </p:cSld>
+  <p:clrMapOvr>
+    <a:masterClrMapping/>
+  </p:clrMapOvr>
+</p:sld>
+</file>
+
+<file path=ppt/slides/slide10.xml><?xml version="1.0" encoding="utf-8"?>
+<p:sld xmlns:a="http://schemas.openxmlformats.org/drawingml/2006/main" xmlns:r="http://schemas.openxmlformats.org/officeDocument/2006/relationships" xmlns:p="http://schemas.openxmlformats.org/presentationml/2006/main">
+  <p:cSld>
+    <p:spTree>
+      <p:nvGrpSpPr>
+        <p:cNvPr id="1" name=""/>
+        <p:cNvGrpSpPr/>
+        <p:nvPr/>
+      </p:nvGrpSpPr>
+      <p:grpSpPr>
+        <a:xfrm>
+          <a:off x="0" y="0"/>
+          <a:ext cx="0" cy="0"/>
+          <a:chOff x="0" y="0"/>
+          <a:chExt cx="0" cy="0"/>
+        </a:xfrm>
+      </p:grpSpPr>
+      <p:grpSp>
+        <p:nvGrpSpPr>
+          <p:cNvPr id="31" name="Group 30">
+            <a:extLst>
+              <a:ext uri="{FF2B5EF4-FFF2-40B4-BE49-F238E27FC236}">
+                <a16:creationId xmlns:a16="http://schemas.microsoft.com/office/drawing/2014/main" id="{47C214A7-314B-DA4B-A577-30EEC875FB69}"/>
+              </a:ext>
+            </a:extLst>
+          </p:cNvPr>
+          <p:cNvGrpSpPr/>
+          <p:nvPr/>
+        </p:nvGrpSpPr>
+        <p:grpSpPr>
+          <a:xfrm>
+            <a:off x="6981783" y="2392783"/>
+            <a:ext cx="905467" cy="1258441"/>
+            <a:chOff x="6972084" y="2105534"/>
+            <a:chExt cx="905467" cy="1258441"/>
+          </a:xfrm>
+        </p:grpSpPr>
+        <p:pic>
+          <p:nvPicPr>
+            <p:cNvPr id="29" name="Picture 28">
+              <a:extLst>
+                <a:ext uri="{FF2B5EF4-FFF2-40B4-BE49-F238E27FC236}">
+                  <a16:creationId xmlns:a16="http://schemas.microsoft.com/office/drawing/2014/main" id="{47A2DE75-0F65-AD45-9C88-01A2B4AC7DE0}"/>
+                </a:ext>
+              </a:extLst>
+            </p:cNvPr>
+            <p:cNvPicPr>
+              <a:picLocks noChangeAspect="1"/>
+            </p:cNvPicPr>
+            <p:nvPr/>
+          </p:nvPicPr>
+          <p:blipFill rotWithShape="1">
+            <a:blip r:embed="rId3"/>
+            <a:srcRect l="83340" t="21017" r="3277" b="36380"/>
+            <a:stretch/>
+          </p:blipFill>
+          <p:spPr>
+            <a:xfrm>
+              <a:off x="7111404" y="2105534"/>
+              <a:ext cx="716620" cy="1136141"/>
+            </a:xfrm>
+            <a:prstGeom prst="rect">
+              <a:avLst/>
+            </a:prstGeom>
+          </p:spPr>
+        </p:pic>
+        <p:sp>
+          <p:nvSpPr>
+            <p:cNvPr id="30" name="TextBox 29">
+              <a:extLst>
+                <a:ext uri="{FF2B5EF4-FFF2-40B4-BE49-F238E27FC236}">
+                  <a16:creationId xmlns:a16="http://schemas.microsoft.com/office/drawing/2014/main" id="{7AC3745E-4836-B44F-8769-8C29FFAF708D}"/>
+                </a:ext>
+              </a:extLst>
+            </p:cNvPr>
+            <p:cNvSpPr txBox="1"/>
+            <p:nvPr/>
+          </p:nvSpPr>
+          <p:spPr>
+            <a:xfrm>
+              <a:off x="6972084" y="2994643"/>
+              <a:ext cx="905467" cy="369332"/>
+            </a:xfrm>
+            <a:prstGeom prst="rect">
+              <a:avLst/>
+            </a:prstGeom>
+            <a:noFill/>
+          </p:spPr>
+          <p:txBody>
+            <a:bodyPr wrap="square" rtlCol="0">
+              <a:spAutoFit/>
+            </a:bodyPr>
+            <a:lstStyle/>
+            <a:p>
+              <a:pPr algn="r"/>
+              <a:r>
+                <a:rPr lang="en-US" sz="1000" dirty="0">
+                  <a:solidFill>
+                    <a:schemeClr val="bg1">
+                      <a:lumMod val="50000"/>
+                    </a:schemeClr>
+                  </a:solidFill>
+                  <a:latin typeface="Helvetica Neue" panose="02000503000000020004" pitchFamily="2" charset="0"/>
+                  <a:ea typeface="Helvetica Neue" panose="02000503000000020004" pitchFamily="2" charset="0"/>
+                  <a:cs typeface="Helvetica Neue" panose="02000503000000020004" pitchFamily="2" charset="0"/>
+                </a:rPr>
+                <a:t>---</a:t>
+              </a:r>
+              <a:r>
+                <a:rPr lang="en-US" sz="1000" dirty="0">
+                  <a:latin typeface="Helvetica Neue" panose="02000503000000020004" pitchFamily="2" charset="0"/>
+                  <a:ea typeface="Helvetica Neue" panose="02000503000000020004" pitchFamily="2" charset="0"/>
+                  <a:cs typeface="Helvetica Neue" panose="02000503000000020004" pitchFamily="2" charset="0"/>
+                </a:rPr>
+                <a:t>  </a:t>
+              </a:r>
+              <a:r>
+                <a:rPr lang="en-US" sz="500" dirty="0">
+                  <a:latin typeface="Helvetica Neue" panose="02000503000000020004" pitchFamily="2" charset="0"/>
+                  <a:ea typeface="Helvetica Neue" panose="02000503000000020004" pitchFamily="2" charset="0"/>
+                  <a:cs typeface="Helvetica Neue" panose="02000503000000020004" pitchFamily="2" charset="0"/>
+                </a:rPr>
+                <a:t> </a:t>
+              </a:r>
+              <a:r>
+                <a:rPr lang="en-US" sz="1000" dirty="0">
+                  <a:latin typeface="Helvetica Neue" panose="02000503000000020004" pitchFamily="2" charset="0"/>
+                  <a:ea typeface="Helvetica Neue" panose="02000503000000020004" pitchFamily="2" charset="0"/>
+                  <a:cs typeface="Helvetica Neue" panose="02000503000000020004" pitchFamily="2" charset="0"/>
+                </a:rPr>
+                <a:t>Null H</a:t>
+              </a:r>
+              <a:r>
+                <a:rPr lang="en-US" sz="1000" baseline="-25000" dirty="0">
+                  <a:latin typeface="Helvetica Neue" panose="02000503000000020004" pitchFamily="2" charset="0"/>
+                  <a:ea typeface="Helvetica Neue" panose="02000503000000020004" pitchFamily="2" charset="0"/>
+                  <a:cs typeface="Helvetica Neue" panose="02000503000000020004" pitchFamily="2" charset="0"/>
+                </a:rPr>
+                <a:t>0</a:t>
+              </a:r>
+              <a:endParaRPr lang="en-US" sz="1000" dirty="0">
+                <a:latin typeface="Helvetica Neue" panose="02000503000000020004" pitchFamily="2" charset="0"/>
+                <a:ea typeface="Helvetica Neue" panose="02000503000000020004" pitchFamily="2" charset="0"/>
+                <a:cs typeface="Helvetica Neue" panose="02000503000000020004" pitchFamily="2" charset="0"/>
+              </a:endParaRPr>
+            </a:p>
+            <a:p>
+              <a:pPr algn="r"/>
+              <a:r>
+                <a:rPr lang="en-US" sz="800" dirty="0">
+                  <a:latin typeface="Helvetica Neue" panose="02000503000000020004" pitchFamily="2" charset="0"/>
+                  <a:ea typeface="Helvetica Neue" panose="02000503000000020004" pitchFamily="2" charset="0"/>
+                  <a:cs typeface="Helvetica Neue" panose="02000503000000020004" pitchFamily="2" charset="0"/>
+                </a:rPr>
+                <a:t>(linear mixing)</a:t>
+              </a:r>
+              <a:endParaRPr lang="en-US" sz="800" baseline="-25000" dirty="0">
+                <a:latin typeface="Helvetica Neue" panose="02000503000000020004" pitchFamily="2" charset="0"/>
+                <a:ea typeface="Helvetica Neue" panose="02000503000000020004" pitchFamily="2" charset="0"/>
+                <a:cs typeface="Helvetica Neue" panose="02000503000000020004" pitchFamily="2" charset="0"/>
+              </a:endParaRPr>
+            </a:p>
+          </p:txBody>
+        </p:sp>
+      </p:grpSp>
+      <p:grpSp>
+        <p:nvGrpSpPr>
+          <p:cNvPr id="64" name="Group 63">
+            <a:extLst>
+              <a:ext uri="{FF2B5EF4-FFF2-40B4-BE49-F238E27FC236}">
+                <a16:creationId xmlns:a16="http://schemas.microsoft.com/office/drawing/2014/main" id="{2307CD96-C70A-1047-A24B-0EF7304A3210}"/>
+              </a:ext>
+            </a:extLst>
+          </p:cNvPr>
+          <p:cNvGrpSpPr/>
+          <p:nvPr/>
+        </p:nvGrpSpPr>
+        <p:grpSpPr>
+          <a:xfrm>
+            <a:off x="-59571" y="1197522"/>
+            <a:ext cx="7180674" cy="4088306"/>
+            <a:chOff x="-59571" y="1257310"/>
+            <a:chExt cx="7180674" cy="4088306"/>
+          </a:xfrm>
+        </p:grpSpPr>
+        <p:pic>
+          <p:nvPicPr>
+            <p:cNvPr id="13" name="Picture 12">
+              <a:extLst>
+                <a:ext uri="{FF2B5EF4-FFF2-40B4-BE49-F238E27FC236}">
+                  <a16:creationId xmlns:a16="http://schemas.microsoft.com/office/drawing/2014/main" id="{DAB10650-9262-A442-818E-C32D8386224F}"/>
+                </a:ext>
+              </a:extLst>
+            </p:cNvPr>
+            <p:cNvPicPr>
+              <a:picLocks noChangeAspect="1"/>
+            </p:cNvPicPr>
+            <p:nvPr/>
+          </p:nvPicPr>
+          <p:blipFill>
+            <a:blip r:embed="rId4"/>
+            <a:stretch>
+              <a:fillRect/>
+            </a:stretch>
+          </p:blipFill>
+          <p:spPr>
+            <a:xfrm>
+              <a:off x="3609807" y="3596852"/>
+              <a:ext cx="3511296" cy="1748763"/>
+            </a:xfrm>
+            <a:prstGeom prst="rect">
+              <a:avLst/>
+            </a:prstGeom>
+          </p:spPr>
+        </p:pic>
+        <p:sp>
+          <p:nvSpPr>
+            <p:cNvPr id="18" name="TextBox 17">
+              <a:extLst>
+                <a:ext uri="{FF2B5EF4-FFF2-40B4-BE49-F238E27FC236}">
+                  <a16:creationId xmlns:a16="http://schemas.microsoft.com/office/drawing/2014/main" id="{46BBEC22-8FD3-4646-AE1A-C6C1C5D5E1E6}"/>
+                </a:ext>
+              </a:extLst>
+            </p:cNvPr>
+            <p:cNvSpPr txBox="1"/>
+            <p:nvPr/>
+          </p:nvSpPr>
+          <p:spPr>
+            <a:xfrm>
+              <a:off x="3478615" y="1257310"/>
+              <a:ext cx="532050" cy="311217"/>
+            </a:xfrm>
+            <a:prstGeom prst="rect">
+              <a:avLst/>
+            </a:prstGeom>
+            <a:noFill/>
+          </p:spPr>
+          <p:txBody>
+            <a:bodyPr wrap="square" rtlCol="0">
+              <a:spAutoFit/>
+            </a:bodyPr>
+            <a:lstStyle/>
+            <a:p>
+              <a:pPr algn="ctr"/>
+              <a:r>
+                <a:rPr lang="en-US" sz="1600" b="1" dirty="0">
+                  <a:latin typeface="Helvetica Neue" panose="02000503000000020004" pitchFamily="2" charset="0"/>
+                  <a:ea typeface="Helvetica Neue" panose="02000503000000020004" pitchFamily="2" charset="0"/>
+                  <a:cs typeface="Helvetica Neue" panose="02000503000000020004" pitchFamily="2" charset="0"/>
+                </a:rPr>
+                <a:t>b</a:t>
+              </a:r>
+            </a:p>
+          </p:txBody>
+        </p:sp>
+        <p:pic>
+          <p:nvPicPr>
+            <p:cNvPr id="11" name="Picture 10">
+              <a:extLst>
+                <a:ext uri="{FF2B5EF4-FFF2-40B4-BE49-F238E27FC236}">
+                  <a16:creationId xmlns:a16="http://schemas.microsoft.com/office/drawing/2014/main" id="{CDDBCA46-2431-8742-8B7E-7958F55115D8}"/>
+                </a:ext>
+              </a:extLst>
+            </p:cNvPr>
+            <p:cNvPicPr>
+              <a:picLocks noChangeAspect="1"/>
+            </p:cNvPicPr>
+            <p:nvPr/>
+          </p:nvPicPr>
+          <p:blipFill>
+            <a:blip r:embed="rId5"/>
+            <a:stretch>
+              <a:fillRect/>
+            </a:stretch>
+          </p:blipFill>
+          <p:spPr>
+            <a:xfrm>
+              <a:off x="83059" y="1568526"/>
+              <a:ext cx="3511296" cy="1748763"/>
+            </a:xfrm>
+            <a:prstGeom prst="rect">
+              <a:avLst/>
+            </a:prstGeom>
+          </p:spPr>
+        </p:pic>
+        <p:pic>
+          <p:nvPicPr>
+            <p:cNvPr id="17" name="Picture 16">
+              <a:extLst>
+                <a:ext uri="{FF2B5EF4-FFF2-40B4-BE49-F238E27FC236}">
+                  <a16:creationId xmlns:a16="http://schemas.microsoft.com/office/drawing/2014/main" id="{2B7D716C-7908-7040-B95B-AA7F33B09271}"/>
+                </a:ext>
+              </a:extLst>
+            </p:cNvPr>
+            <p:cNvPicPr>
+              <a:picLocks noChangeAspect="1"/>
+            </p:cNvPicPr>
+            <p:nvPr/>
+          </p:nvPicPr>
+          <p:blipFill>
+            <a:blip r:embed="rId6"/>
+            <a:stretch>
+              <a:fillRect/>
+            </a:stretch>
+          </p:blipFill>
+          <p:spPr>
+            <a:xfrm>
+              <a:off x="83059" y="3596853"/>
+              <a:ext cx="3511296" cy="1748763"/>
+            </a:xfrm>
+            <a:prstGeom prst="rect">
+              <a:avLst/>
+            </a:prstGeom>
+          </p:spPr>
+        </p:pic>
+        <p:pic>
+          <p:nvPicPr>
+            <p:cNvPr id="24" name="Picture 23">
+              <a:extLst>
+                <a:ext uri="{FF2B5EF4-FFF2-40B4-BE49-F238E27FC236}">
+                  <a16:creationId xmlns:a16="http://schemas.microsoft.com/office/drawing/2014/main" id="{E521139E-34DD-FC49-B81A-3E8E74C466B9}"/>
+                </a:ext>
+              </a:extLst>
+            </p:cNvPr>
+            <p:cNvPicPr>
+              <a:picLocks noChangeAspect="1"/>
+            </p:cNvPicPr>
+            <p:nvPr/>
+          </p:nvPicPr>
+          <p:blipFill>
+            <a:blip r:embed="rId7"/>
+            <a:stretch>
+              <a:fillRect/>
+            </a:stretch>
+          </p:blipFill>
+          <p:spPr>
+            <a:xfrm>
+              <a:off x="3609807" y="1568527"/>
+              <a:ext cx="3511296" cy="1748763"/>
+            </a:xfrm>
+            <a:prstGeom prst="rect">
+              <a:avLst/>
+            </a:prstGeom>
+          </p:spPr>
+        </p:pic>
+        <p:sp>
+          <p:nvSpPr>
+            <p:cNvPr id="16" name="TextBox 15">
+              <a:extLst>
+                <a:ext uri="{FF2B5EF4-FFF2-40B4-BE49-F238E27FC236}">
+                  <a16:creationId xmlns:a16="http://schemas.microsoft.com/office/drawing/2014/main" id="{0B8EA217-6F2C-0943-8D48-F70EC12EC200}"/>
+                </a:ext>
+              </a:extLst>
+            </p:cNvPr>
+            <p:cNvSpPr txBox="1"/>
+            <p:nvPr/>
+          </p:nvSpPr>
+          <p:spPr>
+            <a:xfrm>
+              <a:off x="-39178" y="1258440"/>
+              <a:ext cx="532050" cy="311217"/>
+            </a:xfrm>
+            <a:prstGeom prst="rect">
+              <a:avLst/>
+            </a:prstGeom>
+            <a:noFill/>
+          </p:spPr>
+          <p:txBody>
+            <a:bodyPr wrap="square" rtlCol="0">
+              <a:spAutoFit/>
+            </a:bodyPr>
+            <a:lstStyle/>
+            <a:p>
+              <a:pPr algn="ctr"/>
+              <a:r>
+                <a:rPr lang="en-US" sz="1600" b="1" dirty="0">
+                  <a:latin typeface="Helvetica Neue" panose="02000503000000020004" pitchFamily="2" charset="0"/>
+                  <a:ea typeface="Helvetica Neue" panose="02000503000000020004" pitchFamily="2" charset="0"/>
+                  <a:cs typeface="Helvetica Neue" panose="02000503000000020004" pitchFamily="2" charset="0"/>
+                </a:rPr>
+                <a:t>a</a:t>
+              </a:r>
+            </a:p>
+          </p:txBody>
+        </p:sp>
+        <p:sp>
+          <p:nvSpPr>
+            <p:cNvPr id="20" name="TextBox 19">
+              <a:extLst>
+                <a:ext uri="{FF2B5EF4-FFF2-40B4-BE49-F238E27FC236}">
+                  <a16:creationId xmlns:a16="http://schemas.microsoft.com/office/drawing/2014/main" id="{E8C86BD2-9FE9-8C4D-A835-2EAAEE829653}"/>
+                </a:ext>
+              </a:extLst>
+            </p:cNvPr>
+            <p:cNvSpPr txBox="1"/>
+            <p:nvPr/>
+          </p:nvSpPr>
+          <p:spPr>
+            <a:xfrm>
+              <a:off x="-59571" y="3276227"/>
+              <a:ext cx="532050" cy="311217"/>
+            </a:xfrm>
+            <a:prstGeom prst="rect">
+              <a:avLst/>
+            </a:prstGeom>
+            <a:noFill/>
+          </p:spPr>
+          <p:txBody>
+            <a:bodyPr wrap="square" rtlCol="0">
+              <a:spAutoFit/>
+            </a:bodyPr>
+            <a:lstStyle/>
+            <a:p>
+              <a:pPr algn="ctr"/>
+              <a:r>
+                <a:rPr lang="en-US" sz="1600" b="1" dirty="0">
+                  <a:latin typeface="Helvetica Neue" panose="02000503000000020004" pitchFamily="2" charset="0"/>
+                  <a:ea typeface="Helvetica Neue" panose="02000503000000020004" pitchFamily="2" charset="0"/>
+                  <a:cs typeface="Helvetica Neue" panose="02000503000000020004" pitchFamily="2" charset="0"/>
+                </a:rPr>
+                <a:t>c</a:t>
+              </a:r>
+            </a:p>
+          </p:txBody>
+        </p:sp>
+        <p:sp>
+          <p:nvSpPr>
+            <p:cNvPr id="22" name="TextBox 21">
+              <a:extLst>
+                <a:ext uri="{FF2B5EF4-FFF2-40B4-BE49-F238E27FC236}">
+                  <a16:creationId xmlns:a16="http://schemas.microsoft.com/office/drawing/2014/main" id="{9CC8A2EA-F668-DD43-A074-9F1F726F28A7}"/>
+                </a:ext>
+              </a:extLst>
+            </p:cNvPr>
+            <p:cNvSpPr txBox="1"/>
+            <p:nvPr/>
+          </p:nvSpPr>
+          <p:spPr>
+            <a:xfrm>
+              <a:off x="3478615" y="3281256"/>
+              <a:ext cx="532050" cy="311217"/>
+            </a:xfrm>
+            <a:prstGeom prst="rect">
+              <a:avLst/>
+            </a:prstGeom>
+            <a:noFill/>
+          </p:spPr>
+          <p:txBody>
+            <a:bodyPr wrap="square" rtlCol="0">
+              <a:spAutoFit/>
+            </a:bodyPr>
+            <a:lstStyle/>
+            <a:p>
+              <a:pPr algn="ctr"/>
+              <a:r>
+                <a:rPr lang="en-US" sz="1600" b="1" dirty="0">
+                  <a:latin typeface="Helvetica Neue" panose="02000503000000020004" pitchFamily="2" charset="0"/>
+                  <a:ea typeface="Helvetica Neue" panose="02000503000000020004" pitchFamily="2" charset="0"/>
+                  <a:cs typeface="Helvetica Neue" panose="02000503000000020004" pitchFamily="2" charset="0"/>
+                </a:rPr>
+                <a:t>d</a:t>
+              </a:r>
+            </a:p>
+          </p:txBody>
+        </p:sp>
+        <p:sp>
+          <p:nvSpPr>
+            <p:cNvPr id="34" name="Rectangle 33">
+              <a:extLst>
+                <a:ext uri="{FF2B5EF4-FFF2-40B4-BE49-F238E27FC236}">
+                  <a16:creationId xmlns:a16="http://schemas.microsoft.com/office/drawing/2014/main" id="{FCC82B76-D613-B14A-9751-C3404A7F5100}"/>
+                </a:ext>
+              </a:extLst>
+            </p:cNvPr>
+            <p:cNvSpPr/>
+            <p:nvPr/>
+          </p:nvSpPr>
+          <p:spPr>
+            <a:xfrm>
+              <a:off x="1859134" y="1755789"/>
+              <a:ext cx="253217" cy="1060972"/>
+            </a:xfrm>
+            <a:prstGeom prst="rect">
+              <a:avLst/>
+            </a:prstGeom>
+            <a:noFill/>
+            <a:ln w="6350">
+              <a:solidFill>
+                <a:schemeClr val="tx1"/>
+              </a:solidFill>
+            </a:ln>
+          </p:spPr>
+          <p:style>
+            <a:lnRef idx="2">
+              <a:schemeClr val="accent1">
+                <a:shade val="50000"/>
+              </a:schemeClr>
+            </a:lnRef>
+            <a:fillRef idx="1">
+              <a:schemeClr val="accent1"/>
+            </a:fillRef>
+            <a:effectRef idx="0">
+              <a:schemeClr val="accent1"/>
+            </a:effectRef>
+            <a:fontRef idx="minor">
+              <a:schemeClr val="lt1"/>
+            </a:fontRef>
+          </p:style>
+          <p:txBody>
+            <a:bodyPr rtlCol="0" anchor="ctr"/>
+            <a:lstStyle/>
+            <a:p>
+              <a:pPr algn="ctr"/>
+              <a:endParaRPr lang="en-US"/>
+            </a:p>
+          </p:txBody>
+        </p:sp>
+        <p:cxnSp>
+          <p:nvCxnSpPr>
+            <p:cNvPr id="36" name="Straight Arrow Connector 35">
+              <a:extLst>
+                <a:ext uri="{FF2B5EF4-FFF2-40B4-BE49-F238E27FC236}">
+                  <a16:creationId xmlns:a16="http://schemas.microsoft.com/office/drawing/2014/main" id="{FCB6A53D-8895-5444-BC26-FDB3CED3D01F}"/>
+                </a:ext>
+              </a:extLst>
+            </p:cNvPr>
+            <p:cNvCxnSpPr>
+              <a:cxnSpLocks/>
+            </p:cNvCxnSpPr>
+            <p:nvPr/>
+          </p:nvCxnSpPr>
+          <p:spPr>
+            <a:xfrm>
+              <a:off x="1985744" y="1552268"/>
+              <a:ext cx="0" cy="202381"/>
+            </a:xfrm>
+            <a:prstGeom prst="straightConnector1">
+              <a:avLst/>
+            </a:prstGeom>
+            <a:ln>
+              <a:solidFill>
+                <a:schemeClr val="tx1"/>
+              </a:solidFill>
+              <a:tailEnd type="triangle"/>
+            </a:ln>
+          </p:spPr>
+          <p:style>
+            <a:lnRef idx="1">
+              <a:schemeClr val="accent1"/>
+            </a:lnRef>
+            <a:fillRef idx="0">
+              <a:schemeClr val="accent1"/>
+            </a:fillRef>
+            <a:effectRef idx="0">
+              <a:schemeClr val="accent1"/>
+            </a:effectRef>
+            <a:fontRef idx="minor">
+              <a:schemeClr val="tx1"/>
+            </a:fontRef>
+          </p:style>
+        </p:cxnSp>
+        <p:sp>
+          <p:nvSpPr>
+            <p:cNvPr id="40" name="TextBox 39">
+              <a:extLst>
+                <a:ext uri="{FF2B5EF4-FFF2-40B4-BE49-F238E27FC236}">
+                  <a16:creationId xmlns:a16="http://schemas.microsoft.com/office/drawing/2014/main" id="{59710CE9-75A6-8E4F-BC0F-9128A72B5E28}"/>
+                </a:ext>
+              </a:extLst>
+            </p:cNvPr>
+            <p:cNvSpPr txBox="1"/>
+            <p:nvPr/>
+          </p:nvSpPr>
+          <p:spPr>
+            <a:xfrm>
+              <a:off x="1510959" y="1335504"/>
+              <a:ext cx="949569" cy="230832"/>
+            </a:xfrm>
+            <a:prstGeom prst="rect">
+              <a:avLst/>
+            </a:prstGeom>
+            <a:noFill/>
+          </p:spPr>
+          <p:txBody>
+            <a:bodyPr wrap="square" rtlCol="0">
+              <a:spAutoFit/>
+            </a:bodyPr>
+            <a:lstStyle/>
+            <a:p>
+              <a:pPr algn="ctr"/>
+              <a:r>
+                <a:rPr lang="en-US" sz="900" i="1" dirty="0">
+                  <a:solidFill>
+                    <a:srgbClr val="8FB132"/>
+                  </a:solidFill>
+                  <a:latin typeface="Helvetica Neue" panose="02000503000000020004" pitchFamily="2" charset="0"/>
+                  <a:ea typeface="Helvetica Neue" panose="02000503000000020004" pitchFamily="2" charset="0"/>
+                  <a:cs typeface="Helvetica Neue" panose="02000503000000020004" pitchFamily="2" charset="0"/>
+                </a:rPr>
+                <a:t>No effect</a:t>
+              </a:r>
+            </a:p>
+          </p:txBody>
+        </p:sp>
+        <p:sp>
+          <p:nvSpPr>
+            <p:cNvPr id="47" name="Rectangle 46">
+              <a:extLst>
+                <a:ext uri="{FF2B5EF4-FFF2-40B4-BE49-F238E27FC236}">
+                  <a16:creationId xmlns:a16="http://schemas.microsoft.com/office/drawing/2014/main" id="{B01074A1-2499-4948-9DBB-7D0A93A30FE8}"/>
+                </a:ext>
+              </a:extLst>
+            </p:cNvPr>
+            <p:cNvSpPr/>
+            <p:nvPr/>
+          </p:nvSpPr>
+          <p:spPr>
+            <a:xfrm>
+              <a:off x="5388331" y="1755789"/>
+              <a:ext cx="253217" cy="1057240"/>
+            </a:xfrm>
+            <a:prstGeom prst="rect">
+              <a:avLst/>
+            </a:prstGeom>
+            <a:noFill/>
+            <a:ln w="6350">
+              <a:solidFill>
+                <a:schemeClr val="tx1"/>
+              </a:solidFill>
+            </a:ln>
+          </p:spPr>
+          <p:style>
+            <a:lnRef idx="2">
+              <a:schemeClr val="accent1">
+                <a:shade val="50000"/>
+              </a:schemeClr>
+            </a:lnRef>
+            <a:fillRef idx="1">
+              <a:schemeClr val="accent1"/>
+            </a:fillRef>
+            <a:effectRef idx="0">
+              <a:schemeClr val="accent1"/>
+            </a:effectRef>
+            <a:fontRef idx="minor">
+              <a:schemeClr val="lt1"/>
+            </a:fontRef>
+          </p:style>
+          <p:txBody>
+            <a:bodyPr rtlCol="0" anchor="ctr"/>
+            <a:lstStyle/>
+            <a:p>
+              <a:pPr algn="ctr"/>
+              <a:endParaRPr lang="en-US"/>
+            </a:p>
+          </p:txBody>
+        </p:sp>
+        <p:cxnSp>
+          <p:nvCxnSpPr>
+            <p:cNvPr id="48" name="Straight Arrow Connector 47">
+              <a:extLst>
+                <a:ext uri="{FF2B5EF4-FFF2-40B4-BE49-F238E27FC236}">
+                  <a16:creationId xmlns:a16="http://schemas.microsoft.com/office/drawing/2014/main" id="{3673C9ED-1E77-ED4B-9332-C7996099B01B}"/>
+                </a:ext>
+              </a:extLst>
+            </p:cNvPr>
+            <p:cNvCxnSpPr>
+              <a:cxnSpLocks/>
+            </p:cNvCxnSpPr>
+            <p:nvPr/>
+          </p:nvCxnSpPr>
+          <p:spPr>
+            <a:xfrm>
+              <a:off x="5514940" y="1523669"/>
+              <a:ext cx="0" cy="227246"/>
+            </a:xfrm>
+            <a:prstGeom prst="straightConnector1">
+              <a:avLst/>
+            </a:prstGeom>
+            <a:ln>
+              <a:solidFill>
+                <a:schemeClr val="tx1"/>
+              </a:solidFill>
+              <a:tailEnd type="triangle"/>
+            </a:ln>
+          </p:spPr>
+          <p:style>
+            <a:lnRef idx="1">
+              <a:schemeClr val="accent1"/>
+            </a:lnRef>
+            <a:fillRef idx="0">
+              <a:schemeClr val="accent1"/>
+            </a:fillRef>
+            <a:effectRef idx="0">
+              <a:schemeClr val="accent1"/>
+            </a:effectRef>
+            <a:fontRef idx="minor">
+              <a:schemeClr val="tx1"/>
+            </a:fontRef>
+          </p:style>
+        </p:cxnSp>
+        <p:sp>
+          <p:nvSpPr>
+            <p:cNvPr id="49" name="TextBox 48">
+              <a:extLst>
+                <a:ext uri="{FF2B5EF4-FFF2-40B4-BE49-F238E27FC236}">
+                  <a16:creationId xmlns:a16="http://schemas.microsoft.com/office/drawing/2014/main" id="{2505A704-0B39-3948-B702-3DE6FB8A566F}"/>
+                </a:ext>
+              </a:extLst>
+            </p:cNvPr>
+            <p:cNvSpPr txBox="1"/>
+            <p:nvPr/>
+          </p:nvSpPr>
+          <p:spPr>
+            <a:xfrm>
+              <a:off x="4819867" y="1337694"/>
+              <a:ext cx="1367335" cy="230832"/>
+            </a:xfrm>
+            <a:prstGeom prst="rect">
+              <a:avLst/>
+            </a:prstGeom>
+            <a:noFill/>
+          </p:spPr>
+          <p:txBody>
+            <a:bodyPr wrap="square" rtlCol="0">
+              <a:spAutoFit/>
+            </a:bodyPr>
+            <a:lstStyle/>
+            <a:p>
+              <a:pPr algn="ctr"/>
+              <a:r>
+                <a:rPr lang="en-US" sz="900" i="1" dirty="0">
+                  <a:solidFill>
+                    <a:srgbClr val="8FB132"/>
+                  </a:solidFill>
+                  <a:latin typeface="Helvetica Neue" panose="02000503000000020004" pitchFamily="2" charset="0"/>
+                  <a:ea typeface="Helvetica Neue" panose="02000503000000020004" pitchFamily="2" charset="0"/>
+                  <a:cs typeface="Helvetica Neue" panose="02000503000000020004" pitchFamily="2" charset="0"/>
+                </a:rPr>
+                <a:t>Downward contagion</a:t>
+              </a:r>
+            </a:p>
+          </p:txBody>
+        </p:sp>
+        <p:sp>
+          <p:nvSpPr>
+            <p:cNvPr id="56" name="Rectangle 55">
+              <a:extLst>
+                <a:ext uri="{FF2B5EF4-FFF2-40B4-BE49-F238E27FC236}">
+                  <a16:creationId xmlns:a16="http://schemas.microsoft.com/office/drawing/2014/main" id="{946FFB0D-B0DB-7746-BE84-CA00A6AC6FC6}"/>
+                </a:ext>
+              </a:extLst>
+            </p:cNvPr>
+            <p:cNvSpPr/>
+            <p:nvPr/>
+          </p:nvSpPr>
+          <p:spPr>
+            <a:xfrm>
+              <a:off x="1870538" y="3779347"/>
+              <a:ext cx="253217" cy="1057240"/>
+            </a:xfrm>
+            <a:prstGeom prst="rect">
+              <a:avLst/>
+            </a:prstGeom>
+            <a:noFill/>
+            <a:ln w="6350">
+              <a:solidFill>
+                <a:schemeClr val="tx1"/>
+              </a:solidFill>
+            </a:ln>
+          </p:spPr>
+          <p:style>
+            <a:lnRef idx="2">
+              <a:schemeClr val="accent1">
+                <a:shade val="50000"/>
+              </a:schemeClr>
+            </a:lnRef>
+            <a:fillRef idx="1">
+              <a:schemeClr val="accent1"/>
+            </a:fillRef>
+            <a:effectRef idx="0">
+              <a:schemeClr val="accent1"/>
+            </a:effectRef>
+            <a:fontRef idx="minor">
+              <a:schemeClr val="lt1"/>
+            </a:fontRef>
+          </p:style>
+          <p:txBody>
+            <a:bodyPr rtlCol="0" anchor="ctr"/>
+            <a:lstStyle/>
+            <a:p>
+              <a:pPr algn="ctr"/>
+              <a:endParaRPr lang="en-US"/>
+            </a:p>
+          </p:txBody>
+        </p:sp>
+        <p:cxnSp>
+          <p:nvCxnSpPr>
+            <p:cNvPr id="57" name="Straight Arrow Connector 56">
+              <a:extLst>
+                <a:ext uri="{FF2B5EF4-FFF2-40B4-BE49-F238E27FC236}">
+                  <a16:creationId xmlns:a16="http://schemas.microsoft.com/office/drawing/2014/main" id="{D01545C1-233E-EA44-BA81-A519DB74EB76}"/>
+                </a:ext>
+              </a:extLst>
+            </p:cNvPr>
+            <p:cNvCxnSpPr>
+              <a:cxnSpLocks/>
+            </p:cNvCxnSpPr>
+            <p:nvPr/>
+          </p:nvCxnSpPr>
+          <p:spPr>
+            <a:xfrm>
+              <a:off x="1997147" y="3547227"/>
+              <a:ext cx="0" cy="227246"/>
+            </a:xfrm>
+            <a:prstGeom prst="straightConnector1">
+              <a:avLst/>
+            </a:prstGeom>
+            <a:ln>
+              <a:solidFill>
+                <a:schemeClr val="tx1"/>
+              </a:solidFill>
+              <a:tailEnd type="triangle"/>
+            </a:ln>
+          </p:spPr>
+          <p:style>
+            <a:lnRef idx="1">
+              <a:schemeClr val="accent1"/>
+            </a:lnRef>
+            <a:fillRef idx="0">
+              <a:schemeClr val="accent1"/>
+            </a:fillRef>
+            <a:effectRef idx="0">
+              <a:schemeClr val="accent1"/>
+            </a:effectRef>
+            <a:fontRef idx="minor">
+              <a:schemeClr val="tx1"/>
+            </a:fontRef>
+          </p:style>
+        </p:cxnSp>
+        <p:sp>
+          <p:nvSpPr>
+            <p:cNvPr id="58" name="TextBox 57">
+              <a:extLst>
+                <a:ext uri="{FF2B5EF4-FFF2-40B4-BE49-F238E27FC236}">
+                  <a16:creationId xmlns:a16="http://schemas.microsoft.com/office/drawing/2014/main" id="{01EAAFA9-AE9E-8246-A9FD-6D29F8274912}"/>
+                </a:ext>
+              </a:extLst>
+            </p:cNvPr>
+            <p:cNvSpPr txBox="1"/>
+            <p:nvPr/>
+          </p:nvSpPr>
+          <p:spPr>
+            <a:xfrm>
+              <a:off x="1302074" y="3361252"/>
+              <a:ext cx="1367335" cy="230832"/>
+            </a:xfrm>
+            <a:prstGeom prst="rect">
+              <a:avLst/>
+            </a:prstGeom>
+            <a:noFill/>
+          </p:spPr>
+          <p:txBody>
+            <a:bodyPr wrap="square" rtlCol="0">
+              <a:spAutoFit/>
+            </a:bodyPr>
+            <a:lstStyle/>
+            <a:p>
+              <a:pPr algn="ctr"/>
+              <a:r>
+                <a:rPr lang="en-US" sz="900" i="1" dirty="0">
+                  <a:solidFill>
+                    <a:srgbClr val="8FB132"/>
+                  </a:solidFill>
+                  <a:latin typeface="Helvetica Neue" panose="02000503000000020004" pitchFamily="2" charset="0"/>
+                  <a:ea typeface="Helvetica Neue" panose="02000503000000020004" pitchFamily="2" charset="0"/>
+                  <a:cs typeface="Helvetica Neue" panose="02000503000000020004" pitchFamily="2" charset="0"/>
+                </a:rPr>
+                <a:t>Upward contagion</a:t>
+              </a:r>
+            </a:p>
+          </p:txBody>
+        </p:sp>
+        <p:sp>
+          <p:nvSpPr>
+            <p:cNvPr id="60" name="Rectangle 59">
+              <a:extLst>
+                <a:ext uri="{FF2B5EF4-FFF2-40B4-BE49-F238E27FC236}">
+                  <a16:creationId xmlns:a16="http://schemas.microsoft.com/office/drawing/2014/main" id="{A32BC6D7-F7BC-9347-83A3-B3CCF91F5830}"/>
+                </a:ext>
+              </a:extLst>
+            </p:cNvPr>
+            <p:cNvSpPr/>
+            <p:nvPr/>
+          </p:nvSpPr>
+          <p:spPr>
+            <a:xfrm>
+              <a:off x="5404107" y="3819564"/>
+              <a:ext cx="253217" cy="1057240"/>
+            </a:xfrm>
+            <a:prstGeom prst="rect">
+              <a:avLst/>
+            </a:prstGeom>
+            <a:noFill/>
+            <a:ln w="6350">
+              <a:solidFill>
+                <a:schemeClr val="tx1"/>
+              </a:solidFill>
+            </a:ln>
+          </p:spPr>
+          <p:style>
+            <a:lnRef idx="2">
+              <a:schemeClr val="accent1">
+                <a:shade val="50000"/>
+              </a:schemeClr>
+            </a:lnRef>
+            <a:fillRef idx="1">
+              <a:schemeClr val="accent1"/>
+            </a:fillRef>
+            <a:effectRef idx="0">
+              <a:schemeClr val="accent1"/>
+            </a:effectRef>
+            <a:fontRef idx="minor">
+              <a:schemeClr val="lt1"/>
+            </a:fontRef>
+          </p:style>
+          <p:txBody>
+            <a:bodyPr rtlCol="0" anchor="ctr"/>
+            <a:lstStyle/>
+            <a:p>
+              <a:pPr algn="ctr"/>
+              <a:endParaRPr lang="en-US"/>
+            </a:p>
+          </p:txBody>
+        </p:sp>
+        <p:cxnSp>
+          <p:nvCxnSpPr>
+            <p:cNvPr id="61" name="Straight Arrow Connector 60">
+              <a:extLst>
+                <a:ext uri="{FF2B5EF4-FFF2-40B4-BE49-F238E27FC236}">
+                  <a16:creationId xmlns:a16="http://schemas.microsoft.com/office/drawing/2014/main" id="{9799F749-BB09-1044-AE8A-A5DAEEBC2F1E}"/>
+                </a:ext>
+              </a:extLst>
+            </p:cNvPr>
+            <p:cNvCxnSpPr>
+              <a:cxnSpLocks/>
+            </p:cNvCxnSpPr>
+            <p:nvPr/>
+          </p:nvCxnSpPr>
+          <p:spPr>
+            <a:xfrm>
+              <a:off x="5530716" y="3587444"/>
+              <a:ext cx="0" cy="227246"/>
+            </a:xfrm>
+            <a:prstGeom prst="straightConnector1">
+              <a:avLst/>
+            </a:prstGeom>
+            <a:ln>
+              <a:solidFill>
+                <a:schemeClr val="tx1"/>
+              </a:solidFill>
+              <a:tailEnd type="triangle"/>
+            </a:ln>
+          </p:spPr>
+          <p:style>
+            <a:lnRef idx="1">
+              <a:schemeClr val="accent1"/>
+            </a:lnRef>
+            <a:fillRef idx="0">
+              <a:schemeClr val="accent1"/>
+            </a:fillRef>
+            <a:effectRef idx="0">
+              <a:schemeClr val="accent1"/>
+            </a:effectRef>
+            <a:fontRef idx="minor">
+              <a:schemeClr val="tx1"/>
+            </a:fontRef>
+          </p:style>
+        </p:cxnSp>
+        <p:sp>
+          <p:nvSpPr>
+            <p:cNvPr id="62" name="TextBox 61">
+              <a:extLst>
+                <a:ext uri="{FF2B5EF4-FFF2-40B4-BE49-F238E27FC236}">
+                  <a16:creationId xmlns:a16="http://schemas.microsoft.com/office/drawing/2014/main" id="{D13988C2-B628-D948-9CFA-37C8D35D596B}"/>
+                </a:ext>
+              </a:extLst>
+            </p:cNvPr>
+            <p:cNvSpPr txBox="1"/>
+            <p:nvPr/>
+          </p:nvSpPr>
+          <p:spPr>
+            <a:xfrm>
+              <a:off x="4835643" y="3401469"/>
+              <a:ext cx="1367335" cy="230832"/>
+            </a:xfrm>
+            <a:prstGeom prst="rect">
+              <a:avLst/>
+            </a:prstGeom>
+            <a:noFill/>
+          </p:spPr>
+          <p:txBody>
+            <a:bodyPr wrap="square" rtlCol="0">
+              <a:spAutoFit/>
+            </a:bodyPr>
+            <a:lstStyle/>
+            <a:p>
+              <a:pPr algn="ctr"/>
+              <a:r>
+                <a:rPr lang="en-US" sz="900" i="1" dirty="0">
+                  <a:solidFill>
+                    <a:srgbClr val="8FB132"/>
+                  </a:solidFill>
+                  <a:latin typeface="Helvetica Neue" panose="02000503000000020004" pitchFamily="2" charset="0"/>
+                  <a:ea typeface="Helvetica Neue" panose="02000503000000020004" pitchFamily="2" charset="0"/>
+                  <a:cs typeface="Helvetica Neue" panose="02000503000000020004" pitchFamily="2" charset="0"/>
+                </a:rPr>
+                <a:t>Amplification</a:t>
+              </a:r>
+            </a:p>
+          </p:txBody>
+        </p:sp>
+      </p:grpSp>
+    </p:spTree>
+    <p:extLst>
+      <p:ext uri="{BB962C8B-B14F-4D97-AF65-F5344CB8AC3E}">
+        <p14:creationId xmlns:p14="http://schemas.microsoft.com/office/powerpoint/2010/main" val="580486317"/>
       </p:ext>
     </p:extLst>
   </p:cSld>
@@ -9008,8 +10136,8 @@
           </p:nvSpPr>
           <p:spPr>
             <a:xfrm>
-              <a:off x="966670" y="4436079"/>
-              <a:ext cx="1569713" cy="471018"/>
+              <a:off x="966670" y="4406224"/>
+              <a:ext cx="1569713" cy="516831"/>
             </a:xfrm>
             <a:prstGeom prst="rect">
               <a:avLst/>
@@ -9025,6 +10153,13 @@
               <a:pPr algn="ctr"/>
               <a:r>
                 <a:rPr lang="en-US" sz="1400" b="1" dirty="0">
+                  <a:ln w="635">
+                    <a:solidFill>
+                      <a:schemeClr val="bg1">
+                        <a:alpha val="50000"/>
+                      </a:schemeClr>
+                    </a:solidFill>
+                  </a:ln>
                   <a:solidFill>
                     <a:srgbClr val="2B4B9B"/>
                   </a:solidFill>
@@ -9108,117 +10243,6 @@
               </a:schemeClr>
             </a:solidFill>
             <a:tailEnd type="triangle" w="med" len="med"/>
-          </a:ln>
-        </p:spPr>
-        <p:style>
-          <a:lnRef idx="1">
-            <a:schemeClr val="accent1"/>
-          </a:lnRef>
-          <a:fillRef idx="0">
-            <a:schemeClr val="accent1"/>
-          </a:fillRef>
-          <a:effectRef idx="0">
-            <a:schemeClr val="accent1"/>
-          </a:effectRef>
-          <a:fontRef idx="minor">
-            <a:schemeClr val="tx1"/>
-          </a:fontRef>
-        </p:style>
-        <p:txBody>
-          <a:bodyPr rtlCol="0" anchor="ctr"/>
-          <a:lstStyle/>
-          <a:p>
-            <a:pPr algn="ctr"/>
-            <a:endParaRPr lang="en-US"/>
-          </a:p>
-        </p:txBody>
-      </p:sp>
-      <p:sp>
-        <p:nvSpPr>
-          <p:cNvPr id="54" name="Arc 53">
-            <a:extLst>
-              <a:ext uri="{FF2B5EF4-FFF2-40B4-BE49-F238E27FC236}">
-                <a16:creationId xmlns:a16="http://schemas.microsoft.com/office/drawing/2014/main" id="{36C3A527-0618-F84D-BFDC-2B5F3569FFF1}"/>
-              </a:ext>
-            </a:extLst>
-          </p:cNvPr>
-          <p:cNvSpPr/>
-          <p:nvPr/>
-        </p:nvSpPr>
-        <p:spPr>
-          <a:xfrm rot="15877902" flipV="1">
-            <a:off x="-174217" y="3615980"/>
-            <a:ext cx="7613645" cy="5293189"/>
-          </a:xfrm>
-          <a:prstGeom prst="arc">
-            <a:avLst>
-              <a:gd name="adj1" fmla="val 17631388"/>
-              <a:gd name="adj2" fmla="val 20815625"/>
-            </a:avLst>
-          </a:prstGeom>
-          <a:ln w="19050">
-            <a:solidFill>
-              <a:schemeClr val="bg2">
-                <a:lumMod val="75000"/>
-              </a:schemeClr>
-            </a:solidFill>
-            <a:tailEnd type="triangle"/>
-          </a:ln>
-        </p:spPr>
-        <p:style>
-          <a:lnRef idx="1">
-            <a:schemeClr val="accent1"/>
-          </a:lnRef>
-          <a:fillRef idx="0">
-            <a:schemeClr val="accent1"/>
-          </a:fillRef>
-          <a:effectRef idx="0">
-            <a:schemeClr val="accent1"/>
-          </a:effectRef>
-          <a:fontRef idx="minor">
-            <a:schemeClr val="tx1"/>
-          </a:fontRef>
-        </p:style>
-        <p:txBody>
-          <a:bodyPr rtlCol="0" anchor="ctr"/>
-          <a:lstStyle/>
-          <a:p>
-            <a:pPr algn="ctr"/>
-            <a:endParaRPr lang="en-US"/>
-          </a:p>
-        </p:txBody>
-      </p:sp>
-      <p:sp>
-        <p:nvSpPr>
-          <p:cNvPr id="53" name="Arc 52">
-            <a:extLst>
-              <a:ext uri="{FF2B5EF4-FFF2-40B4-BE49-F238E27FC236}">
-                <a16:creationId xmlns:a16="http://schemas.microsoft.com/office/drawing/2014/main" id="{96BD8594-B12F-0B4E-80D0-4C225EE50BD6}"/>
-              </a:ext>
-            </a:extLst>
-          </p:cNvPr>
-          <p:cNvSpPr/>
-          <p:nvPr/>
-        </p:nvSpPr>
-        <p:spPr>
-          <a:xfrm rot="14659101" flipH="1" flipV="1">
-            <a:off x="-1759486" y="651230"/>
-            <a:ext cx="4515937" cy="5615453"/>
-          </a:xfrm>
-          <a:prstGeom prst="arc">
-            <a:avLst>
-              <a:gd name="adj1" fmla="val 16774664"/>
-              <a:gd name="adj2" fmla="val 20923922"/>
-            </a:avLst>
-          </a:prstGeom>
-          <a:ln w="19050">
-            <a:solidFill>
-              <a:schemeClr val="bg2">
-                <a:lumMod val="75000"/>
-              </a:schemeClr>
-            </a:solidFill>
-            <a:headEnd type="triangle"/>
-            <a:tailEnd w="lg" len="med"/>
           </a:ln>
         </p:spPr>
         <p:style>
@@ -10104,6 +11128,117 @@
       </p:grpSp>
       <p:sp>
         <p:nvSpPr>
+          <p:cNvPr id="53" name="Arc 52">
+            <a:extLst>
+              <a:ext uri="{FF2B5EF4-FFF2-40B4-BE49-F238E27FC236}">
+                <a16:creationId xmlns:a16="http://schemas.microsoft.com/office/drawing/2014/main" id="{96BD8594-B12F-0B4E-80D0-4C225EE50BD6}"/>
+              </a:ext>
+            </a:extLst>
+          </p:cNvPr>
+          <p:cNvSpPr/>
+          <p:nvPr/>
+        </p:nvSpPr>
+        <p:spPr>
+          <a:xfrm rot="14659101" flipH="1" flipV="1">
+            <a:off x="-1743731" y="649999"/>
+            <a:ext cx="4496747" cy="5575436"/>
+          </a:xfrm>
+          <a:prstGeom prst="arc">
+            <a:avLst>
+              <a:gd name="adj1" fmla="val 16774664"/>
+              <a:gd name="adj2" fmla="val 20697222"/>
+            </a:avLst>
+          </a:prstGeom>
+          <a:ln w="19050">
+            <a:solidFill>
+              <a:schemeClr val="bg2">
+                <a:lumMod val="75000"/>
+              </a:schemeClr>
+            </a:solidFill>
+            <a:headEnd type="triangle"/>
+            <a:tailEnd w="lg" len="med"/>
+          </a:ln>
+        </p:spPr>
+        <p:style>
+          <a:lnRef idx="1">
+            <a:schemeClr val="accent1"/>
+          </a:lnRef>
+          <a:fillRef idx="0">
+            <a:schemeClr val="accent1"/>
+          </a:fillRef>
+          <a:effectRef idx="0">
+            <a:schemeClr val="accent1"/>
+          </a:effectRef>
+          <a:fontRef idx="minor">
+            <a:schemeClr val="tx1"/>
+          </a:fontRef>
+        </p:style>
+        <p:txBody>
+          <a:bodyPr rtlCol="0" anchor="ctr"/>
+          <a:lstStyle/>
+          <a:p>
+            <a:pPr algn="ctr"/>
+            <a:endParaRPr lang="en-US"/>
+          </a:p>
+        </p:txBody>
+      </p:sp>
+      <p:sp>
+        <p:nvSpPr>
+          <p:cNvPr id="54" name="Arc 53">
+            <a:extLst>
+              <a:ext uri="{FF2B5EF4-FFF2-40B4-BE49-F238E27FC236}">
+                <a16:creationId xmlns:a16="http://schemas.microsoft.com/office/drawing/2014/main" id="{36C3A527-0618-F84D-BFDC-2B5F3569FFF1}"/>
+              </a:ext>
+            </a:extLst>
+          </p:cNvPr>
+          <p:cNvSpPr/>
+          <p:nvPr/>
+        </p:nvSpPr>
+        <p:spPr>
+          <a:xfrm rot="15877902" flipV="1">
+            <a:off x="-210971" y="3552883"/>
+            <a:ext cx="7638836" cy="5385652"/>
+          </a:xfrm>
+          <a:prstGeom prst="arc">
+            <a:avLst>
+              <a:gd name="adj1" fmla="val 17974590"/>
+              <a:gd name="adj2" fmla="val 20815625"/>
+            </a:avLst>
+          </a:prstGeom>
+          <a:ln w="19050">
+            <a:solidFill>
+              <a:schemeClr val="bg2">
+                <a:lumMod val="75000"/>
+              </a:schemeClr>
+            </a:solidFill>
+            <a:tailEnd type="triangle"/>
+          </a:ln>
+        </p:spPr>
+        <p:style>
+          <a:lnRef idx="1">
+            <a:schemeClr val="accent1"/>
+          </a:lnRef>
+          <a:fillRef idx="0">
+            <a:schemeClr val="accent1"/>
+          </a:fillRef>
+          <a:effectRef idx="0">
+            <a:schemeClr val="accent1"/>
+          </a:effectRef>
+          <a:fontRef idx="minor">
+            <a:schemeClr val="tx1"/>
+          </a:fontRef>
+        </p:style>
+        <p:txBody>
+          <a:bodyPr rtlCol="0" anchor="ctr"/>
+          <a:lstStyle/>
+          <a:p>
+            <a:pPr algn="ctr"/>
+            <a:endParaRPr lang="en-US"/>
+          </a:p>
+        </p:txBody>
+      </p:sp>
+      <p:sp>
+        <p:nvSpPr>
           <p:cNvPr id="59" name="Arc 58">
             <a:extLst>
               <a:ext uri="{FF2B5EF4-FFF2-40B4-BE49-F238E27FC236}">
@@ -10215,7 +11350,7 @@
         </p:nvSpPr>
         <p:spPr>
           <a:xfrm>
-            <a:off x="4880442" y="2401267"/>
+            <a:off x="4884878" y="2396831"/>
             <a:ext cx="1025694" cy="307777"/>
           </a:xfrm>
           <a:prstGeom prst="rect">
@@ -10232,6 +11367,13 @@
             <a:pPr algn="ctr"/>
             <a:r>
               <a:rPr lang="en-US" sz="1400" b="1" dirty="0">
+                <a:ln w="635">
+                  <a:solidFill>
+                    <a:schemeClr val="bg1">
+                      <a:alpha val="50000"/>
+                    </a:schemeClr>
+                  </a:solidFill>
+                </a:ln>
                 <a:solidFill>
                   <a:srgbClr val="E52421"/>
                 </a:solidFill>
@@ -10258,13 +11400,16 @@
         </p:nvSpPr>
         <p:spPr>
           <a:xfrm>
-            <a:off x="3530541" y="2411797"/>
+            <a:off x="3531741" y="2396831"/>
             <a:ext cx="1025694" cy="307777"/>
           </a:xfrm>
           <a:prstGeom prst="rect">
             <a:avLst/>
           </a:prstGeom>
           <a:noFill/>
+          <a:ln w="3175">
+            <a:noFill/>
+          </a:ln>
         </p:spPr>
         <p:txBody>
           <a:bodyPr wrap="square" rtlCol="0">
@@ -10275,6 +11420,13 @@
             <a:pPr algn="ctr"/>
             <a:r>
               <a:rPr lang="en-US" sz="1400" b="1" dirty="0">
+                <a:ln w="635">
+                  <a:solidFill>
+                    <a:schemeClr val="bg1">
+                      <a:alpha val="50000"/>
+                    </a:schemeClr>
+                  </a:solidFill>
+                </a:ln>
                 <a:solidFill>
                   <a:srgbClr val="E52421"/>
                 </a:solidFill>
@@ -10301,13 +11453,16 @@
         </p:nvSpPr>
         <p:spPr>
           <a:xfrm>
-            <a:off x="2629481" y="2401267"/>
+            <a:off x="2633718" y="2396830"/>
             <a:ext cx="1025694" cy="307777"/>
           </a:xfrm>
           <a:prstGeom prst="rect">
             <a:avLst/>
           </a:prstGeom>
           <a:noFill/>
+          <a:ln>
+            <a:noFill/>
+          </a:ln>
         </p:spPr>
         <p:txBody>
           <a:bodyPr wrap="square" rtlCol="0">
@@ -10318,6 +11473,13 @@
             <a:pPr algn="ctr"/>
             <a:r>
               <a:rPr lang="en-US" sz="1400" b="1" dirty="0">
+                <a:ln w="635">
+                  <a:solidFill>
+                    <a:schemeClr val="bg1">
+                      <a:alpha val="50000"/>
+                    </a:schemeClr>
+                  </a:solidFill>
+                </a:ln>
                 <a:solidFill>
                   <a:srgbClr val="E52421"/>
                 </a:solidFill>

</xml_diff>

<commit_message>
most recent update on fig 4
</commit_message>
<xml_diff>
--- a/slides/figures_191206.pptx
+++ b/slides/figures_191206.pptx
@@ -5,7 +5,7 @@
     <p:sldMasterId id="2147483684" r:id="rId1"/>
   </p:sldMasterIdLst>
   <p:notesMasterIdLst>
-    <p:notesMasterId r:id="rId17"/>
+    <p:notesMasterId r:id="rId20"/>
   </p:notesMasterIdLst>
   <p:sldIdLst>
     <p:sldId id="256" r:id="rId2"/>
@@ -16,13 +16,16 @@
     <p:sldId id="268" r:id="rId7"/>
     <p:sldId id="258" r:id="rId8"/>
     <p:sldId id="264" r:id="rId9"/>
-    <p:sldId id="259" r:id="rId10"/>
-    <p:sldId id="260" r:id="rId11"/>
-    <p:sldId id="269" r:id="rId12"/>
-    <p:sldId id="270" r:id="rId13"/>
-    <p:sldId id="265" r:id="rId14"/>
-    <p:sldId id="266" r:id="rId15"/>
-    <p:sldId id="267" r:id="rId16"/>
+    <p:sldId id="273" r:id="rId10"/>
+    <p:sldId id="259" r:id="rId11"/>
+    <p:sldId id="260" r:id="rId12"/>
+    <p:sldId id="269" r:id="rId13"/>
+    <p:sldId id="271" r:id="rId14"/>
+    <p:sldId id="270" r:id="rId15"/>
+    <p:sldId id="272" r:id="rId16"/>
+    <p:sldId id="265" r:id="rId17"/>
+    <p:sldId id="266" r:id="rId18"/>
+    <p:sldId id="267" r:id="rId19"/>
   </p:sldIdLst>
   <p:sldSz cx="7918450" cy="6483350"/>
   <p:notesSz cx="6858000" cy="9144000"/>
@@ -211,7 +214,7 @@
           <a:p>
             <a:fld id="{5E7D9203-8D15-1F45-AFEF-29CE894B8122}" type="datetimeFigureOut">
               <a:rPr lang="en-US" smtClean="0"/>
-              <a:t>1/23/20</a:t>
+              <a:t>1/24/20</a:t>
             </a:fld>
             <a:endParaRPr lang="en-US"/>
           </a:p>
@@ -621,7 +624,7 @@
           <a:p>
             <a:r>
               <a:rPr lang="en-US" dirty="0"/>
-              <a:t>12/06/19 Fig. S4</a:t>
+              <a:t>12/06/19 Fig. S2</a:t>
             </a:r>
           </a:p>
         </p:txBody>
@@ -652,7 +655,7 @@
     </p:spTree>
     <p:extLst>
       <p:ext uri="{BB962C8B-B14F-4D97-AF65-F5344CB8AC3E}">
-        <p14:creationId xmlns:p14="http://schemas.microsoft.com/office/powerpoint/2010/main" val="561168434"/>
+        <p14:creationId xmlns:p14="http://schemas.microsoft.com/office/powerpoint/2010/main" val="282547630"/>
       </p:ext>
     </p:extLst>
   </p:cSld>
@@ -713,7 +716,7 @@
           <a:p>
             <a:r>
               <a:rPr lang="en-US" dirty="0"/>
-              <a:t>1/23/20 Fig. S4</a:t>
+              <a:t>12/06/19 Fig. S4</a:t>
             </a:r>
           </a:p>
         </p:txBody>
@@ -744,7 +747,7 @@
     </p:spTree>
     <p:extLst>
       <p:ext uri="{BB962C8B-B14F-4D97-AF65-F5344CB8AC3E}">
-        <p14:creationId xmlns:p14="http://schemas.microsoft.com/office/powerpoint/2010/main" val="733968849"/>
+        <p14:creationId xmlns:p14="http://schemas.microsoft.com/office/powerpoint/2010/main" val="561168434"/>
       </p:ext>
     </p:extLst>
   </p:cSld>
@@ -805,7 +808,7 @@
           <a:p>
             <a:r>
               <a:rPr lang="en-US" dirty="0"/>
-              <a:t>1/23/20 Fig. S5</a:t>
+              <a:t>1/23/20 Fig. S4</a:t>
             </a:r>
           </a:p>
         </p:txBody>
@@ -836,7 +839,7 @@
     </p:spTree>
     <p:extLst>
       <p:ext uri="{BB962C8B-B14F-4D97-AF65-F5344CB8AC3E}">
-        <p14:creationId xmlns:p14="http://schemas.microsoft.com/office/powerpoint/2010/main" val="753180207"/>
+        <p14:creationId xmlns:p14="http://schemas.microsoft.com/office/powerpoint/2010/main" val="733968849"/>
       </p:ext>
     </p:extLst>
   </p:cSld>
@@ -897,7 +900,7 @@
           <a:p>
             <a:r>
               <a:rPr lang="en-US" dirty="0"/>
-              <a:t>12/06/19 Fig. 5</a:t>
+              <a:t>1/23/20 Fig. S4 – tentative v2 with mu = 7.5</a:t>
             </a:r>
           </a:p>
         </p:txBody>
@@ -928,7 +931,7 @@
     </p:spTree>
     <p:extLst>
       <p:ext uri="{BB962C8B-B14F-4D97-AF65-F5344CB8AC3E}">
-        <p14:creationId xmlns:p14="http://schemas.microsoft.com/office/powerpoint/2010/main" val="4193511516"/>
+        <p14:creationId xmlns:p14="http://schemas.microsoft.com/office/powerpoint/2010/main" val="3198164349"/>
       </p:ext>
     </p:extLst>
   </p:cSld>
@@ -987,7 +990,10 @@
           <a:bodyPr/>
           <a:lstStyle/>
           <a:p>
-            <a:endParaRPr lang="en-US" dirty="0"/>
+            <a:r>
+              <a:rPr lang="en-US" dirty="0"/>
+              <a:t>1/23/20 Fig. S5</a:t>
+            </a:r>
           </a:p>
         </p:txBody>
       </p:sp>
@@ -1017,7 +1023,7 @@
     </p:spTree>
     <p:extLst>
       <p:ext uri="{BB962C8B-B14F-4D97-AF65-F5344CB8AC3E}">
-        <p14:creationId xmlns:p14="http://schemas.microsoft.com/office/powerpoint/2010/main" val="4283938702"/>
+        <p14:creationId xmlns:p14="http://schemas.microsoft.com/office/powerpoint/2010/main" val="753180207"/>
       </p:ext>
     </p:extLst>
   </p:cSld>
@@ -1076,7 +1082,10 @@
           <a:bodyPr/>
           <a:lstStyle/>
           <a:p>
-            <a:endParaRPr lang="en-US" dirty="0"/>
+            <a:r>
+              <a:rPr lang="en-US" dirty="0"/>
+              <a:t>1/23/20 Fig. S5 – tentative v2 with mu = 7.5</a:t>
+            </a:r>
           </a:p>
         </p:txBody>
       </p:sp>
@@ -1098,6 +1107,276 @@
             <a:fld id="{A697AF77-229E-5D4A-87D0-A949D969F47C}" type="slidenum">
               <a:rPr lang="en-US" smtClean="0"/>
               <a:t>15</a:t>
+            </a:fld>
+            <a:endParaRPr lang="en-US"/>
+          </a:p>
+        </p:txBody>
+      </p:sp>
+    </p:spTree>
+    <p:extLst>
+      <p:ext uri="{BB962C8B-B14F-4D97-AF65-F5344CB8AC3E}">
+        <p14:creationId xmlns:p14="http://schemas.microsoft.com/office/powerpoint/2010/main" val="3971011124"/>
+      </p:ext>
+    </p:extLst>
+  </p:cSld>
+  <p:clrMapOvr>
+    <a:masterClrMapping/>
+  </p:clrMapOvr>
+</p:notes>
+</file>
+
+<file path=ppt/notesSlides/notesSlide16.xml><?xml version="1.0" encoding="utf-8"?>
+<p:notes xmlns:a="http://schemas.openxmlformats.org/drawingml/2006/main" xmlns:r="http://schemas.openxmlformats.org/officeDocument/2006/relationships" xmlns:p="http://schemas.openxmlformats.org/presentationml/2006/main">
+  <p:cSld>
+    <p:spTree>
+      <p:nvGrpSpPr>
+        <p:cNvPr id="1" name=""/>
+        <p:cNvGrpSpPr/>
+        <p:nvPr/>
+      </p:nvGrpSpPr>
+      <p:grpSpPr>
+        <a:xfrm>
+          <a:off x="0" y="0"/>
+          <a:ext cx="0" cy="0"/>
+          <a:chOff x="0" y="0"/>
+          <a:chExt cx="0" cy="0"/>
+        </a:xfrm>
+      </p:grpSpPr>
+      <p:sp>
+        <p:nvSpPr>
+          <p:cNvPr id="2" name="Slide Image Placeholder 1"/>
+          <p:cNvSpPr>
+            <a:spLocks noGrp="1" noRot="1" noChangeAspect="1"/>
+          </p:cNvSpPr>
+          <p:nvPr>
+            <p:ph type="sldImg"/>
+          </p:nvPr>
+        </p:nvSpPr>
+        <p:spPr>
+          <a:xfrm>
+            <a:off x="1544638" y="1143000"/>
+            <a:ext cx="3768725" cy="3086100"/>
+          </a:xfrm>
+        </p:spPr>
+      </p:sp>
+      <p:sp>
+        <p:nvSpPr>
+          <p:cNvPr id="3" name="Notes Placeholder 2"/>
+          <p:cNvSpPr>
+            <a:spLocks noGrp="1"/>
+          </p:cNvSpPr>
+          <p:nvPr>
+            <p:ph type="body" idx="1"/>
+          </p:nvPr>
+        </p:nvSpPr>
+        <p:spPr/>
+        <p:txBody>
+          <a:bodyPr/>
+          <a:lstStyle/>
+          <a:p>
+            <a:r>
+              <a:rPr lang="en-US" dirty="0"/>
+              <a:t>12/06/19 Fig. 5</a:t>
+            </a:r>
+          </a:p>
+        </p:txBody>
+      </p:sp>
+      <p:sp>
+        <p:nvSpPr>
+          <p:cNvPr id="4" name="Slide Number Placeholder 3"/>
+          <p:cNvSpPr>
+            <a:spLocks noGrp="1"/>
+          </p:cNvSpPr>
+          <p:nvPr>
+            <p:ph type="sldNum" sz="quarter" idx="5"/>
+          </p:nvPr>
+        </p:nvSpPr>
+        <p:spPr/>
+        <p:txBody>
+          <a:bodyPr/>
+          <a:lstStyle/>
+          <a:p>
+            <a:fld id="{A697AF77-229E-5D4A-87D0-A949D969F47C}" type="slidenum">
+              <a:rPr lang="en-US" smtClean="0"/>
+              <a:t>16</a:t>
+            </a:fld>
+            <a:endParaRPr lang="en-US"/>
+          </a:p>
+        </p:txBody>
+      </p:sp>
+    </p:spTree>
+    <p:extLst>
+      <p:ext uri="{BB962C8B-B14F-4D97-AF65-F5344CB8AC3E}">
+        <p14:creationId xmlns:p14="http://schemas.microsoft.com/office/powerpoint/2010/main" val="4193511516"/>
+      </p:ext>
+    </p:extLst>
+  </p:cSld>
+  <p:clrMapOvr>
+    <a:masterClrMapping/>
+  </p:clrMapOvr>
+</p:notes>
+</file>
+
+<file path=ppt/notesSlides/notesSlide17.xml><?xml version="1.0" encoding="utf-8"?>
+<p:notes xmlns:a="http://schemas.openxmlformats.org/drawingml/2006/main" xmlns:r="http://schemas.openxmlformats.org/officeDocument/2006/relationships" xmlns:p="http://schemas.openxmlformats.org/presentationml/2006/main">
+  <p:cSld>
+    <p:spTree>
+      <p:nvGrpSpPr>
+        <p:cNvPr id="1" name=""/>
+        <p:cNvGrpSpPr/>
+        <p:nvPr/>
+      </p:nvGrpSpPr>
+      <p:grpSpPr>
+        <a:xfrm>
+          <a:off x="0" y="0"/>
+          <a:ext cx="0" cy="0"/>
+          <a:chOff x="0" y="0"/>
+          <a:chExt cx="0" cy="0"/>
+        </a:xfrm>
+      </p:grpSpPr>
+      <p:sp>
+        <p:nvSpPr>
+          <p:cNvPr id="2" name="Slide Image Placeholder 1"/>
+          <p:cNvSpPr>
+            <a:spLocks noGrp="1" noRot="1" noChangeAspect="1"/>
+          </p:cNvSpPr>
+          <p:nvPr>
+            <p:ph type="sldImg"/>
+          </p:nvPr>
+        </p:nvSpPr>
+        <p:spPr>
+          <a:xfrm>
+            <a:off x="1544638" y="1143000"/>
+            <a:ext cx="3768725" cy="3086100"/>
+          </a:xfrm>
+        </p:spPr>
+      </p:sp>
+      <p:sp>
+        <p:nvSpPr>
+          <p:cNvPr id="3" name="Notes Placeholder 2"/>
+          <p:cNvSpPr>
+            <a:spLocks noGrp="1"/>
+          </p:cNvSpPr>
+          <p:nvPr>
+            <p:ph type="body" idx="1"/>
+          </p:nvPr>
+        </p:nvSpPr>
+        <p:spPr/>
+        <p:txBody>
+          <a:bodyPr/>
+          <a:lstStyle/>
+          <a:p>
+            <a:endParaRPr lang="en-US" dirty="0"/>
+          </a:p>
+        </p:txBody>
+      </p:sp>
+      <p:sp>
+        <p:nvSpPr>
+          <p:cNvPr id="4" name="Slide Number Placeholder 3"/>
+          <p:cNvSpPr>
+            <a:spLocks noGrp="1"/>
+          </p:cNvSpPr>
+          <p:nvPr>
+            <p:ph type="sldNum" sz="quarter" idx="5"/>
+          </p:nvPr>
+        </p:nvSpPr>
+        <p:spPr/>
+        <p:txBody>
+          <a:bodyPr/>
+          <a:lstStyle/>
+          <a:p>
+            <a:fld id="{A697AF77-229E-5D4A-87D0-A949D969F47C}" type="slidenum">
+              <a:rPr lang="en-US" smtClean="0"/>
+              <a:t>17</a:t>
+            </a:fld>
+            <a:endParaRPr lang="en-US"/>
+          </a:p>
+        </p:txBody>
+      </p:sp>
+    </p:spTree>
+    <p:extLst>
+      <p:ext uri="{BB962C8B-B14F-4D97-AF65-F5344CB8AC3E}">
+        <p14:creationId xmlns:p14="http://schemas.microsoft.com/office/powerpoint/2010/main" val="4283938702"/>
+      </p:ext>
+    </p:extLst>
+  </p:cSld>
+  <p:clrMapOvr>
+    <a:masterClrMapping/>
+  </p:clrMapOvr>
+</p:notes>
+</file>
+
+<file path=ppt/notesSlides/notesSlide18.xml><?xml version="1.0" encoding="utf-8"?>
+<p:notes xmlns:a="http://schemas.openxmlformats.org/drawingml/2006/main" xmlns:r="http://schemas.openxmlformats.org/officeDocument/2006/relationships" xmlns:p="http://schemas.openxmlformats.org/presentationml/2006/main">
+  <p:cSld>
+    <p:spTree>
+      <p:nvGrpSpPr>
+        <p:cNvPr id="1" name=""/>
+        <p:cNvGrpSpPr/>
+        <p:nvPr/>
+      </p:nvGrpSpPr>
+      <p:grpSpPr>
+        <a:xfrm>
+          <a:off x="0" y="0"/>
+          <a:ext cx="0" cy="0"/>
+          <a:chOff x="0" y="0"/>
+          <a:chExt cx="0" cy="0"/>
+        </a:xfrm>
+      </p:grpSpPr>
+      <p:sp>
+        <p:nvSpPr>
+          <p:cNvPr id="2" name="Slide Image Placeholder 1"/>
+          <p:cNvSpPr>
+            <a:spLocks noGrp="1" noRot="1" noChangeAspect="1"/>
+          </p:cNvSpPr>
+          <p:nvPr>
+            <p:ph type="sldImg"/>
+          </p:nvPr>
+        </p:nvSpPr>
+        <p:spPr>
+          <a:xfrm>
+            <a:off x="1544638" y="1143000"/>
+            <a:ext cx="3768725" cy="3086100"/>
+          </a:xfrm>
+        </p:spPr>
+      </p:sp>
+      <p:sp>
+        <p:nvSpPr>
+          <p:cNvPr id="3" name="Notes Placeholder 2"/>
+          <p:cNvSpPr>
+            <a:spLocks noGrp="1"/>
+          </p:cNvSpPr>
+          <p:nvPr>
+            <p:ph type="body" idx="1"/>
+          </p:nvPr>
+        </p:nvSpPr>
+        <p:spPr/>
+        <p:txBody>
+          <a:bodyPr/>
+          <a:lstStyle/>
+          <a:p>
+            <a:endParaRPr lang="en-US" dirty="0"/>
+          </a:p>
+        </p:txBody>
+      </p:sp>
+      <p:sp>
+        <p:nvSpPr>
+          <p:cNvPr id="4" name="Slide Number Placeholder 3"/>
+          <p:cNvSpPr>
+            <a:spLocks noGrp="1"/>
+          </p:cNvSpPr>
+          <p:nvPr>
+            <p:ph type="sldNum" sz="quarter" idx="5"/>
+          </p:nvPr>
+        </p:nvSpPr>
+        <p:spPr/>
+        <p:txBody>
+          <a:bodyPr/>
+          <a:lstStyle/>
+          <a:p>
+            <a:fld id="{A697AF77-229E-5D4A-87D0-A949D969F47C}" type="slidenum">
+              <a:rPr lang="en-US" smtClean="0"/>
+              <a:t>18</a:t>
             </a:fld>
             <a:endParaRPr lang="en-US"/>
           </a:p>
@@ -1811,7 +2090,7 @@
           <a:p>
             <a:r>
               <a:rPr lang="en-US" dirty="0"/>
-              <a:t>12/06/19 Fig. S2</a:t>
+              <a:t>1/22/20 Fig. 4, updated with new panels – tentative v2 with mu = 7.5</a:t>
             </a:r>
           </a:p>
         </p:txBody>
@@ -1842,7 +2121,7 @@
     </p:spTree>
     <p:extLst>
       <p:ext uri="{BB962C8B-B14F-4D97-AF65-F5344CB8AC3E}">
-        <p14:creationId xmlns:p14="http://schemas.microsoft.com/office/powerpoint/2010/main" val="282547630"/>
+        <p14:creationId xmlns:p14="http://schemas.microsoft.com/office/powerpoint/2010/main" val="3526039215"/>
       </p:ext>
     </p:extLst>
   </p:cSld>
@@ -1983,7 +2262,7 @@
           <a:p>
             <a:fld id="{AAC8E564-4E2A-8441-940F-9FCAA67208AC}" type="datetimeFigureOut">
               <a:rPr lang="en-US" smtClean="0"/>
-              <a:t>1/23/20</a:t>
+              <a:t>1/24/20</a:t>
             </a:fld>
             <a:endParaRPr lang="en-US"/>
           </a:p>
@@ -2153,7 +2432,7 @@
           <a:p>
             <a:fld id="{AAC8E564-4E2A-8441-940F-9FCAA67208AC}" type="datetimeFigureOut">
               <a:rPr lang="en-US" smtClean="0"/>
-              <a:t>1/23/20</a:t>
+              <a:t>1/24/20</a:t>
             </a:fld>
             <a:endParaRPr lang="en-US"/>
           </a:p>
@@ -2333,7 +2612,7 @@
           <a:p>
             <a:fld id="{AAC8E564-4E2A-8441-940F-9FCAA67208AC}" type="datetimeFigureOut">
               <a:rPr lang="en-US" smtClean="0"/>
-              <a:t>1/23/20</a:t>
+              <a:t>1/24/20</a:t>
             </a:fld>
             <a:endParaRPr lang="en-US"/>
           </a:p>
@@ -2503,7 +2782,7 @@
           <a:p>
             <a:fld id="{AAC8E564-4E2A-8441-940F-9FCAA67208AC}" type="datetimeFigureOut">
               <a:rPr lang="en-US" smtClean="0"/>
-              <a:t>1/23/20</a:t>
+              <a:t>1/24/20</a:t>
             </a:fld>
             <a:endParaRPr lang="en-US"/>
           </a:p>
@@ -2747,7 +3026,7 @@
           <a:p>
             <a:fld id="{AAC8E564-4E2A-8441-940F-9FCAA67208AC}" type="datetimeFigureOut">
               <a:rPr lang="en-US" smtClean="0"/>
-              <a:t>1/23/20</a:t>
+              <a:t>1/24/20</a:t>
             </a:fld>
             <a:endParaRPr lang="en-US"/>
           </a:p>
@@ -2979,7 +3258,7 @@
           <a:p>
             <a:fld id="{AAC8E564-4E2A-8441-940F-9FCAA67208AC}" type="datetimeFigureOut">
               <a:rPr lang="en-US" smtClean="0"/>
-              <a:t>1/23/20</a:t>
+              <a:t>1/24/20</a:t>
             </a:fld>
             <a:endParaRPr lang="en-US"/>
           </a:p>
@@ -3346,7 +3625,7 @@
           <a:p>
             <a:fld id="{AAC8E564-4E2A-8441-940F-9FCAA67208AC}" type="datetimeFigureOut">
               <a:rPr lang="en-US" smtClean="0"/>
-              <a:t>1/23/20</a:t>
+              <a:t>1/24/20</a:t>
             </a:fld>
             <a:endParaRPr lang="en-US"/>
           </a:p>
@@ -3464,7 +3743,7 @@
           <a:p>
             <a:fld id="{AAC8E564-4E2A-8441-940F-9FCAA67208AC}" type="datetimeFigureOut">
               <a:rPr lang="en-US" smtClean="0"/>
-              <a:t>1/23/20</a:t>
+              <a:t>1/24/20</a:t>
             </a:fld>
             <a:endParaRPr lang="en-US"/>
           </a:p>
@@ -3559,7 +3838,7 @@
           <a:p>
             <a:fld id="{AAC8E564-4E2A-8441-940F-9FCAA67208AC}" type="datetimeFigureOut">
               <a:rPr lang="en-US" smtClean="0"/>
-              <a:t>1/23/20</a:t>
+              <a:t>1/24/20</a:t>
             </a:fld>
             <a:endParaRPr lang="en-US"/>
           </a:p>
@@ -3836,7 +4115,7 @@
           <a:p>
             <a:fld id="{AAC8E564-4E2A-8441-940F-9FCAA67208AC}" type="datetimeFigureOut">
               <a:rPr lang="en-US" smtClean="0"/>
-              <a:t>1/23/20</a:t>
+              <a:t>1/24/20</a:t>
             </a:fld>
             <a:endParaRPr lang="en-US"/>
           </a:p>
@@ -4093,7 +4372,7 @@
           <a:p>
             <a:fld id="{AAC8E564-4E2A-8441-940F-9FCAA67208AC}" type="datetimeFigureOut">
               <a:rPr lang="en-US" smtClean="0"/>
-              <a:t>1/23/20</a:t>
+              <a:t>1/24/20</a:t>
             </a:fld>
             <a:endParaRPr lang="en-US"/>
           </a:p>
@@ -4306,7 +4585,7 @@
           <a:p>
             <a:fld id="{AAC8E564-4E2A-8441-940F-9FCAA67208AC}" type="datetimeFigureOut">
               <a:rPr lang="en-US" smtClean="0"/>
-              <a:t>1/23/20</a:t>
+              <a:t>1/24/20</a:t>
             </a:fld>
             <a:endParaRPr lang="en-US"/>
           </a:p>
@@ -4935,6 +5214,477 @@
 </file>
 
 <file path=ppt/slides/slide10.xml><?xml version="1.0" encoding="utf-8"?>
+<p:sld xmlns:a="http://schemas.openxmlformats.org/drawingml/2006/main" xmlns:r="http://schemas.openxmlformats.org/officeDocument/2006/relationships" xmlns:p="http://schemas.openxmlformats.org/presentationml/2006/main">
+  <p:cSld>
+    <p:spTree>
+      <p:nvGrpSpPr>
+        <p:cNvPr id="1" name=""/>
+        <p:cNvGrpSpPr/>
+        <p:nvPr/>
+      </p:nvGrpSpPr>
+      <p:grpSpPr>
+        <a:xfrm>
+          <a:off x="0" y="0"/>
+          <a:ext cx="0" cy="0"/>
+          <a:chOff x="0" y="0"/>
+          <a:chExt cx="0" cy="0"/>
+        </a:xfrm>
+      </p:grpSpPr>
+      <p:grpSp>
+        <p:nvGrpSpPr>
+          <p:cNvPr id="29" name="Group 28">
+            <a:extLst>
+              <a:ext uri="{FF2B5EF4-FFF2-40B4-BE49-F238E27FC236}">
+                <a16:creationId xmlns:a16="http://schemas.microsoft.com/office/drawing/2014/main" id="{FD7843E5-6748-8B44-AF91-AB6E7A64A3E6}"/>
+              </a:ext>
+            </a:extLst>
+          </p:cNvPr>
+          <p:cNvGrpSpPr/>
+          <p:nvPr/>
+        </p:nvGrpSpPr>
+        <p:grpSpPr>
+          <a:xfrm>
+            <a:off x="2272785" y="44423"/>
+            <a:ext cx="3372879" cy="6394504"/>
+            <a:chOff x="2272785" y="88846"/>
+            <a:chExt cx="3372879" cy="6394504"/>
+          </a:xfrm>
+        </p:grpSpPr>
+        <p:pic>
+          <p:nvPicPr>
+            <p:cNvPr id="17" name="Picture 16">
+              <a:extLst>
+                <a:ext uri="{FF2B5EF4-FFF2-40B4-BE49-F238E27FC236}">
+                  <a16:creationId xmlns:a16="http://schemas.microsoft.com/office/drawing/2014/main" id="{A995C0BF-0956-9141-B01A-F70C3C587E44}"/>
+                </a:ext>
+              </a:extLst>
+            </p:cNvPr>
+            <p:cNvPicPr>
+              <a:picLocks noChangeAspect="1"/>
+            </p:cNvPicPr>
+            <p:nvPr/>
+          </p:nvPicPr>
+          <p:blipFill>
+            <a:blip r:embed="rId3"/>
+            <a:stretch>
+              <a:fillRect/>
+            </a:stretch>
+          </p:blipFill>
+          <p:spPr>
+            <a:xfrm>
+              <a:off x="3853734" y="4425950"/>
+              <a:ext cx="1791929" cy="2057400"/>
+            </a:xfrm>
+            <a:prstGeom prst="rect">
+              <a:avLst/>
+            </a:prstGeom>
+          </p:spPr>
+        </p:pic>
+        <p:pic>
+          <p:nvPicPr>
+            <p:cNvPr id="21" name="Picture 20">
+              <a:extLst>
+                <a:ext uri="{FF2B5EF4-FFF2-40B4-BE49-F238E27FC236}">
+                  <a16:creationId xmlns:a16="http://schemas.microsoft.com/office/drawing/2014/main" id="{AEF0F410-3675-C748-BD5A-8DB46D497C86}"/>
+                </a:ext>
+              </a:extLst>
+            </p:cNvPr>
+            <p:cNvPicPr>
+              <a:picLocks noChangeAspect="1"/>
+            </p:cNvPicPr>
+            <p:nvPr/>
+          </p:nvPicPr>
+          <p:blipFill>
+            <a:blip r:embed="rId4"/>
+            <a:stretch>
+              <a:fillRect/>
+            </a:stretch>
+          </p:blipFill>
+          <p:spPr>
+            <a:xfrm>
+              <a:off x="3853735" y="2368550"/>
+              <a:ext cx="1791929" cy="2057400"/>
+            </a:xfrm>
+            <a:prstGeom prst="rect">
+              <a:avLst/>
+            </a:prstGeom>
+          </p:spPr>
+        </p:pic>
+        <p:pic>
+          <p:nvPicPr>
+            <p:cNvPr id="24" name="Picture 23">
+              <a:extLst>
+                <a:ext uri="{FF2B5EF4-FFF2-40B4-BE49-F238E27FC236}">
+                  <a16:creationId xmlns:a16="http://schemas.microsoft.com/office/drawing/2014/main" id="{3D53D49E-E61D-E846-9348-533DE7E0EFC8}"/>
+                </a:ext>
+              </a:extLst>
+            </p:cNvPr>
+            <p:cNvPicPr>
+              <a:picLocks noChangeAspect="1"/>
+            </p:cNvPicPr>
+            <p:nvPr/>
+          </p:nvPicPr>
+          <p:blipFill>
+            <a:blip r:embed="rId5"/>
+            <a:stretch>
+              <a:fillRect/>
+            </a:stretch>
+          </p:blipFill>
+          <p:spPr>
+            <a:xfrm>
+              <a:off x="3853735" y="308405"/>
+              <a:ext cx="1791929" cy="2057400"/>
+            </a:xfrm>
+            <a:prstGeom prst="rect">
+              <a:avLst/>
+            </a:prstGeom>
+          </p:spPr>
+        </p:pic>
+        <p:pic>
+          <p:nvPicPr>
+            <p:cNvPr id="6" name="Picture 5">
+              <a:extLst>
+                <a:ext uri="{FF2B5EF4-FFF2-40B4-BE49-F238E27FC236}">
+                  <a16:creationId xmlns:a16="http://schemas.microsoft.com/office/drawing/2014/main" id="{46E7E66B-0BF6-7B4E-88D3-93B364DF3628}"/>
+                </a:ext>
+              </a:extLst>
+            </p:cNvPr>
+            <p:cNvPicPr>
+              <a:picLocks noChangeAspect="1"/>
+            </p:cNvPicPr>
+            <p:nvPr/>
+          </p:nvPicPr>
+          <p:blipFill>
+            <a:blip r:embed="rId6"/>
+            <a:stretch>
+              <a:fillRect/>
+            </a:stretch>
+          </p:blipFill>
+          <p:spPr>
+            <a:xfrm>
+              <a:off x="2280698" y="308405"/>
+              <a:ext cx="1791929" cy="2057400"/>
+            </a:xfrm>
+            <a:prstGeom prst="rect">
+              <a:avLst/>
+            </a:prstGeom>
+          </p:spPr>
+        </p:pic>
+        <p:pic>
+          <p:nvPicPr>
+            <p:cNvPr id="12" name="Picture 11">
+              <a:extLst>
+                <a:ext uri="{FF2B5EF4-FFF2-40B4-BE49-F238E27FC236}">
+                  <a16:creationId xmlns:a16="http://schemas.microsoft.com/office/drawing/2014/main" id="{94372E33-D038-5B4E-B0EA-F1EEF81CA8A2}"/>
+                </a:ext>
+              </a:extLst>
+            </p:cNvPr>
+            <p:cNvPicPr>
+              <a:picLocks noChangeAspect="1"/>
+            </p:cNvPicPr>
+            <p:nvPr/>
+          </p:nvPicPr>
+          <p:blipFill>
+            <a:blip r:embed="rId7"/>
+            <a:stretch>
+              <a:fillRect/>
+            </a:stretch>
+          </p:blipFill>
+          <p:spPr>
+            <a:xfrm>
+              <a:off x="2272785" y="2371295"/>
+              <a:ext cx="1791929" cy="2057400"/>
+            </a:xfrm>
+            <a:prstGeom prst="rect">
+              <a:avLst/>
+            </a:prstGeom>
+          </p:spPr>
+        </p:pic>
+        <p:pic>
+          <p:nvPicPr>
+            <p:cNvPr id="14" name="Picture 13">
+              <a:extLst>
+                <a:ext uri="{FF2B5EF4-FFF2-40B4-BE49-F238E27FC236}">
+                  <a16:creationId xmlns:a16="http://schemas.microsoft.com/office/drawing/2014/main" id="{2B435101-69AE-5947-B225-8A9E98B0376A}"/>
+                </a:ext>
+              </a:extLst>
+            </p:cNvPr>
+            <p:cNvPicPr>
+              <a:picLocks noChangeAspect="1"/>
+            </p:cNvPicPr>
+            <p:nvPr/>
+          </p:nvPicPr>
+          <p:blipFill>
+            <a:blip r:embed="rId8"/>
+            <a:stretch>
+              <a:fillRect/>
+            </a:stretch>
+          </p:blipFill>
+          <p:spPr>
+            <a:xfrm>
+              <a:off x="2280698" y="4420460"/>
+              <a:ext cx="1791929" cy="2057400"/>
+            </a:xfrm>
+            <a:prstGeom prst="rect">
+              <a:avLst/>
+            </a:prstGeom>
+          </p:spPr>
+        </p:pic>
+        <p:sp>
+          <p:nvSpPr>
+            <p:cNvPr id="20" name="TextBox 19">
+              <a:extLst>
+                <a:ext uri="{FF2B5EF4-FFF2-40B4-BE49-F238E27FC236}">
+                  <a16:creationId xmlns:a16="http://schemas.microsoft.com/office/drawing/2014/main" id="{E8C86BD2-9FE9-8C4D-A835-2EAAEE829653}"/>
+                </a:ext>
+              </a:extLst>
+            </p:cNvPr>
+            <p:cNvSpPr txBox="1"/>
+            <p:nvPr/>
+          </p:nvSpPr>
+          <p:spPr>
+            <a:xfrm>
+              <a:off x="2402223" y="2154488"/>
+              <a:ext cx="353026" cy="276999"/>
+            </a:xfrm>
+            <a:prstGeom prst="rect">
+              <a:avLst/>
+            </a:prstGeom>
+            <a:noFill/>
+          </p:spPr>
+          <p:txBody>
+            <a:bodyPr wrap="square" rtlCol="0">
+              <a:spAutoFit/>
+            </a:bodyPr>
+            <a:lstStyle/>
+            <a:p>
+              <a:pPr algn="ctr"/>
+              <a:r>
+                <a:rPr lang="en-US" sz="1200" b="1" dirty="0">
+                  <a:latin typeface="Helvetica Neue" panose="02000503000000020004" pitchFamily="2" charset="0"/>
+                  <a:ea typeface="Helvetica Neue" panose="02000503000000020004" pitchFamily="2" charset="0"/>
+                  <a:cs typeface="Helvetica Neue" panose="02000503000000020004" pitchFamily="2" charset="0"/>
+                </a:rPr>
+                <a:t>c</a:t>
+              </a:r>
+            </a:p>
+          </p:txBody>
+        </p:sp>
+        <p:sp>
+          <p:nvSpPr>
+            <p:cNvPr id="26" name="TextBox 25">
+              <a:extLst>
+                <a:ext uri="{FF2B5EF4-FFF2-40B4-BE49-F238E27FC236}">
+                  <a16:creationId xmlns:a16="http://schemas.microsoft.com/office/drawing/2014/main" id="{97F12DB8-E9D0-A24B-B88C-7940F2860933}"/>
+                </a:ext>
+              </a:extLst>
+            </p:cNvPr>
+            <p:cNvSpPr txBox="1"/>
+            <p:nvPr/>
+          </p:nvSpPr>
+          <p:spPr>
+            <a:xfrm>
+              <a:off x="3983173" y="2154488"/>
+              <a:ext cx="353026" cy="276999"/>
+            </a:xfrm>
+            <a:prstGeom prst="rect">
+              <a:avLst/>
+            </a:prstGeom>
+            <a:noFill/>
+          </p:spPr>
+          <p:txBody>
+            <a:bodyPr wrap="square" rtlCol="0">
+              <a:spAutoFit/>
+            </a:bodyPr>
+            <a:lstStyle/>
+            <a:p>
+              <a:pPr algn="ctr"/>
+              <a:r>
+                <a:rPr lang="en-US" sz="1200" b="1" dirty="0">
+                  <a:latin typeface="Helvetica Neue" panose="02000503000000020004" pitchFamily="2" charset="0"/>
+                  <a:ea typeface="Helvetica Neue" panose="02000503000000020004" pitchFamily="2" charset="0"/>
+                  <a:cs typeface="Helvetica Neue" panose="02000503000000020004" pitchFamily="2" charset="0"/>
+                </a:rPr>
+                <a:t>d</a:t>
+              </a:r>
+            </a:p>
+          </p:txBody>
+        </p:sp>
+        <p:sp>
+          <p:nvSpPr>
+            <p:cNvPr id="27" name="TextBox 26">
+              <a:extLst>
+                <a:ext uri="{FF2B5EF4-FFF2-40B4-BE49-F238E27FC236}">
+                  <a16:creationId xmlns:a16="http://schemas.microsoft.com/office/drawing/2014/main" id="{FDDE573A-223F-1940-86F7-59778A3EEDBD}"/>
+                </a:ext>
+              </a:extLst>
+            </p:cNvPr>
+            <p:cNvSpPr txBox="1"/>
+            <p:nvPr/>
+          </p:nvSpPr>
+          <p:spPr>
+            <a:xfrm>
+              <a:off x="2402223" y="4203653"/>
+              <a:ext cx="353026" cy="276999"/>
+            </a:xfrm>
+            <a:prstGeom prst="rect">
+              <a:avLst/>
+            </a:prstGeom>
+            <a:noFill/>
+          </p:spPr>
+          <p:txBody>
+            <a:bodyPr wrap="square" rtlCol="0">
+              <a:spAutoFit/>
+            </a:bodyPr>
+            <a:lstStyle/>
+            <a:p>
+              <a:pPr algn="ctr"/>
+              <a:r>
+                <a:rPr lang="en-US" sz="1200" b="1" dirty="0">
+                  <a:latin typeface="Helvetica Neue" panose="02000503000000020004" pitchFamily="2" charset="0"/>
+                  <a:ea typeface="Helvetica Neue" panose="02000503000000020004" pitchFamily="2" charset="0"/>
+                  <a:cs typeface="Helvetica Neue" panose="02000503000000020004" pitchFamily="2" charset="0"/>
+                </a:rPr>
+                <a:t>e</a:t>
+              </a:r>
+            </a:p>
+          </p:txBody>
+        </p:sp>
+        <p:sp>
+          <p:nvSpPr>
+            <p:cNvPr id="28" name="TextBox 27">
+              <a:extLst>
+                <a:ext uri="{FF2B5EF4-FFF2-40B4-BE49-F238E27FC236}">
+                  <a16:creationId xmlns:a16="http://schemas.microsoft.com/office/drawing/2014/main" id="{6C482106-E107-4F4E-B200-7FD0E90E10A9}"/>
+                </a:ext>
+              </a:extLst>
+            </p:cNvPr>
+            <p:cNvSpPr txBox="1"/>
+            <p:nvPr/>
+          </p:nvSpPr>
+          <p:spPr>
+            <a:xfrm>
+              <a:off x="3983173" y="4203653"/>
+              <a:ext cx="353026" cy="276999"/>
+            </a:xfrm>
+            <a:prstGeom prst="rect">
+              <a:avLst/>
+            </a:prstGeom>
+            <a:noFill/>
+          </p:spPr>
+          <p:txBody>
+            <a:bodyPr wrap="square" rtlCol="0">
+              <a:spAutoFit/>
+            </a:bodyPr>
+            <a:lstStyle/>
+            <a:p>
+              <a:pPr algn="ctr"/>
+              <a:r>
+                <a:rPr lang="en-US" sz="1200" b="1" dirty="0">
+                  <a:latin typeface="Helvetica Neue" panose="02000503000000020004" pitchFamily="2" charset="0"/>
+                  <a:ea typeface="Helvetica Neue" panose="02000503000000020004" pitchFamily="2" charset="0"/>
+                  <a:cs typeface="Helvetica Neue" panose="02000503000000020004" pitchFamily="2" charset="0"/>
+                </a:rPr>
+                <a:t>f</a:t>
+              </a:r>
+            </a:p>
+          </p:txBody>
+        </p:sp>
+        <p:sp>
+          <p:nvSpPr>
+            <p:cNvPr id="16" name="TextBox 15">
+              <a:extLst>
+                <a:ext uri="{FF2B5EF4-FFF2-40B4-BE49-F238E27FC236}">
+                  <a16:creationId xmlns:a16="http://schemas.microsoft.com/office/drawing/2014/main" id="{0B8EA217-6F2C-0943-8D48-F70EC12EC200}"/>
+                </a:ext>
+              </a:extLst>
+            </p:cNvPr>
+            <p:cNvSpPr txBox="1"/>
+            <p:nvPr/>
+          </p:nvSpPr>
+          <p:spPr>
+            <a:xfrm>
+              <a:off x="2399287" y="88846"/>
+              <a:ext cx="353026" cy="276999"/>
+            </a:xfrm>
+            <a:prstGeom prst="rect">
+              <a:avLst/>
+            </a:prstGeom>
+            <a:noFill/>
+          </p:spPr>
+          <p:txBody>
+            <a:bodyPr wrap="square" rtlCol="0">
+              <a:spAutoFit/>
+            </a:bodyPr>
+            <a:lstStyle/>
+            <a:p>
+              <a:pPr algn="ctr"/>
+              <a:r>
+                <a:rPr lang="en-US" sz="1200" b="1" dirty="0">
+                  <a:latin typeface="Helvetica Neue" panose="02000503000000020004" pitchFamily="2" charset="0"/>
+                  <a:ea typeface="Helvetica Neue" panose="02000503000000020004" pitchFamily="2" charset="0"/>
+                  <a:cs typeface="Helvetica Neue" panose="02000503000000020004" pitchFamily="2" charset="0"/>
+                </a:rPr>
+                <a:t>a</a:t>
+              </a:r>
+            </a:p>
+          </p:txBody>
+        </p:sp>
+        <p:sp>
+          <p:nvSpPr>
+            <p:cNvPr id="18" name="TextBox 17">
+              <a:extLst>
+                <a:ext uri="{FF2B5EF4-FFF2-40B4-BE49-F238E27FC236}">
+                  <a16:creationId xmlns:a16="http://schemas.microsoft.com/office/drawing/2014/main" id="{46BBEC22-8FD3-4646-AE1A-C6C1C5D5E1E6}"/>
+                </a:ext>
+              </a:extLst>
+            </p:cNvPr>
+            <p:cNvSpPr txBox="1"/>
+            <p:nvPr/>
+          </p:nvSpPr>
+          <p:spPr>
+            <a:xfrm>
+              <a:off x="3983173" y="99363"/>
+              <a:ext cx="353026" cy="276999"/>
+            </a:xfrm>
+            <a:prstGeom prst="rect">
+              <a:avLst/>
+            </a:prstGeom>
+            <a:noFill/>
+          </p:spPr>
+          <p:txBody>
+            <a:bodyPr wrap="square" rtlCol="0">
+              <a:spAutoFit/>
+            </a:bodyPr>
+            <a:lstStyle/>
+            <a:p>
+              <a:pPr algn="ctr"/>
+              <a:r>
+                <a:rPr lang="en-US" sz="1200" b="1" dirty="0">
+                  <a:latin typeface="Helvetica Neue" panose="02000503000000020004" pitchFamily="2" charset="0"/>
+                  <a:ea typeface="Helvetica Neue" panose="02000503000000020004" pitchFamily="2" charset="0"/>
+                  <a:cs typeface="Helvetica Neue" panose="02000503000000020004" pitchFamily="2" charset="0"/>
+                </a:rPr>
+                <a:t>b</a:t>
+              </a:r>
+            </a:p>
+          </p:txBody>
+        </p:sp>
+      </p:grpSp>
+    </p:spTree>
+    <p:extLst>
+      <p:ext uri="{BB962C8B-B14F-4D97-AF65-F5344CB8AC3E}">
+        <p14:creationId xmlns:p14="http://schemas.microsoft.com/office/powerpoint/2010/main" val="3098672393"/>
+      </p:ext>
+    </p:extLst>
+  </p:cSld>
+  <p:clrMapOvr>
+    <a:masterClrMapping/>
+  </p:clrMapOvr>
+</p:sld>
+</file>
+
+<file path=ppt/slides/slide11.xml><?xml version="1.0" encoding="utf-8"?>
 <p:sld xmlns:a="http://schemas.openxmlformats.org/drawingml/2006/main" xmlns:r="http://schemas.openxmlformats.org/officeDocument/2006/relationships" xmlns:p="http://schemas.openxmlformats.org/presentationml/2006/main" show="0">
   <p:cSld>
     <p:spTree>
@@ -5244,7 +5994,317 @@
 </p:sld>
 </file>
 
-<file path=ppt/slides/slide11.xml><?xml version="1.0" encoding="utf-8"?>
+<file path=ppt/slides/slide12.xml><?xml version="1.0" encoding="utf-8"?>
+<p:sld xmlns:a="http://schemas.openxmlformats.org/drawingml/2006/main" xmlns:r="http://schemas.openxmlformats.org/officeDocument/2006/relationships" xmlns:p="http://schemas.openxmlformats.org/presentationml/2006/main" show="0">
+  <p:cSld>
+    <p:spTree>
+      <p:nvGrpSpPr>
+        <p:cNvPr id="1" name=""/>
+        <p:cNvGrpSpPr/>
+        <p:nvPr/>
+      </p:nvGrpSpPr>
+      <p:grpSpPr>
+        <a:xfrm>
+          <a:off x="0" y="0"/>
+          <a:ext cx="0" cy="0"/>
+          <a:chOff x="0" y="0"/>
+          <a:chExt cx="0" cy="0"/>
+        </a:xfrm>
+      </p:grpSpPr>
+      <p:pic>
+        <p:nvPicPr>
+          <p:cNvPr id="3" name="Picture 2">
+            <a:extLst>
+              <a:ext uri="{FF2B5EF4-FFF2-40B4-BE49-F238E27FC236}">
+                <a16:creationId xmlns:a16="http://schemas.microsoft.com/office/drawing/2014/main" id="{1D34154F-0242-1E4D-9474-974BBA7B35F1}"/>
+              </a:ext>
+            </a:extLst>
+          </p:cNvPr>
+          <p:cNvPicPr>
+            <a:picLocks noChangeAspect="1"/>
+          </p:cNvPicPr>
+          <p:nvPr/>
+        </p:nvPicPr>
+        <p:blipFill>
+          <a:blip r:embed="rId3"/>
+          <a:stretch>
+            <a:fillRect/>
+          </a:stretch>
+        </p:blipFill>
+        <p:spPr>
+          <a:xfrm>
+            <a:off x="3803904" y="3383280"/>
+            <a:ext cx="2697480" cy="3097107"/>
+          </a:xfrm>
+          <a:prstGeom prst="rect">
+            <a:avLst/>
+          </a:prstGeom>
+        </p:spPr>
+      </p:pic>
+      <p:pic>
+        <p:nvPicPr>
+          <p:cNvPr id="8" name="Picture 7">
+            <a:extLst>
+              <a:ext uri="{FF2B5EF4-FFF2-40B4-BE49-F238E27FC236}">
+                <a16:creationId xmlns:a16="http://schemas.microsoft.com/office/drawing/2014/main" id="{691E08D1-B0AF-D94A-94B0-FAD75BF79AFC}"/>
+              </a:ext>
+            </a:extLst>
+          </p:cNvPr>
+          <p:cNvPicPr>
+            <a:picLocks noChangeAspect="1"/>
+          </p:cNvPicPr>
+          <p:nvPr/>
+        </p:nvPicPr>
+        <p:blipFill>
+          <a:blip r:embed="rId4"/>
+          <a:stretch>
+            <a:fillRect/>
+          </a:stretch>
+        </p:blipFill>
+        <p:spPr>
+          <a:xfrm>
+            <a:off x="3803904" y="200093"/>
+            <a:ext cx="2697480" cy="3097107"/>
+          </a:xfrm>
+          <a:prstGeom prst="rect">
+            <a:avLst/>
+          </a:prstGeom>
+        </p:spPr>
+      </p:pic>
+      <p:pic>
+        <p:nvPicPr>
+          <p:cNvPr id="11" name="Picture 10">
+            <a:extLst>
+              <a:ext uri="{FF2B5EF4-FFF2-40B4-BE49-F238E27FC236}">
+                <a16:creationId xmlns:a16="http://schemas.microsoft.com/office/drawing/2014/main" id="{71496AD5-497A-064C-B7DA-8CBCCCE889EB}"/>
+              </a:ext>
+            </a:extLst>
+          </p:cNvPr>
+          <p:cNvPicPr>
+            <a:picLocks noChangeAspect="1"/>
+          </p:cNvPicPr>
+          <p:nvPr/>
+        </p:nvPicPr>
+        <p:blipFill>
+          <a:blip r:embed="rId5"/>
+          <a:stretch>
+            <a:fillRect/>
+          </a:stretch>
+        </p:blipFill>
+        <p:spPr>
+          <a:xfrm>
+            <a:off x="1417320" y="200093"/>
+            <a:ext cx="2697480" cy="3097107"/>
+          </a:xfrm>
+          <a:prstGeom prst="rect">
+            <a:avLst/>
+          </a:prstGeom>
+        </p:spPr>
+      </p:pic>
+      <p:pic>
+        <p:nvPicPr>
+          <p:cNvPr id="5" name="Picture 4">
+            <a:extLst>
+              <a:ext uri="{FF2B5EF4-FFF2-40B4-BE49-F238E27FC236}">
+                <a16:creationId xmlns:a16="http://schemas.microsoft.com/office/drawing/2014/main" id="{4DB9EA3A-BE12-064C-A02D-AC63604BB86E}"/>
+              </a:ext>
+            </a:extLst>
+          </p:cNvPr>
+          <p:cNvPicPr>
+            <a:picLocks noChangeAspect="1"/>
+          </p:cNvPicPr>
+          <p:nvPr/>
+        </p:nvPicPr>
+        <p:blipFill>
+          <a:blip r:embed="rId6"/>
+          <a:stretch>
+            <a:fillRect/>
+          </a:stretch>
+        </p:blipFill>
+        <p:spPr>
+          <a:xfrm>
+            <a:off x="1417320" y="3383280"/>
+            <a:ext cx="2697480" cy="3097107"/>
+          </a:xfrm>
+          <a:prstGeom prst="rect">
+            <a:avLst/>
+          </a:prstGeom>
+        </p:spPr>
+      </p:pic>
+      <p:sp>
+        <p:nvSpPr>
+          <p:cNvPr id="18" name="TextBox 17">
+            <a:extLst>
+              <a:ext uri="{FF2B5EF4-FFF2-40B4-BE49-F238E27FC236}">
+                <a16:creationId xmlns:a16="http://schemas.microsoft.com/office/drawing/2014/main" id="{46BBEC22-8FD3-4646-AE1A-C6C1C5D5E1E6}"/>
+              </a:ext>
+            </a:extLst>
+          </p:cNvPr>
+          <p:cNvSpPr txBox="1"/>
+          <p:nvPr/>
+        </p:nvSpPr>
+        <p:spPr>
+          <a:xfrm>
+            <a:off x="3950616" y="-9595"/>
+            <a:ext cx="578784" cy="338554"/>
+          </a:xfrm>
+          <a:prstGeom prst="rect">
+            <a:avLst/>
+          </a:prstGeom>
+          <a:noFill/>
+        </p:spPr>
+        <p:txBody>
+          <a:bodyPr wrap="square" rtlCol="0">
+            <a:spAutoFit/>
+          </a:bodyPr>
+          <a:lstStyle/>
+          <a:p>
+            <a:pPr algn="ctr"/>
+            <a:r>
+              <a:rPr lang="en-US" sz="1600" b="1" dirty="0">
+                <a:latin typeface="Helvetica Neue" panose="02000503000000020004" pitchFamily="2" charset="0"/>
+                <a:ea typeface="Helvetica Neue" panose="02000503000000020004" pitchFamily="2" charset="0"/>
+                <a:cs typeface="Helvetica Neue" panose="02000503000000020004" pitchFamily="2" charset="0"/>
+              </a:rPr>
+              <a:t>b</a:t>
+            </a:r>
+          </a:p>
+        </p:txBody>
+      </p:sp>
+      <p:sp>
+        <p:nvSpPr>
+          <p:cNvPr id="16" name="TextBox 15">
+            <a:extLst>
+              <a:ext uri="{FF2B5EF4-FFF2-40B4-BE49-F238E27FC236}">
+                <a16:creationId xmlns:a16="http://schemas.microsoft.com/office/drawing/2014/main" id="{0B8EA217-6F2C-0943-8D48-F70EC12EC200}"/>
+              </a:ext>
+            </a:extLst>
+          </p:cNvPr>
+          <p:cNvSpPr txBox="1"/>
+          <p:nvPr/>
+        </p:nvSpPr>
+        <p:spPr>
+          <a:xfrm>
+            <a:off x="1577488" y="-9596"/>
+            <a:ext cx="578784" cy="338554"/>
+          </a:xfrm>
+          <a:prstGeom prst="rect">
+            <a:avLst/>
+          </a:prstGeom>
+          <a:noFill/>
+        </p:spPr>
+        <p:txBody>
+          <a:bodyPr wrap="square" rtlCol="0">
+            <a:spAutoFit/>
+          </a:bodyPr>
+          <a:lstStyle/>
+          <a:p>
+            <a:pPr algn="ctr"/>
+            <a:r>
+              <a:rPr lang="en-US" sz="1600" b="1" dirty="0">
+                <a:latin typeface="Helvetica Neue" panose="02000503000000020004" pitchFamily="2" charset="0"/>
+                <a:ea typeface="Helvetica Neue" panose="02000503000000020004" pitchFamily="2" charset="0"/>
+                <a:cs typeface="Helvetica Neue" panose="02000503000000020004" pitchFamily="2" charset="0"/>
+              </a:rPr>
+              <a:t>a</a:t>
+            </a:r>
+          </a:p>
+        </p:txBody>
+      </p:sp>
+      <p:sp>
+        <p:nvSpPr>
+          <p:cNvPr id="20" name="TextBox 19">
+            <a:extLst>
+              <a:ext uri="{FF2B5EF4-FFF2-40B4-BE49-F238E27FC236}">
+                <a16:creationId xmlns:a16="http://schemas.microsoft.com/office/drawing/2014/main" id="{E8C86BD2-9FE9-8C4D-A835-2EAAEE829653}"/>
+              </a:ext>
+            </a:extLst>
+          </p:cNvPr>
+          <p:cNvSpPr txBox="1"/>
+          <p:nvPr/>
+        </p:nvSpPr>
+        <p:spPr>
+          <a:xfrm>
+            <a:off x="1579100" y="3182347"/>
+            <a:ext cx="578784" cy="338554"/>
+          </a:xfrm>
+          <a:prstGeom prst="rect">
+            <a:avLst/>
+          </a:prstGeom>
+          <a:noFill/>
+        </p:spPr>
+        <p:txBody>
+          <a:bodyPr wrap="square" rtlCol="0">
+            <a:spAutoFit/>
+          </a:bodyPr>
+          <a:lstStyle/>
+          <a:p>
+            <a:pPr algn="ctr"/>
+            <a:r>
+              <a:rPr lang="en-US" sz="1600" b="1" dirty="0">
+                <a:latin typeface="Helvetica Neue" panose="02000503000000020004" pitchFamily="2" charset="0"/>
+                <a:ea typeface="Helvetica Neue" panose="02000503000000020004" pitchFamily="2" charset="0"/>
+                <a:cs typeface="Helvetica Neue" panose="02000503000000020004" pitchFamily="2" charset="0"/>
+              </a:rPr>
+              <a:t>c</a:t>
+            </a:r>
+          </a:p>
+        </p:txBody>
+      </p:sp>
+      <p:sp>
+        <p:nvSpPr>
+          <p:cNvPr id="22" name="TextBox 21">
+            <a:extLst>
+              <a:ext uri="{FF2B5EF4-FFF2-40B4-BE49-F238E27FC236}">
+                <a16:creationId xmlns:a16="http://schemas.microsoft.com/office/drawing/2014/main" id="{9CC8A2EA-F668-DD43-A074-9F1F726F28A7}"/>
+              </a:ext>
+            </a:extLst>
+          </p:cNvPr>
+          <p:cNvSpPr txBox="1"/>
+          <p:nvPr/>
+        </p:nvSpPr>
+        <p:spPr>
+          <a:xfrm>
+            <a:off x="3950616" y="3187050"/>
+            <a:ext cx="578784" cy="338554"/>
+          </a:xfrm>
+          <a:prstGeom prst="rect">
+            <a:avLst/>
+          </a:prstGeom>
+          <a:noFill/>
+        </p:spPr>
+        <p:txBody>
+          <a:bodyPr wrap="square" rtlCol="0">
+            <a:spAutoFit/>
+          </a:bodyPr>
+          <a:lstStyle/>
+          <a:p>
+            <a:pPr algn="ctr"/>
+            <a:r>
+              <a:rPr lang="en-US" sz="1600" b="1" dirty="0">
+                <a:latin typeface="Helvetica Neue" panose="02000503000000020004" pitchFamily="2" charset="0"/>
+                <a:ea typeface="Helvetica Neue" panose="02000503000000020004" pitchFamily="2" charset="0"/>
+                <a:cs typeface="Helvetica Neue" panose="02000503000000020004" pitchFamily="2" charset="0"/>
+              </a:rPr>
+              <a:t>d</a:t>
+            </a:r>
+          </a:p>
+        </p:txBody>
+      </p:sp>
+    </p:spTree>
+    <p:extLst>
+      <p:ext uri="{BB962C8B-B14F-4D97-AF65-F5344CB8AC3E}">
+        <p14:creationId xmlns:p14="http://schemas.microsoft.com/office/powerpoint/2010/main" val="3995306834"/>
+      </p:ext>
+    </p:extLst>
+  </p:cSld>
+  <p:clrMapOvr>
+    <a:masterClrMapping/>
+  </p:clrMapOvr>
+</p:sld>
+</file>
+
+<file path=ppt/slides/slide13.xml><?xml version="1.0" encoding="utf-8"?>
 <p:sld xmlns:a="http://schemas.openxmlformats.org/drawingml/2006/main" xmlns:r="http://schemas.openxmlformats.org/officeDocument/2006/relationships" xmlns:p="http://schemas.openxmlformats.org/presentationml/2006/main">
   <p:cSld>
     <p:spTree>
@@ -5293,6 +6353,36 @@
       </p:pic>
       <p:pic>
         <p:nvPicPr>
+          <p:cNvPr id="4" name="Picture 3">
+            <a:extLst>
+              <a:ext uri="{FF2B5EF4-FFF2-40B4-BE49-F238E27FC236}">
+                <a16:creationId xmlns:a16="http://schemas.microsoft.com/office/drawing/2014/main" id="{8CA43508-9EF8-6346-990A-0DE92AAAB6C2}"/>
+              </a:ext>
+            </a:extLst>
+          </p:cNvPr>
+          <p:cNvPicPr>
+            <a:picLocks noChangeAspect="1"/>
+          </p:cNvPicPr>
+          <p:nvPr/>
+        </p:nvPicPr>
+        <p:blipFill>
+          <a:blip r:embed="rId4"/>
+          <a:stretch>
+            <a:fillRect/>
+          </a:stretch>
+        </p:blipFill>
+        <p:spPr>
+          <a:xfrm>
+            <a:off x="1417320" y="3383279"/>
+            <a:ext cx="2697480" cy="3097107"/>
+          </a:xfrm>
+          <a:prstGeom prst="rect">
+            <a:avLst/>
+          </a:prstGeom>
+        </p:spPr>
+      </p:pic>
+      <p:pic>
+        <p:nvPicPr>
           <p:cNvPr id="8" name="Picture 7">
             <a:extLst>
               <a:ext uri="{FF2B5EF4-FFF2-40B4-BE49-F238E27FC236}">
@@ -5306,7 +6396,7 @@
           <p:nvPr/>
         </p:nvPicPr>
         <p:blipFill>
-          <a:blip r:embed="rId4"/>
+          <a:blip r:embed="rId5"/>
           <a:stretch>
             <a:fillRect/>
           </a:stretch>
@@ -5336,36 +6426,6 @@
           <p:nvPr/>
         </p:nvPicPr>
         <p:blipFill>
-          <a:blip r:embed="rId5"/>
-          <a:stretch>
-            <a:fillRect/>
-          </a:stretch>
-        </p:blipFill>
-        <p:spPr>
-          <a:xfrm>
-            <a:off x="1417320" y="200093"/>
-            <a:ext cx="2697480" cy="3097107"/>
-          </a:xfrm>
-          <a:prstGeom prst="rect">
-            <a:avLst/>
-          </a:prstGeom>
-        </p:spPr>
-      </p:pic>
-      <p:pic>
-        <p:nvPicPr>
-          <p:cNvPr id="5" name="Picture 4">
-            <a:extLst>
-              <a:ext uri="{FF2B5EF4-FFF2-40B4-BE49-F238E27FC236}">
-                <a16:creationId xmlns:a16="http://schemas.microsoft.com/office/drawing/2014/main" id="{4DB9EA3A-BE12-064C-A02D-AC63604BB86E}"/>
-              </a:ext>
-            </a:extLst>
-          </p:cNvPr>
-          <p:cNvPicPr>
-            <a:picLocks noChangeAspect="1"/>
-          </p:cNvPicPr>
-          <p:nvPr/>
-        </p:nvPicPr>
-        <p:blipFill>
           <a:blip r:embed="rId6"/>
           <a:stretch>
             <a:fillRect/>
@@ -5373,7 +6433,7 @@
         </p:blipFill>
         <p:spPr>
           <a:xfrm>
-            <a:off x="1417320" y="3383280"/>
+            <a:off x="1417320" y="200093"/>
             <a:ext cx="2697480" cy="3097107"/>
           </a:xfrm>
           <a:prstGeom prst="rect">
@@ -5544,7 +6604,7 @@
     </p:spTree>
     <p:extLst>
       <p:ext uri="{BB962C8B-B14F-4D97-AF65-F5344CB8AC3E}">
-        <p14:creationId xmlns:p14="http://schemas.microsoft.com/office/powerpoint/2010/main" val="3995306834"/>
+        <p14:creationId xmlns:p14="http://schemas.microsoft.com/office/powerpoint/2010/main" val="3807970029"/>
       </p:ext>
     </p:extLst>
   </p:cSld>
@@ -5554,8 +6614,8 @@
 </p:sld>
 </file>
 
-<file path=ppt/slides/slide12.xml><?xml version="1.0" encoding="utf-8"?>
-<p:sld xmlns:a="http://schemas.openxmlformats.org/drawingml/2006/main" xmlns:r="http://schemas.openxmlformats.org/officeDocument/2006/relationships" xmlns:p="http://schemas.openxmlformats.org/presentationml/2006/main">
+<file path=ppt/slides/slide14.xml><?xml version="1.0" encoding="utf-8"?>
+<p:sld xmlns:a="http://schemas.openxmlformats.org/drawingml/2006/main" xmlns:r="http://schemas.openxmlformats.org/officeDocument/2006/relationships" xmlns:p="http://schemas.openxmlformats.org/presentationml/2006/main" show="0">
   <p:cSld>
     <p:spTree>
       <p:nvGrpSpPr>
@@ -5864,7 +6924,317 @@
 </p:sld>
 </file>
 
-<file path=ppt/slides/slide13.xml><?xml version="1.0" encoding="utf-8"?>
+<file path=ppt/slides/slide15.xml><?xml version="1.0" encoding="utf-8"?>
+<p:sld xmlns:a="http://schemas.openxmlformats.org/drawingml/2006/main" xmlns:r="http://schemas.openxmlformats.org/officeDocument/2006/relationships" xmlns:p="http://schemas.openxmlformats.org/presentationml/2006/main">
+  <p:cSld>
+    <p:spTree>
+      <p:nvGrpSpPr>
+        <p:cNvPr id="1" name=""/>
+        <p:cNvGrpSpPr/>
+        <p:nvPr/>
+      </p:nvGrpSpPr>
+      <p:grpSpPr>
+        <a:xfrm>
+          <a:off x="0" y="0"/>
+          <a:ext cx="0" cy="0"/>
+          <a:chOff x="0" y="0"/>
+          <a:chExt cx="0" cy="0"/>
+        </a:xfrm>
+      </p:grpSpPr>
+      <p:pic>
+        <p:nvPicPr>
+          <p:cNvPr id="4" name="Picture 3">
+            <a:extLst>
+              <a:ext uri="{FF2B5EF4-FFF2-40B4-BE49-F238E27FC236}">
+                <a16:creationId xmlns:a16="http://schemas.microsoft.com/office/drawing/2014/main" id="{75F537B3-7AFF-DA4A-A9A1-2CC77F79E372}"/>
+              </a:ext>
+            </a:extLst>
+          </p:cNvPr>
+          <p:cNvPicPr>
+            <a:picLocks noChangeAspect="1"/>
+          </p:cNvPicPr>
+          <p:nvPr/>
+        </p:nvPicPr>
+        <p:blipFill>
+          <a:blip r:embed="rId3"/>
+          <a:stretch>
+            <a:fillRect/>
+          </a:stretch>
+        </p:blipFill>
+        <p:spPr>
+          <a:xfrm>
+            <a:off x="3803904" y="3383279"/>
+            <a:ext cx="2699839" cy="3099816"/>
+          </a:xfrm>
+          <a:prstGeom prst="rect">
+            <a:avLst/>
+          </a:prstGeom>
+        </p:spPr>
+      </p:pic>
+      <p:pic>
+        <p:nvPicPr>
+          <p:cNvPr id="3" name="Picture 2">
+            <a:extLst>
+              <a:ext uri="{FF2B5EF4-FFF2-40B4-BE49-F238E27FC236}">
+                <a16:creationId xmlns:a16="http://schemas.microsoft.com/office/drawing/2014/main" id="{6D80627F-F50C-5948-9E7E-F85D06634E20}"/>
+              </a:ext>
+            </a:extLst>
+          </p:cNvPr>
+          <p:cNvPicPr>
+            <a:picLocks noChangeAspect="1"/>
+          </p:cNvPicPr>
+          <p:nvPr/>
+        </p:nvPicPr>
+        <p:blipFill>
+          <a:blip r:embed="rId4"/>
+          <a:stretch>
+            <a:fillRect/>
+          </a:stretch>
+        </p:blipFill>
+        <p:spPr>
+          <a:xfrm>
+            <a:off x="1417320" y="3383279"/>
+            <a:ext cx="2697480" cy="3097107"/>
+          </a:xfrm>
+          <a:prstGeom prst="rect">
+            <a:avLst/>
+          </a:prstGeom>
+        </p:spPr>
+      </p:pic>
+      <p:pic>
+        <p:nvPicPr>
+          <p:cNvPr id="10" name="Picture 9">
+            <a:extLst>
+              <a:ext uri="{FF2B5EF4-FFF2-40B4-BE49-F238E27FC236}">
+                <a16:creationId xmlns:a16="http://schemas.microsoft.com/office/drawing/2014/main" id="{0789F02C-289C-B44C-A106-C5D9E6B6A068}"/>
+              </a:ext>
+            </a:extLst>
+          </p:cNvPr>
+          <p:cNvPicPr>
+            <a:picLocks noChangeAspect="1"/>
+          </p:cNvPicPr>
+          <p:nvPr/>
+        </p:nvPicPr>
+        <p:blipFill>
+          <a:blip r:embed="rId5"/>
+          <a:stretch>
+            <a:fillRect/>
+          </a:stretch>
+        </p:blipFill>
+        <p:spPr>
+          <a:xfrm>
+            <a:off x="3803904" y="201168"/>
+            <a:ext cx="2697480" cy="3097107"/>
+          </a:xfrm>
+          <a:prstGeom prst="rect">
+            <a:avLst/>
+          </a:prstGeom>
+        </p:spPr>
+      </p:pic>
+      <p:pic>
+        <p:nvPicPr>
+          <p:cNvPr id="13" name="Picture 12">
+            <a:extLst>
+              <a:ext uri="{FF2B5EF4-FFF2-40B4-BE49-F238E27FC236}">
+                <a16:creationId xmlns:a16="http://schemas.microsoft.com/office/drawing/2014/main" id="{B98B9F79-F9E7-C44E-87A8-1F88167319BA}"/>
+              </a:ext>
+            </a:extLst>
+          </p:cNvPr>
+          <p:cNvPicPr>
+            <a:picLocks noChangeAspect="1"/>
+          </p:cNvPicPr>
+          <p:nvPr/>
+        </p:nvPicPr>
+        <p:blipFill>
+          <a:blip r:embed="rId6"/>
+          <a:stretch>
+            <a:fillRect/>
+          </a:stretch>
+        </p:blipFill>
+        <p:spPr>
+          <a:xfrm>
+            <a:off x="1417320" y="201168"/>
+            <a:ext cx="2697480" cy="3097107"/>
+          </a:xfrm>
+          <a:prstGeom prst="rect">
+            <a:avLst/>
+          </a:prstGeom>
+        </p:spPr>
+      </p:pic>
+      <p:sp>
+        <p:nvSpPr>
+          <p:cNvPr id="18" name="TextBox 17">
+            <a:extLst>
+              <a:ext uri="{FF2B5EF4-FFF2-40B4-BE49-F238E27FC236}">
+                <a16:creationId xmlns:a16="http://schemas.microsoft.com/office/drawing/2014/main" id="{46BBEC22-8FD3-4646-AE1A-C6C1C5D5E1E6}"/>
+              </a:ext>
+            </a:extLst>
+          </p:cNvPr>
+          <p:cNvSpPr txBox="1"/>
+          <p:nvPr/>
+        </p:nvSpPr>
+        <p:spPr>
+          <a:xfrm>
+            <a:off x="3950616" y="-9595"/>
+            <a:ext cx="578784" cy="338554"/>
+          </a:xfrm>
+          <a:prstGeom prst="rect">
+            <a:avLst/>
+          </a:prstGeom>
+          <a:noFill/>
+        </p:spPr>
+        <p:txBody>
+          <a:bodyPr wrap="square" rtlCol="0">
+            <a:spAutoFit/>
+          </a:bodyPr>
+          <a:lstStyle/>
+          <a:p>
+            <a:pPr algn="ctr"/>
+            <a:r>
+              <a:rPr lang="en-US" sz="1600" b="1" dirty="0">
+                <a:latin typeface="Helvetica Neue" panose="02000503000000020004" pitchFamily="2" charset="0"/>
+                <a:ea typeface="Helvetica Neue" panose="02000503000000020004" pitchFamily="2" charset="0"/>
+                <a:cs typeface="Helvetica Neue" panose="02000503000000020004" pitchFamily="2" charset="0"/>
+              </a:rPr>
+              <a:t>b</a:t>
+            </a:r>
+          </a:p>
+        </p:txBody>
+      </p:sp>
+      <p:sp>
+        <p:nvSpPr>
+          <p:cNvPr id="16" name="TextBox 15">
+            <a:extLst>
+              <a:ext uri="{FF2B5EF4-FFF2-40B4-BE49-F238E27FC236}">
+                <a16:creationId xmlns:a16="http://schemas.microsoft.com/office/drawing/2014/main" id="{0B8EA217-6F2C-0943-8D48-F70EC12EC200}"/>
+              </a:ext>
+            </a:extLst>
+          </p:cNvPr>
+          <p:cNvSpPr txBox="1"/>
+          <p:nvPr/>
+        </p:nvSpPr>
+        <p:spPr>
+          <a:xfrm>
+            <a:off x="1577488" y="-9596"/>
+            <a:ext cx="578784" cy="338554"/>
+          </a:xfrm>
+          <a:prstGeom prst="rect">
+            <a:avLst/>
+          </a:prstGeom>
+          <a:noFill/>
+        </p:spPr>
+        <p:txBody>
+          <a:bodyPr wrap="square" rtlCol="0">
+            <a:spAutoFit/>
+          </a:bodyPr>
+          <a:lstStyle/>
+          <a:p>
+            <a:pPr algn="ctr"/>
+            <a:r>
+              <a:rPr lang="en-US" sz="1600" b="1" dirty="0">
+                <a:latin typeface="Helvetica Neue" panose="02000503000000020004" pitchFamily="2" charset="0"/>
+                <a:ea typeface="Helvetica Neue" panose="02000503000000020004" pitchFamily="2" charset="0"/>
+                <a:cs typeface="Helvetica Neue" panose="02000503000000020004" pitchFamily="2" charset="0"/>
+              </a:rPr>
+              <a:t>a</a:t>
+            </a:r>
+          </a:p>
+        </p:txBody>
+      </p:sp>
+      <p:sp>
+        <p:nvSpPr>
+          <p:cNvPr id="20" name="TextBox 19">
+            <a:extLst>
+              <a:ext uri="{FF2B5EF4-FFF2-40B4-BE49-F238E27FC236}">
+                <a16:creationId xmlns:a16="http://schemas.microsoft.com/office/drawing/2014/main" id="{E8C86BD2-9FE9-8C4D-A835-2EAAEE829653}"/>
+              </a:ext>
+            </a:extLst>
+          </p:cNvPr>
+          <p:cNvSpPr txBox="1"/>
+          <p:nvPr/>
+        </p:nvSpPr>
+        <p:spPr>
+          <a:xfrm>
+            <a:off x="1579100" y="3182347"/>
+            <a:ext cx="578784" cy="338554"/>
+          </a:xfrm>
+          <a:prstGeom prst="rect">
+            <a:avLst/>
+          </a:prstGeom>
+          <a:noFill/>
+        </p:spPr>
+        <p:txBody>
+          <a:bodyPr wrap="square" rtlCol="0">
+            <a:spAutoFit/>
+          </a:bodyPr>
+          <a:lstStyle/>
+          <a:p>
+            <a:pPr algn="ctr"/>
+            <a:r>
+              <a:rPr lang="en-US" sz="1600" b="1" dirty="0">
+                <a:latin typeface="Helvetica Neue" panose="02000503000000020004" pitchFamily="2" charset="0"/>
+                <a:ea typeface="Helvetica Neue" panose="02000503000000020004" pitchFamily="2" charset="0"/>
+                <a:cs typeface="Helvetica Neue" panose="02000503000000020004" pitchFamily="2" charset="0"/>
+              </a:rPr>
+              <a:t>c</a:t>
+            </a:r>
+          </a:p>
+        </p:txBody>
+      </p:sp>
+      <p:sp>
+        <p:nvSpPr>
+          <p:cNvPr id="22" name="TextBox 21">
+            <a:extLst>
+              <a:ext uri="{FF2B5EF4-FFF2-40B4-BE49-F238E27FC236}">
+                <a16:creationId xmlns:a16="http://schemas.microsoft.com/office/drawing/2014/main" id="{9CC8A2EA-F668-DD43-A074-9F1F726F28A7}"/>
+              </a:ext>
+            </a:extLst>
+          </p:cNvPr>
+          <p:cNvSpPr txBox="1"/>
+          <p:nvPr/>
+        </p:nvSpPr>
+        <p:spPr>
+          <a:xfrm>
+            <a:off x="3950616" y="3187050"/>
+            <a:ext cx="578784" cy="338554"/>
+          </a:xfrm>
+          <a:prstGeom prst="rect">
+            <a:avLst/>
+          </a:prstGeom>
+          <a:noFill/>
+        </p:spPr>
+        <p:txBody>
+          <a:bodyPr wrap="square" rtlCol="0">
+            <a:spAutoFit/>
+          </a:bodyPr>
+          <a:lstStyle/>
+          <a:p>
+            <a:pPr algn="ctr"/>
+            <a:r>
+              <a:rPr lang="en-US" sz="1600" b="1" dirty="0">
+                <a:latin typeface="Helvetica Neue" panose="02000503000000020004" pitchFamily="2" charset="0"/>
+                <a:ea typeface="Helvetica Neue" panose="02000503000000020004" pitchFamily="2" charset="0"/>
+                <a:cs typeface="Helvetica Neue" panose="02000503000000020004" pitchFamily="2" charset="0"/>
+              </a:rPr>
+              <a:t>d</a:t>
+            </a:r>
+          </a:p>
+        </p:txBody>
+      </p:sp>
+    </p:spTree>
+    <p:extLst>
+      <p:ext uri="{BB962C8B-B14F-4D97-AF65-F5344CB8AC3E}">
+        <p14:creationId xmlns:p14="http://schemas.microsoft.com/office/powerpoint/2010/main" val="2352755481"/>
+      </p:ext>
+    </p:extLst>
+  </p:cSld>
+  <p:clrMapOvr>
+    <a:masterClrMapping/>
+  </p:clrMapOvr>
+</p:sld>
+</file>
+
+<file path=ppt/slides/slide16.xml><?xml version="1.0" encoding="utf-8"?>
 <p:sld xmlns:a="http://schemas.openxmlformats.org/drawingml/2006/main" xmlns:r="http://schemas.openxmlformats.org/officeDocument/2006/relationships" xmlns:p="http://schemas.openxmlformats.org/presentationml/2006/main">
   <p:cSld>
     <p:spTree>
@@ -6899,7 +8269,7 @@
 </p:sld>
 </file>
 
-<file path=ppt/slides/slide14.xml><?xml version="1.0" encoding="utf-8"?>
+<file path=ppt/slides/slide17.xml><?xml version="1.0" encoding="utf-8"?>
 <p:sld xmlns:a="http://schemas.openxmlformats.org/drawingml/2006/main" xmlns:r="http://schemas.openxmlformats.org/officeDocument/2006/relationships" xmlns:p="http://schemas.openxmlformats.org/presentationml/2006/main">
   <p:cSld>
     <p:spTree>
@@ -7069,7 +8439,7 @@
 </p:sld>
 </file>
 
-<file path=ppt/slides/slide15.xml><?xml version="1.0" encoding="utf-8"?>
+<file path=ppt/slides/slide18.xml><?xml version="1.0" encoding="utf-8"?>
 <p:sld xmlns:a="http://schemas.openxmlformats.org/drawingml/2006/main" xmlns:r="http://schemas.openxmlformats.org/officeDocument/2006/relationships" xmlns:p="http://schemas.openxmlformats.org/presentationml/2006/main">
   <p:cSld>
     <p:spTree>
@@ -13564,7 +14934,7 @@
 </file>
 
 <file path=ppt/slides/slide8.xml><?xml version="1.0" encoding="utf-8"?>
-<p:sld xmlns:a="http://schemas.openxmlformats.org/drawingml/2006/main" xmlns:r="http://schemas.openxmlformats.org/officeDocument/2006/relationships" xmlns:p="http://schemas.openxmlformats.org/presentationml/2006/main">
+<p:sld xmlns:a="http://schemas.openxmlformats.org/drawingml/2006/main" xmlns:r="http://schemas.openxmlformats.org/officeDocument/2006/relationships" xmlns:p="http://schemas.openxmlformats.org/presentationml/2006/main" show="0">
   <p:cSld>
     <p:spTree>
       <p:nvGrpSpPr>
@@ -15093,12 +16463,162 @@
           <a:chExt cx="0" cy="0"/>
         </a:xfrm>
       </p:grpSpPr>
+      <p:pic>
+        <p:nvPicPr>
+          <p:cNvPr id="7" name="Picture 6">
+            <a:extLst>
+              <a:ext uri="{FF2B5EF4-FFF2-40B4-BE49-F238E27FC236}">
+                <a16:creationId xmlns:a16="http://schemas.microsoft.com/office/drawing/2014/main" id="{6A07BBCF-FFB6-3A44-BD78-B5C9427F1BF6}"/>
+              </a:ext>
+            </a:extLst>
+          </p:cNvPr>
+          <p:cNvPicPr>
+            <a:picLocks noChangeAspect="1"/>
+          </p:cNvPicPr>
+          <p:nvPr/>
+        </p:nvPicPr>
+        <p:blipFill>
+          <a:blip r:embed="rId3"/>
+          <a:stretch>
+            <a:fillRect/>
+          </a:stretch>
+        </p:blipFill>
+        <p:spPr>
+          <a:xfrm>
+            <a:off x="2349566" y="1358437"/>
+            <a:ext cx="3218688" cy="3658399"/>
+          </a:xfrm>
+          <a:prstGeom prst="rect">
+            <a:avLst/>
+          </a:prstGeom>
+        </p:spPr>
+      </p:pic>
+      <p:pic>
+        <p:nvPicPr>
+          <p:cNvPr id="3" name="Picture 2">
+            <a:extLst>
+              <a:ext uri="{FF2B5EF4-FFF2-40B4-BE49-F238E27FC236}">
+                <a16:creationId xmlns:a16="http://schemas.microsoft.com/office/drawing/2014/main" id="{8E2C4C10-D61D-7A48-8089-06C4656570DE}"/>
+              </a:ext>
+            </a:extLst>
+          </p:cNvPr>
+          <p:cNvPicPr>
+            <a:picLocks noChangeAspect="1"/>
+          </p:cNvPicPr>
+          <p:nvPr/>
+        </p:nvPicPr>
+        <p:blipFill>
+          <a:blip r:embed="rId4"/>
+          <a:stretch>
+            <a:fillRect/>
+          </a:stretch>
+        </p:blipFill>
+        <p:spPr>
+          <a:xfrm>
+            <a:off x="106130" y="4059169"/>
+            <a:ext cx="1874520" cy="2152227"/>
+          </a:xfrm>
+          <a:prstGeom prst="rect">
+            <a:avLst/>
+          </a:prstGeom>
+        </p:spPr>
+      </p:pic>
+      <p:pic>
+        <p:nvPicPr>
+          <p:cNvPr id="48" name="Picture 47">
+            <a:extLst>
+              <a:ext uri="{FF2B5EF4-FFF2-40B4-BE49-F238E27FC236}">
+                <a16:creationId xmlns:a16="http://schemas.microsoft.com/office/drawing/2014/main" id="{38A194D1-E0C9-094C-B83D-BE40418D6523}"/>
+              </a:ext>
+            </a:extLst>
+          </p:cNvPr>
+          <p:cNvPicPr>
+            <a:picLocks noChangeAspect="1"/>
+          </p:cNvPicPr>
+          <p:nvPr/>
+        </p:nvPicPr>
+        <p:blipFill>
+          <a:blip r:embed="rId5"/>
+          <a:stretch>
+            <a:fillRect/>
+          </a:stretch>
+        </p:blipFill>
+        <p:spPr>
+          <a:xfrm>
+            <a:off x="5933133" y="4059169"/>
+            <a:ext cx="1874519" cy="2152226"/>
+          </a:xfrm>
+          <a:prstGeom prst="rect">
+            <a:avLst/>
+          </a:prstGeom>
+        </p:spPr>
+      </p:pic>
+      <p:pic>
+        <p:nvPicPr>
+          <p:cNvPr id="46" name="Picture 45">
+            <a:extLst>
+              <a:ext uri="{FF2B5EF4-FFF2-40B4-BE49-F238E27FC236}">
+                <a16:creationId xmlns:a16="http://schemas.microsoft.com/office/drawing/2014/main" id="{02918E79-BF84-2647-9C9E-255736589EDC}"/>
+              </a:ext>
+            </a:extLst>
+          </p:cNvPr>
+          <p:cNvPicPr>
+            <a:picLocks noChangeAspect="1"/>
+          </p:cNvPicPr>
+          <p:nvPr/>
+        </p:nvPicPr>
+        <p:blipFill>
+          <a:blip r:embed="rId6"/>
+          <a:stretch>
+            <a:fillRect/>
+          </a:stretch>
+        </p:blipFill>
+        <p:spPr>
+          <a:xfrm>
+            <a:off x="106130" y="566928"/>
+            <a:ext cx="1874519" cy="2152226"/>
+          </a:xfrm>
+          <a:prstGeom prst="rect">
+            <a:avLst/>
+          </a:prstGeom>
+        </p:spPr>
+      </p:pic>
+      <p:pic>
+        <p:nvPicPr>
+          <p:cNvPr id="31" name="Picture 30">
+            <a:extLst>
+              <a:ext uri="{FF2B5EF4-FFF2-40B4-BE49-F238E27FC236}">
+                <a16:creationId xmlns:a16="http://schemas.microsoft.com/office/drawing/2014/main" id="{88566123-9F40-5849-94F1-E4B63422B96C}"/>
+              </a:ext>
+            </a:extLst>
+          </p:cNvPr>
+          <p:cNvPicPr>
+            <a:picLocks noChangeAspect="1"/>
+          </p:cNvPicPr>
+          <p:nvPr/>
+        </p:nvPicPr>
+        <p:blipFill>
+          <a:blip r:embed="rId7"/>
+          <a:stretch>
+            <a:fillRect/>
+          </a:stretch>
+        </p:blipFill>
+        <p:spPr>
+          <a:xfrm>
+            <a:off x="5931247" y="568824"/>
+            <a:ext cx="1874519" cy="2152226"/>
+          </a:xfrm>
+          <a:prstGeom prst="rect">
+            <a:avLst/>
+          </a:prstGeom>
+        </p:spPr>
+      </p:pic>
       <p:grpSp>
         <p:nvGrpSpPr>
-          <p:cNvPr id="29" name="Group 28">
+          <p:cNvPr id="8" name="Group 7">
             <a:extLst>
               <a:ext uri="{FF2B5EF4-FFF2-40B4-BE49-F238E27FC236}">
-                <a16:creationId xmlns:a16="http://schemas.microsoft.com/office/drawing/2014/main" id="{FD7843E5-6748-8B44-AF91-AB6E7A64A3E6}"/>
+                <a16:creationId xmlns:a16="http://schemas.microsoft.com/office/drawing/2014/main" id="{EDB93B79-28BE-5F45-BEA6-37B27ABDA814}"/>
               </a:ext>
             </a:extLst>
           </p:cNvPr>
@@ -15107,198 +16627,263 @@
         </p:nvGrpSpPr>
         <p:grpSpPr>
           <a:xfrm>
-            <a:off x="2272785" y="44423"/>
-            <a:ext cx="3372879" cy="6394504"/>
-            <a:chOff x="2272785" y="88846"/>
-            <a:chExt cx="3372879" cy="6394504"/>
+            <a:off x="2048480" y="1342881"/>
+            <a:ext cx="3805268" cy="3864694"/>
+            <a:chOff x="2048832" y="1246060"/>
+            <a:chExt cx="3805268" cy="3864694"/>
           </a:xfrm>
         </p:grpSpPr>
-        <p:pic>
-          <p:nvPicPr>
-            <p:cNvPr id="17" name="Picture 16">
+        <p:grpSp>
+          <p:nvGrpSpPr>
+            <p:cNvPr id="32" name="Group 31">
               <a:extLst>
                 <a:ext uri="{FF2B5EF4-FFF2-40B4-BE49-F238E27FC236}">
-                  <a16:creationId xmlns:a16="http://schemas.microsoft.com/office/drawing/2014/main" id="{A995C0BF-0956-9141-B01A-F70C3C587E44}"/>
+                  <a16:creationId xmlns:a16="http://schemas.microsoft.com/office/drawing/2014/main" id="{A68FFD5D-1878-4043-B3D3-6F2FC94FFE78}"/>
                 </a:ext>
               </a:extLst>
             </p:cNvPr>
-            <p:cNvPicPr>
-              <a:picLocks noChangeAspect="1"/>
-            </p:cNvPicPr>
+            <p:cNvGrpSpPr/>
             <p:nvPr/>
-          </p:nvPicPr>
-          <p:blipFill>
-            <a:blip r:embed="rId3"/>
-            <a:stretch>
-              <a:fillRect/>
-            </a:stretch>
-          </p:blipFill>
-          <p:spPr>
+          </p:nvGrpSpPr>
+          <p:grpSpPr>
             <a:xfrm>
-              <a:off x="3853734" y="4425950"/>
-              <a:ext cx="1791929" cy="2057400"/>
+              <a:off x="2081356" y="1348413"/>
+              <a:ext cx="3772744" cy="3762341"/>
+              <a:chOff x="251484" y="-209759"/>
+              <a:chExt cx="6335341" cy="6317870"/>
             </a:xfrm>
-            <a:prstGeom prst="rect">
-              <a:avLst/>
-            </a:prstGeom>
-          </p:spPr>
-        </p:pic>
-        <p:pic>
-          <p:nvPicPr>
-            <p:cNvPr id="21" name="Picture 20">
+          </p:grpSpPr>
+          <p:cxnSp>
+            <p:nvCxnSpPr>
+              <p:cNvPr id="38" name="Straight Arrow Connector 37">
+                <a:extLst>
+                  <a:ext uri="{FF2B5EF4-FFF2-40B4-BE49-F238E27FC236}">
+                    <a16:creationId xmlns:a16="http://schemas.microsoft.com/office/drawing/2014/main" id="{A307D4E4-7D02-4047-8582-E3B4AB21BFB2}"/>
+                  </a:ext>
+                </a:extLst>
+              </p:cNvPr>
+              <p:cNvCxnSpPr>
+                <a:cxnSpLocks/>
+              </p:cNvCxnSpPr>
+              <p:nvPr/>
+            </p:nvCxnSpPr>
+            <p:spPr>
+              <a:xfrm>
+                <a:off x="1311291" y="5654723"/>
+                <a:ext cx="4983990" cy="0"/>
+              </a:xfrm>
+              <a:prstGeom prst="straightConnector1">
+                <a:avLst/>
+              </a:prstGeom>
+              <a:ln w="50800">
+                <a:solidFill>
+                  <a:srgbClr val="C00000"/>
+                </a:solidFill>
+                <a:tailEnd type="triangle"/>
+              </a:ln>
+            </p:spPr>
+            <p:style>
+              <a:lnRef idx="1">
+                <a:schemeClr val="accent1"/>
+              </a:lnRef>
+              <a:fillRef idx="0">
+                <a:schemeClr val="accent1"/>
+              </a:fillRef>
+              <a:effectRef idx="0">
+                <a:schemeClr val="accent1"/>
+              </a:effectRef>
+              <a:fontRef idx="minor">
+                <a:schemeClr val="tx1"/>
+              </a:fontRef>
+            </p:style>
+          </p:cxnSp>
+          <p:sp>
+            <p:nvSpPr>
+              <p:cNvPr id="39" name="TextBox 38">
+                <a:extLst>
+                  <a:ext uri="{FF2B5EF4-FFF2-40B4-BE49-F238E27FC236}">
+                    <a16:creationId xmlns:a16="http://schemas.microsoft.com/office/drawing/2014/main" id="{7A891AFA-F877-6342-9C16-A81ED1CDEF25}"/>
+                  </a:ext>
+                </a:extLst>
+              </p:cNvPr>
+              <p:cNvSpPr txBox="1"/>
+              <p:nvPr/>
+            </p:nvSpPr>
+            <p:spPr>
+              <a:xfrm>
+                <a:off x="1079960" y="5694647"/>
+                <a:ext cx="5506865" cy="413464"/>
+              </a:xfrm>
+              <a:prstGeom prst="rect">
+                <a:avLst/>
+              </a:prstGeom>
+              <a:noFill/>
+            </p:spPr>
+            <p:txBody>
+              <a:bodyPr wrap="square" rtlCol="0">
+                <a:spAutoFit/>
+              </a:bodyPr>
+              <a:lstStyle/>
+              <a:p>
+                <a:pPr algn="ctr"/>
+                <a:r>
+                  <a:rPr lang="en-US" sz="1000" dirty="0">
+                    <a:solidFill>
+                      <a:srgbClr val="C00000"/>
+                    </a:solidFill>
+                    <a:latin typeface="Helvetica Neue" panose="02000503000000020004" pitchFamily="2" charset="0"/>
+                    <a:ea typeface="Helvetica Neue" panose="02000503000000020004" pitchFamily="2" charset="0"/>
+                    <a:cs typeface="Helvetica Neue" panose="02000503000000020004" pitchFamily="2" charset="0"/>
+                  </a:rPr>
+                  <a:t>Individuals become less sensitive to stimuli</a:t>
+                </a:r>
+              </a:p>
+            </p:txBody>
+          </p:sp>
+          <p:cxnSp>
+            <p:nvCxnSpPr>
+              <p:cNvPr id="40" name="Straight Arrow Connector 39">
+                <a:extLst>
+                  <a:ext uri="{FF2B5EF4-FFF2-40B4-BE49-F238E27FC236}">
+                    <a16:creationId xmlns:a16="http://schemas.microsoft.com/office/drawing/2014/main" id="{85D1266F-19AC-0241-AAF6-57849EF30018}"/>
+                  </a:ext>
+                </a:extLst>
+              </p:cNvPr>
+              <p:cNvCxnSpPr>
+                <a:cxnSpLocks/>
+              </p:cNvCxnSpPr>
+              <p:nvPr/>
+            </p:nvCxnSpPr>
+            <p:spPr>
+              <a:xfrm flipV="1">
+                <a:off x="750001" y="440000"/>
+                <a:ext cx="0" cy="4746857"/>
+              </a:xfrm>
+              <a:prstGeom prst="straightConnector1">
+                <a:avLst/>
+              </a:prstGeom>
+              <a:ln w="50800">
+                <a:solidFill>
+                  <a:srgbClr val="C00000"/>
+                </a:solidFill>
+                <a:tailEnd type="triangle"/>
+              </a:ln>
+            </p:spPr>
+            <p:style>
+              <a:lnRef idx="1">
+                <a:schemeClr val="accent1"/>
+              </a:lnRef>
+              <a:fillRef idx="0">
+                <a:schemeClr val="accent1"/>
+              </a:fillRef>
+              <a:effectRef idx="0">
+                <a:schemeClr val="accent1"/>
+              </a:effectRef>
+              <a:fontRef idx="minor">
+                <a:schemeClr val="tx1"/>
+              </a:fontRef>
+            </p:style>
+          </p:cxnSp>
+          <p:sp>
+            <p:nvSpPr>
+              <p:cNvPr id="41" name="TextBox 40">
+                <a:extLst>
+                  <a:ext uri="{FF2B5EF4-FFF2-40B4-BE49-F238E27FC236}">
+                    <a16:creationId xmlns:a16="http://schemas.microsoft.com/office/drawing/2014/main" id="{4D2E4A4A-C872-794A-8C39-528400D778A1}"/>
+                  </a:ext>
+                </a:extLst>
+              </p:cNvPr>
+              <p:cNvSpPr txBox="1"/>
+              <p:nvPr/>
+            </p:nvSpPr>
+            <p:spPr>
+              <a:xfrm rot="16200000">
+                <a:off x="-2604958" y="2646683"/>
+                <a:ext cx="6126348" cy="413464"/>
+              </a:xfrm>
+              <a:prstGeom prst="rect">
+                <a:avLst/>
+              </a:prstGeom>
+              <a:noFill/>
+            </p:spPr>
+            <p:txBody>
+              <a:bodyPr wrap="square" rtlCol="0">
+                <a:spAutoFit/>
+              </a:bodyPr>
+              <a:lstStyle/>
+              <a:p>
+                <a:pPr algn="ctr"/>
+                <a:r>
+                  <a:rPr lang="en-US" sz="1000" dirty="0">
+                    <a:solidFill>
+                      <a:srgbClr val="C00000"/>
+                    </a:solidFill>
+                    <a:latin typeface="Helvetica Neue" panose="02000503000000020004" pitchFamily="2" charset="0"/>
+                    <a:ea typeface="Helvetica Neue" panose="02000503000000020004" pitchFamily="2" charset="0"/>
+                    <a:cs typeface="Helvetica Neue" panose="02000503000000020004" pitchFamily="2" charset="0"/>
+                  </a:rPr>
+                  <a:t>Individuals become more efficient</a:t>
+                </a:r>
+              </a:p>
+            </p:txBody>
+          </p:sp>
+          <p:sp>
+            <p:nvSpPr>
+              <p:cNvPr id="42" name="TextBox 41">
+                <a:extLst>
+                  <a:ext uri="{FF2B5EF4-FFF2-40B4-BE49-F238E27FC236}">
+                    <a16:creationId xmlns:a16="http://schemas.microsoft.com/office/drawing/2014/main" id="{6308A167-A527-214B-9F7E-05AF52A19B71}"/>
+                  </a:ext>
+                </a:extLst>
+              </p:cNvPr>
+              <p:cNvSpPr txBox="1"/>
+              <p:nvPr/>
+            </p:nvSpPr>
+            <p:spPr>
+              <a:xfrm>
+                <a:off x="2575273" y="3953793"/>
+                <a:ext cx="1569713" cy="387622"/>
+              </a:xfrm>
+              <a:prstGeom prst="rect">
+                <a:avLst/>
+              </a:prstGeom>
+              <a:noFill/>
+            </p:spPr>
+            <p:txBody>
+              <a:bodyPr wrap="square" rtlCol="0">
+                <a:spAutoFit/>
+              </a:bodyPr>
+              <a:lstStyle/>
+              <a:p>
+                <a:pPr algn="ctr"/>
+                <a:r>
+                  <a:rPr lang="en-US" sz="900" b="1" dirty="0">
+                    <a:ln w="127">
+                      <a:solidFill>
+                        <a:schemeClr val="bg1">
+                          <a:alpha val="10000"/>
+                        </a:schemeClr>
+                      </a:solidFill>
+                    </a:ln>
+                    <a:solidFill>
+                      <a:srgbClr val="2B4B9B"/>
+                    </a:solidFill>
+                    <a:latin typeface="Helvetica Neue" panose="02000503000000020004" pitchFamily="2" charset="0"/>
+                    <a:ea typeface="Helvetica Neue" panose="02000503000000020004" pitchFamily="2" charset="0"/>
+                    <a:cs typeface="Helvetica Neue" panose="02000503000000020004" pitchFamily="2" charset="0"/>
+                  </a:rPr>
+                  <a:t>Y</a:t>
+                </a:r>
+              </a:p>
+            </p:txBody>
+          </p:sp>
+        </p:grpSp>
+        <p:sp>
+          <p:nvSpPr>
+            <p:cNvPr id="14" name="TextBox 13">
               <a:extLst>
                 <a:ext uri="{FF2B5EF4-FFF2-40B4-BE49-F238E27FC236}">
-                  <a16:creationId xmlns:a16="http://schemas.microsoft.com/office/drawing/2014/main" id="{AEF0F410-3675-C748-BD5A-8DB46D497C86}"/>
-                </a:ext>
-              </a:extLst>
-            </p:cNvPr>
-            <p:cNvPicPr>
-              <a:picLocks noChangeAspect="1"/>
-            </p:cNvPicPr>
-            <p:nvPr/>
-          </p:nvPicPr>
-          <p:blipFill>
-            <a:blip r:embed="rId4"/>
-            <a:stretch>
-              <a:fillRect/>
-            </a:stretch>
-          </p:blipFill>
-          <p:spPr>
-            <a:xfrm>
-              <a:off x="3853735" y="2368550"/>
-              <a:ext cx="1791929" cy="2057400"/>
-            </a:xfrm>
-            <a:prstGeom prst="rect">
-              <a:avLst/>
-            </a:prstGeom>
-          </p:spPr>
-        </p:pic>
-        <p:pic>
-          <p:nvPicPr>
-            <p:cNvPr id="24" name="Picture 23">
-              <a:extLst>
-                <a:ext uri="{FF2B5EF4-FFF2-40B4-BE49-F238E27FC236}">
-                  <a16:creationId xmlns:a16="http://schemas.microsoft.com/office/drawing/2014/main" id="{3D53D49E-E61D-E846-9348-533DE7E0EFC8}"/>
-                </a:ext>
-              </a:extLst>
-            </p:cNvPr>
-            <p:cNvPicPr>
-              <a:picLocks noChangeAspect="1"/>
-            </p:cNvPicPr>
-            <p:nvPr/>
-          </p:nvPicPr>
-          <p:blipFill>
-            <a:blip r:embed="rId5"/>
-            <a:stretch>
-              <a:fillRect/>
-            </a:stretch>
-          </p:blipFill>
-          <p:spPr>
-            <a:xfrm>
-              <a:off x="3853735" y="308405"/>
-              <a:ext cx="1791929" cy="2057400"/>
-            </a:xfrm>
-            <a:prstGeom prst="rect">
-              <a:avLst/>
-            </a:prstGeom>
-          </p:spPr>
-        </p:pic>
-        <p:pic>
-          <p:nvPicPr>
-            <p:cNvPr id="6" name="Picture 5">
-              <a:extLst>
-                <a:ext uri="{FF2B5EF4-FFF2-40B4-BE49-F238E27FC236}">
-                  <a16:creationId xmlns:a16="http://schemas.microsoft.com/office/drawing/2014/main" id="{46E7E66B-0BF6-7B4E-88D3-93B364DF3628}"/>
-                </a:ext>
-              </a:extLst>
-            </p:cNvPr>
-            <p:cNvPicPr>
-              <a:picLocks noChangeAspect="1"/>
-            </p:cNvPicPr>
-            <p:nvPr/>
-          </p:nvPicPr>
-          <p:blipFill>
-            <a:blip r:embed="rId6"/>
-            <a:stretch>
-              <a:fillRect/>
-            </a:stretch>
-          </p:blipFill>
-          <p:spPr>
-            <a:xfrm>
-              <a:off x="2280698" y="308405"/>
-              <a:ext cx="1791929" cy="2057400"/>
-            </a:xfrm>
-            <a:prstGeom prst="rect">
-              <a:avLst/>
-            </a:prstGeom>
-          </p:spPr>
-        </p:pic>
-        <p:pic>
-          <p:nvPicPr>
-            <p:cNvPr id="12" name="Picture 11">
-              <a:extLst>
-                <a:ext uri="{FF2B5EF4-FFF2-40B4-BE49-F238E27FC236}">
-                  <a16:creationId xmlns:a16="http://schemas.microsoft.com/office/drawing/2014/main" id="{94372E33-D038-5B4E-B0EA-F1EEF81CA8A2}"/>
-                </a:ext>
-              </a:extLst>
-            </p:cNvPr>
-            <p:cNvPicPr>
-              <a:picLocks noChangeAspect="1"/>
-            </p:cNvPicPr>
-            <p:nvPr/>
-          </p:nvPicPr>
-          <p:blipFill>
-            <a:blip r:embed="rId7"/>
-            <a:stretch>
-              <a:fillRect/>
-            </a:stretch>
-          </p:blipFill>
-          <p:spPr>
-            <a:xfrm>
-              <a:off x="2272785" y="2371295"/>
-              <a:ext cx="1791929" cy="2057400"/>
-            </a:xfrm>
-            <a:prstGeom prst="rect">
-              <a:avLst/>
-            </a:prstGeom>
-          </p:spPr>
-        </p:pic>
-        <p:pic>
-          <p:nvPicPr>
-            <p:cNvPr id="14" name="Picture 13">
-              <a:extLst>
-                <a:ext uri="{FF2B5EF4-FFF2-40B4-BE49-F238E27FC236}">
-                  <a16:creationId xmlns:a16="http://schemas.microsoft.com/office/drawing/2014/main" id="{2B435101-69AE-5947-B225-8A9E98B0376A}"/>
-                </a:ext>
-              </a:extLst>
-            </p:cNvPr>
-            <p:cNvPicPr>
-              <a:picLocks noChangeAspect="1"/>
-            </p:cNvPicPr>
-            <p:nvPr/>
-          </p:nvPicPr>
-          <p:blipFill>
-            <a:blip r:embed="rId8"/>
-            <a:stretch>
-              <a:fillRect/>
-            </a:stretch>
-          </p:blipFill>
-          <p:spPr>
-            <a:xfrm>
-              <a:off x="2280698" y="4420460"/>
-              <a:ext cx="1791929" cy="2057400"/>
-            </a:xfrm>
-            <a:prstGeom prst="rect">
-              <a:avLst/>
-            </a:prstGeom>
-          </p:spPr>
-        </p:pic>
-        <p:sp>
-          <p:nvSpPr>
-            <p:cNvPr id="20" name="TextBox 19">
-              <a:extLst>
-                <a:ext uri="{FF2B5EF4-FFF2-40B4-BE49-F238E27FC236}">
-                  <a16:creationId xmlns:a16="http://schemas.microsoft.com/office/drawing/2014/main" id="{E8C86BD2-9FE9-8C4D-A835-2EAAEE829653}"/>
+                  <a16:creationId xmlns:a16="http://schemas.microsoft.com/office/drawing/2014/main" id="{FA8196DD-48D5-9049-896A-63BB364405C1}"/>
                 </a:ext>
               </a:extLst>
             </p:cNvPr>
@@ -15306,9 +16891,9 @@
             <p:nvPr/>
           </p:nvSpPr>
           <p:spPr>
-            <a:xfrm>
-              <a:off x="2402223" y="2154488"/>
-              <a:ext cx="353026" cy="276999"/>
+            <a:xfrm flipH="1">
+              <a:off x="2048832" y="1246060"/>
+              <a:ext cx="301752" cy="307777"/>
             </a:xfrm>
             <a:prstGeom prst="rect">
               <a:avLst/>
@@ -15323,87 +16908,7 @@
             <a:p>
               <a:pPr algn="ctr"/>
               <a:r>
-                <a:rPr lang="en-US" sz="1200" b="1" dirty="0">
-                  <a:latin typeface="Helvetica Neue" panose="02000503000000020004" pitchFamily="2" charset="0"/>
-                  <a:ea typeface="Helvetica Neue" panose="02000503000000020004" pitchFamily="2" charset="0"/>
-                  <a:cs typeface="Helvetica Neue" panose="02000503000000020004" pitchFamily="2" charset="0"/>
-                </a:rPr>
-                <a:t>c</a:t>
-              </a:r>
-            </a:p>
-          </p:txBody>
-        </p:sp>
-        <p:sp>
-          <p:nvSpPr>
-            <p:cNvPr id="26" name="TextBox 25">
-              <a:extLst>
-                <a:ext uri="{FF2B5EF4-FFF2-40B4-BE49-F238E27FC236}">
-                  <a16:creationId xmlns:a16="http://schemas.microsoft.com/office/drawing/2014/main" id="{97F12DB8-E9D0-A24B-B88C-7940F2860933}"/>
-                </a:ext>
-              </a:extLst>
-            </p:cNvPr>
-            <p:cNvSpPr txBox="1"/>
-            <p:nvPr/>
-          </p:nvSpPr>
-          <p:spPr>
-            <a:xfrm>
-              <a:off x="3983173" y="2154488"/>
-              <a:ext cx="353026" cy="276999"/>
-            </a:xfrm>
-            <a:prstGeom prst="rect">
-              <a:avLst/>
-            </a:prstGeom>
-            <a:noFill/>
-          </p:spPr>
-          <p:txBody>
-            <a:bodyPr wrap="square" rtlCol="0">
-              <a:spAutoFit/>
-            </a:bodyPr>
-            <a:lstStyle/>
-            <a:p>
-              <a:pPr algn="ctr"/>
-              <a:r>
-                <a:rPr lang="en-US" sz="1200" b="1" dirty="0">
-                  <a:latin typeface="Helvetica Neue" panose="02000503000000020004" pitchFamily="2" charset="0"/>
-                  <a:ea typeface="Helvetica Neue" panose="02000503000000020004" pitchFamily="2" charset="0"/>
-                  <a:cs typeface="Helvetica Neue" panose="02000503000000020004" pitchFamily="2" charset="0"/>
-                </a:rPr>
-                <a:t>d</a:t>
-              </a:r>
-            </a:p>
-          </p:txBody>
-        </p:sp>
-        <p:sp>
-          <p:nvSpPr>
-            <p:cNvPr id="27" name="TextBox 26">
-              <a:extLst>
-                <a:ext uri="{FF2B5EF4-FFF2-40B4-BE49-F238E27FC236}">
-                  <a16:creationId xmlns:a16="http://schemas.microsoft.com/office/drawing/2014/main" id="{FDDE573A-223F-1940-86F7-59778A3EEDBD}"/>
-                </a:ext>
-              </a:extLst>
-            </p:cNvPr>
-            <p:cNvSpPr txBox="1"/>
-            <p:nvPr/>
-          </p:nvSpPr>
-          <p:spPr>
-            <a:xfrm>
-              <a:off x="2402223" y="4203653"/>
-              <a:ext cx="353026" cy="276999"/>
-            </a:xfrm>
-            <a:prstGeom prst="rect">
-              <a:avLst/>
-            </a:prstGeom>
-            <a:noFill/>
-          </p:spPr>
-          <p:txBody>
-            <a:bodyPr wrap="square" rtlCol="0">
-              <a:spAutoFit/>
-            </a:bodyPr>
-            <a:lstStyle/>
-            <a:p>
-              <a:pPr algn="ctr"/>
-              <a:r>
-                <a:rPr lang="en-US" sz="1200" b="1" dirty="0">
+                <a:rPr lang="en-US" sz="1400" b="1" dirty="0">
                   <a:latin typeface="Helvetica Neue" panose="02000503000000020004" pitchFamily="2" charset="0"/>
                   <a:ea typeface="Helvetica Neue" panose="02000503000000020004" pitchFamily="2" charset="0"/>
                   <a:cs typeface="Helvetica Neue" panose="02000503000000020004" pitchFamily="2" charset="0"/>
@@ -15413,131 +16918,1038 @@
             </a:p>
           </p:txBody>
         </p:sp>
-        <p:sp>
-          <p:nvSpPr>
-            <p:cNvPr id="28" name="TextBox 27">
-              <a:extLst>
-                <a:ext uri="{FF2B5EF4-FFF2-40B4-BE49-F238E27FC236}">
-                  <a16:creationId xmlns:a16="http://schemas.microsoft.com/office/drawing/2014/main" id="{6C482106-E107-4F4E-B200-7FD0E90E10A9}"/>
-                </a:ext>
-              </a:extLst>
-            </p:cNvPr>
-            <p:cNvSpPr txBox="1"/>
-            <p:nvPr/>
-          </p:nvSpPr>
-          <p:spPr>
-            <a:xfrm>
-              <a:off x="3983173" y="4203653"/>
-              <a:ext cx="353026" cy="276999"/>
-            </a:xfrm>
-            <a:prstGeom prst="rect">
-              <a:avLst/>
-            </a:prstGeom>
+      </p:grpSp>
+      <p:sp>
+        <p:nvSpPr>
+          <p:cNvPr id="16" name="TextBox 15">
+            <a:extLst>
+              <a:ext uri="{FF2B5EF4-FFF2-40B4-BE49-F238E27FC236}">
+                <a16:creationId xmlns:a16="http://schemas.microsoft.com/office/drawing/2014/main" id="{0B8EA217-6F2C-0943-8D48-F70EC12EC200}"/>
+              </a:ext>
+            </a:extLst>
+          </p:cNvPr>
+          <p:cNvSpPr txBox="1"/>
+          <p:nvPr/>
+        </p:nvSpPr>
+        <p:spPr>
+          <a:xfrm>
+            <a:off x="94486" y="352730"/>
+            <a:ext cx="300582" cy="301752"/>
+          </a:xfrm>
+          <a:prstGeom prst="rect">
+            <a:avLst/>
+          </a:prstGeom>
+          <a:noFill/>
+        </p:spPr>
+        <p:txBody>
+          <a:bodyPr wrap="square" rtlCol="0">
+            <a:spAutoFit/>
+          </a:bodyPr>
+          <a:lstStyle/>
+          <a:p>
+            <a:pPr algn="ctr"/>
+            <a:r>
+              <a:rPr lang="en-US" sz="1400" b="1" dirty="0">
+                <a:latin typeface="Helvetica Neue" panose="02000503000000020004" pitchFamily="2" charset="0"/>
+                <a:ea typeface="Helvetica Neue" panose="02000503000000020004" pitchFamily="2" charset="0"/>
+                <a:cs typeface="Helvetica Neue" panose="02000503000000020004" pitchFamily="2" charset="0"/>
+              </a:rPr>
+              <a:t>a</a:t>
+            </a:r>
+          </a:p>
+        </p:txBody>
+      </p:sp>
+      <p:sp>
+        <p:nvSpPr>
+          <p:cNvPr id="56" name="TextBox 55">
+            <a:extLst>
+              <a:ext uri="{FF2B5EF4-FFF2-40B4-BE49-F238E27FC236}">
+                <a16:creationId xmlns:a16="http://schemas.microsoft.com/office/drawing/2014/main" id="{53F4DC70-1EA9-4149-AFF0-F773D783C706}"/>
+              </a:ext>
+            </a:extLst>
+          </p:cNvPr>
+          <p:cNvSpPr txBox="1"/>
+          <p:nvPr/>
+        </p:nvSpPr>
+        <p:spPr>
+          <a:xfrm>
+            <a:off x="359652" y="389894"/>
+            <a:ext cx="1627632" cy="274320"/>
+          </a:xfrm>
+          <a:prstGeom prst="rect">
+            <a:avLst/>
+          </a:prstGeom>
+          <a:noFill/>
+        </p:spPr>
+        <p:txBody>
+          <a:bodyPr wrap="square" rtlCol="0">
+            <a:spAutoFit/>
+          </a:bodyPr>
+          <a:lstStyle/>
+          <a:p>
+            <a:pPr algn="ctr"/>
+            <a:r>
+              <a:rPr lang="en-US" sz="1100" i="1" dirty="0">
+                <a:solidFill>
+                  <a:srgbClr val="8FB132"/>
+                </a:solidFill>
+                <a:latin typeface="Arial" panose="020B0604020202020204" pitchFamily="34" charset="0"/>
+                <a:ea typeface="Helvetica Neue" panose="02000503000000020004" pitchFamily="2" charset="0"/>
+                <a:cs typeface="Arial" panose="020B0604020202020204" pitchFamily="34" charset="0"/>
+              </a:rPr>
+              <a:t>Downward contagion</a:t>
+            </a:r>
+          </a:p>
+        </p:txBody>
+      </p:sp>
+      <p:sp>
+        <p:nvSpPr>
+          <p:cNvPr id="20" name="TextBox 19">
+            <a:extLst>
+              <a:ext uri="{FF2B5EF4-FFF2-40B4-BE49-F238E27FC236}">
+                <a16:creationId xmlns:a16="http://schemas.microsoft.com/office/drawing/2014/main" id="{E8C86BD2-9FE9-8C4D-A835-2EAAEE829653}"/>
+              </a:ext>
+            </a:extLst>
+          </p:cNvPr>
+          <p:cNvSpPr txBox="1"/>
+          <p:nvPr/>
+        </p:nvSpPr>
+        <p:spPr>
+          <a:xfrm>
+            <a:off x="5917309" y="3844620"/>
+            <a:ext cx="301752" cy="307777"/>
+          </a:xfrm>
+          <a:prstGeom prst="rect">
+            <a:avLst/>
+          </a:prstGeom>
+          <a:noFill/>
+          <a:ln>
             <a:noFill/>
-          </p:spPr>
-          <p:txBody>
-            <a:bodyPr wrap="square" rtlCol="0">
-              <a:spAutoFit/>
-            </a:bodyPr>
-            <a:lstStyle/>
-            <a:p>
-              <a:pPr algn="ctr"/>
-              <a:r>
-                <a:rPr lang="en-US" sz="1200" b="1" dirty="0">
-                  <a:latin typeface="Helvetica Neue" panose="02000503000000020004" pitchFamily="2" charset="0"/>
-                  <a:ea typeface="Helvetica Neue" panose="02000503000000020004" pitchFamily="2" charset="0"/>
-                  <a:cs typeface="Helvetica Neue" panose="02000503000000020004" pitchFamily="2" charset="0"/>
-                </a:rPr>
-                <a:t>f</a:t>
-              </a:r>
-            </a:p>
-          </p:txBody>
-        </p:sp>
-        <p:sp>
-          <p:nvSpPr>
-            <p:cNvPr id="16" name="TextBox 15">
-              <a:extLst>
-                <a:ext uri="{FF2B5EF4-FFF2-40B4-BE49-F238E27FC236}">
-                  <a16:creationId xmlns:a16="http://schemas.microsoft.com/office/drawing/2014/main" id="{0B8EA217-6F2C-0943-8D48-F70EC12EC200}"/>
-                </a:ext>
-              </a:extLst>
-            </p:cNvPr>
-            <p:cNvSpPr txBox="1"/>
-            <p:nvPr/>
-          </p:nvSpPr>
-          <p:spPr>
-            <a:xfrm>
-              <a:off x="2399287" y="88846"/>
-              <a:ext cx="353026" cy="276999"/>
-            </a:xfrm>
-            <a:prstGeom prst="rect">
-              <a:avLst/>
-            </a:prstGeom>
+          </a:ln>
+        </p:spPr>
+        <p:txBody>
+          <a:bodyPr wrap="square" rtlCol="0">
+            <a:spAutoFit/>
+          </a:bodyPr>
+          <a:lstStyle/>
+          <a:p>
+            <a:pPr algn="ctr"/>
+            <a:r>
+              <a:rPr lang="en-US" sz="1400" b="1" dirty="0">
+                <a:latin typeface="Helvetica Neue" panose="02000503000000020004" pitchFamily="2" charset="0"/>
+                <a:ea typeface="Helvetica Neue" panose="02000503000000020004" pitchFamily="2" charset="0"/>
+                <a:cs typeface="Helvetica Neue" panose="02000503000000020004" pitchFamily="2" charset="0"/>
+              </a:rPr>
+              <a:t>d</a:t>
+            </a:r>
+          </a:p>
+        </p:txBody>
+      </p:sp>
+      <p:sp>
+        <p:nvSpPr>
+          <p:cNvPr id="57" name="TextBox 56">
+            <a:extLst>
+              <a:ext uri="{FF2B5EF4-FFF2-40B4-BE49-F238E27FC236}">
+                <a16:creationId xmlns:a16="http://schemas.microsoft.com/office/drawing/2014/main" id="{9E621244-D874-B242-88CF-8CC803F84200}"/>
+              </a:ext>
+            </a:extLst>
+          </p:cNvPr>
+          <p:cNvSpPr txBox="1"/>
+          <p:nvPr/>
+        </p:nvSpPr>
+        <p:spPr>
+          <a:xfrm>
+            <a:off x="6193516" y="3878334"/>
+            <a:ext cx="1627632" cy="261610"/>
+          </a:xfrm>
+          <a:prstGeom prst="rect">
+            <a:avLst/>
+          </a:prstGeom>
+          <a:noFill/>
+        </p:spPr>
+        <p:txBody>
+          <a:bodyPr wrap="square" rtlCol="0">
+            <a:spAutoFit/>
+          </a:bodyPr>
+          <a:lstStyle/>
+          <a:p>
+            <a:pPr algn="ctr"/>
+            <a:r>
+              <a:rPr lang="en-US" sz="1100" i="1" dirty="0">
+                <a:solidFill>
+                  <a:srgbClr val="8FB132"/>
+                </a:solidFill>
+                <a:latin typeface="Arial" panose="020B0604020202020204" pitchFamily="34" charset="0"/>
+                <a:ea typeface="Helvetica Neue" panose="02000503000000020004" pitchFamily="2" charset="0"/>
+                <a:cs typeface="Arial" panose="020B0604020202020204" pitchFamily="34" charset="0"/>
+              </a:rPr>
+              <a:t>Amplification</a:t>
+            </a:r>
+          </a:p>
+        </p:txBody>
+      </p:sp>
+      <p:sp>
+        <p:nvSpPr>
+          <p:cNvPr id="18" name="TextBox 17">
+            <a:extLst>
+              <a:ext uri="{FF2B5EF4-FFF2-40B4-BE49-F238E27FC236}">
+                <a16:creationId xmlns:a16="http://schemas.microsoft.com/office/drawing/2014/main" id="{46BBEC22-8FD3-4646-AE1A-C6C1C5D5E1E6}"/>
+              </a:ext>
+            </a:extLst>
+          </p:cNvPr>
+          <p:cNvSpPr txBox="1"/>
+          <p:nvPr/>
+        </p:nvSpPr>
+        <p:spPr>
+          <a:xfrm>
+            <a:off x="103616" y="3844620"/>
+            <a:ext cx="301752" cy="307777"/>
+          </a:xfrm>
+          <a:prstGeom prst="rect">
+            <a:avLst/>
+          </a:prstGeom>
+          <a:noFill/>
+        </p:spPr>
+        <p:txBody>
+          <a:bodyPr vert="horz" wrap="square" rtlCol="0" anchor="t" anchorCtr="0">
+            <a:spAutoFit/>
+          </a:bodyPr>
+          <a:lstStyle/>
+          <a:p>
+            <a:pPr algn="ctr"/>
+            <a:r>
+              <a:rPr lang="en-US" sz="1400" b="1" dirty="0">
+                <a:latin typeface="Helvetica Neue" panose="02000503000000020004" pitchFamily="2" charset="0"/>
+                <a:ea typeface="Helvetica Neue" panose="02000503000000020004" pitchFamily="2" charset="0"/>
+                <a:cs typeface="Helvetica Neue" panose="02000503000000020004" pitchFamily="2" charset="0"/>
+              </a:rPr>
+              <a:t>c</a:t>
+            </a:r>
+          </a:p>
+        </p:txBody>
+      </p:sp>
+      <p:sp>
+        <p:nvSpPr>
+          <p:cNvPr id="58" name="TextBox 57">
+            <a:extLst>
+              <a:ext uri="{FF2B5EF4-FFF2-40B4-BE49-F238E27FC236}">
+                <a16:creationId xmlns:a16="http://schemas.microsoft.com/office/drawing/2014/main" id="{B8B22680-8FCF-564A-A59A-6339D506D934}"/>
+              </a:ext>
+            </a:extLst>
+          </p:cNvPr>
+          <p:cNvSpPr txBox="1"/>
+          <p:nvPr/>
+        </p:nvSpPr>
+        <p:spPr>
+          <a:xfrm>
+            <a:off x="393356" y="3884814"/>
+            <a:ext cx="1624489" cy="261610"/>
+          </a:xfrm>
+          <a:prstGeom prst="rect">
+            <a:avLst/>
+          </a:prstGeom>
+          <a:noFill/>
+        </p:spPr>
+        <p:txBody>
+          <a:bodyPr wrap="square" rtlCol="0">
+            <a:spAutoFit/>
+          </a:bodyPr>
+          <a:lstStyle>
+            <a:defPPr>
+              <a:defRPr lang="en-US"/>
+            </a:defPPr>
+            <a:lvl1pPr algn="r">
+              <a:defRPr sz="1100" i="1">
+                <a:solidFill>
+                  <a:srgbClr val="8FB132"/>
+                </a:solidFill>
+                <a:latin typeface="Arial" panose="020B0604020202020204" pitchFamily="34" charset="0"/>
+                <a:ea typeface="Helvetica Neue" panose="02000503000000020004" pitchFamily="2" charset="0"/>
+                <a:cs typeface="Arial" panose="020B0604020202020204" pitchFamily="34" charset="0"/>
+              </a:defRPr>
+            </a:lvl1pPr>
+          </a:lstStyle>
+          <a:p>
+            <a:pPr algn="ctr"/>
+            <a:r>
+              <a:rPr lang="en-US" dirty="0"/>
+              <a:t>No effect</a:t>
+            </a:r>
+          </a:p>
+        </p:txBody>
+      </p:sp>
+      <p:sp>
+        <p:nvSpPr>
+          <p:cNvPr id="22" name="TextBox 21">
+            <a:extLst>
+              <a:ext uri="{FF2B5EF4-FFF2-40B4-BE49-F238E27FC236}">
+                <a16:creationId xmlns:a16="http://schemas.microsoft.com/office/drawing/2014/main" id="{9CC8A2EA-F668-DD43-A074-9F1F726F28A7}"/>
+              </a:ext>
+            </a:extLst>
+          </p:cNvPr>
+          <p:cNvSpPr txBox="1"/>
+          <p:nvPr/>
+        </p:nvSpPr>
+        <p:spPr>
+          <a:xfrm>
+            <a:off x="5917309" y="349423"/>
+            <a:ext cx="301752" cy="307777"/>
+          </a:xfrm>
+          <a:prstGeom prst="rect">
+            <a:avLst/>
+          </a:prstGeom>
+          <a:noFill/>
+        </p:spPr>
+        <p:txBody>
+          <a:bodyPr wrap="square" rtlCol="0">
+            <a:spAutoFit/>
+          </a:bodyPr>
+          <a:lstStyle/>
+          <a:p>
+            <a:pPr algn="ctr"/>
+            <a:r>
+              <a:rPr lang="en-US" sz="1400" b="1" dirty="0">
+                <a:latin typeface="Helvetica Neue" panose="02000503000000020004" pitchFamily="2" charset="0"/>
+                <a:ea typeface="Helvetica Neue" panose="02000503000000020004" pitchFamily="2" charset="0"/>
+                <a:cs typeface="Helvetica Neue" panose="02000503000000020004" pitchFamily="2" charset="0"/>
+              </a:rPr>
+              <a:t>b</a:t>
+            </a:r>
+          </a:p>
+        </p:txBody>
+      </p:sp>
+      <p:sp>
+        <p:nvSpPr>
+          <p:cNvPr id="55" name="TextBox 54">
+            <a:extLst>
+              <a:ext uri="{FF2B5EF4-FFF2-40B4-BE49-F238E27FC236}">
+                <a16:creationId xmlns:a16="http://schemas.microsoft.com/office/drawing/2014/main" id="{5523DCC3-C862-8C42-A4DA-E70E20BFB814}"/>
+              </a:ext>
+            </a:extLst>
+          </p:cNvPr>
+          <p:cNvSpPr txBox="1"/>
+          <p:nvPr/>
+        </p:nvSpPr>
+        <p:spPr>
+          <a:xfrm>
+            <a:off x="6193516" y="391387"/>
+            <a:ext cx="1627632" cy="261610"/>
+          </a:xfrm>
+          <a:prstGeom prst="rect">
+            <a:avLst/>
+          </a:prstGeom>
+          <a:noFill/>
+        </p:spPr>
+        <p:txBody>
+          <a:bodyPr wrap="square" rtlCol="0">
+            <a:spAutoFit/>
+          </a:bodyPr>
+          <a:lstStyle/>
+          <a:p>
+            <a:pPr algn="ctr"/>
+            <a:r>
+              <a:rPr lang="en-US" sz="1100" i="1" dirty="0">
+                <a:solidFill>
+                  <a:srgbClr val="8FB132"/>
+                </a:solidFill>
+                <a:latin typeface="Arial" panose="020B0604020202020204" pitchFamily="34" charset="0"/>
+                <a:ea typeface="Helvetica Neue" panose="02000503000000020004" pitchFamily="2" charset="0"/>
+                <a:cs typeface="Arial" panose="020B0604020202020204" pitchFamily="34" charset="0"/>
+              </a:rPr>
+              <a:t>Upward contagion</a:t>
+            </a:r>
+          </a:p>
+        </p:txBody>
+      </p:sp>
+      <p:sp>
+        <p:nvSpPr>
+          <p:cNvPr id="53" name="Arc 52">
+            <a:extLst>
+              <a:ext uri="{FF2B5EF4-FFF2-40B4-BE49-F238E27FC236}">
+                <a16:creationId xmlns:a16="http://schemas.microsoft.com/office/drawing/2014/main" id="{96BD8594-B12F-0B4E-80D0-4C225EE50BD6}"/>
+              </a:ext>
+            </a:extLst>
+          </p:cNvPr>
+          <p:cNvSpPr/>
+          <p:nvPr/>
+        </p:nvSpPr>
+        <p:spPr>
+          <a:xfrm rot="15955859" flipH="1" flipV="1">
+            <a:off x="113555" y="1467748"/>
+            <a:ext cx="2825642" cy="4211975"/>
+          </a:xfrm>
+          <a:prstGeom prst="arc">
+            <a:avLst>
+              <a:gd name="adj1" fmla="val 17934366"/>
+              <a:gd name="adj2" fmla="val 20659825"/>
+            </a:avLst>
+          </a:prstGeom>
+          <a:ln w="12700">
+            <a:solidFill>
+              <a:schemeClr val="bg2">
+                <a:lumMod val="50000"/>
+              </a:schemeClr>
+            </a:solidFill>
+            <a:headEnd type="triangle"/>
+            <a:tailEnd w="lg" len="med"/>
+          </a:ln>
+        </p:spPr>
+        <p:style>
+          <a:lnRef idx="1">
+            <a:schemeClr val="accent1"/>
+          </a:lnRef>
+          <a:fillRef idx="0">
+            <a:schemeClr val="accent1"/>
+          </a:fillRef>
+          <a:effectRef idx="0">
+            <a:schemeClr val="accent1"/>
+          </a:effectRef>
+          <a:fontRef idx="minor">
+            <a:schemeClr val="tx1"/>
+          </a:fontRef>
+        </p:style>
+        <p:txBody>
+          <a:bodyPr rtlCol="0" anchor="ctr"/>
+          <a:lstStyle/>
+          <a:p>
+            <a:pPr algn="ctr"/>
+            <a:endParaRPr lang="en-US"/>
+          </a:p>
+        </p:txBody>
+      </p:sp>
+      <p:sp>
+        <p:nvSpPr>
+          <p:cNvPr id="54" name="Arc 53">
+            <a:extLst>
+              <a:ext uri="{FF2B5EF4-FFF2-40B4-BE49-F238E27FC236}">
+                <a16:creationId xmlns:a16="http://schemas.microsoft.com/office/drawing/2014/main" id="{36C3A527-0618-F84D-BFDC-2B5F3569FFF1}"/>
+              </a:ext>
+            </a:extLst>
+          </p:cNvPr>
+          <p:cNvSpPr/>
+          <p:nvPr/>
+        </p:nvSpPr>
+        <p:spPr>
+          <a:xfrm rot="15881810" flipV="1">
+            <a:off x="4174854" y="3109408"/>
+            <a:ext cx="2134655" cy="2961494"/>
+          </a:xfrm>
+          <a:prstGeom prst="arc">
+            <a:avLst>
+              <a:gd name="adj1" fmla="val 17902212"/>
+              <a:gd name="adj2" fmla="val 20983432"/>
+            </a:avLst>
+          </a:prstGeom>
+          <a:ln w="12700">
+            <a:solidFill>
+              <a:schemeClr val="bg2">
+                <a:lumMod val="50000"/>
+              </a:schemeClr>
+            </a:solidFill>
+            <a:tailEnd type="triangle"/>
+          </a:ln>
+        </p:spPr>
+        <p:style>
+          <a:lnRef idx="1">
+            <a:schemeClr val="accent1"/>
+          </a:lnRef>
+          <a:fillRef idx="0">
+            <a:schemeClr val="accent1"/>
+          </a:fillRef>
+          <a:effectRef idx="0">
+            <a:schemeClr val="accent1"/>
+          </a:effectRef>
+          <a:fontRef idx="minor">
+            <a:schemeClr val="tx1"/>
+          </a:fontRef>
+        </p:style>
+        <p:txBody>
+          <a:bodyPr rtlCol="0" anchor="ctr"/>
+          <a:lstStyle/>
+          <a:p>
+            <a:pPr algn="ctr"/>
+            <a:endParaRPr lang="en-US"/>
+          </a:p>
+        </p:txBody>
+      </p:sp>
+      <p:sp>
+        <p:nvSpPr>
+          <p:cNvPr id="21" name="TextBox 20">
+            <a:extLst>
+              <a:ext uri="{FF2B5EF4-FFF2-40B4-BE49-F238E27FC236}">
+                <a16:creationId xmlns:a16="http://schemas.microsoft.com/office/drawing/2014/main" id="{F8E7F266-7467-FE46-9469-D94B82C96E1B}"/>
+              </a:ext>
+            </a:extLst>
+          </p:cNvPr>
+          <p:cNvSpPr txBox="1"/>
+          <p:nvPr/>
+        </p:nvSpPr>
+        <p:spPr>
+          <a:xfrm>
+            <a:off x="1212182" y="730206"/>
+            <a:ext cx="717463" cy="276999"/>
+          </a:xfrm>
+          <a:prstGeom prst="rect">
+            <a:avLst/>
+          </a:prstGeom>
+          <a:noFill/>
+          <a:ln>
+            <a:solidFill>
+              <a:schemeClr val="tx1"/>
+            </a:solidFill>
+          </a:ln>
+        </p:spPr>
+        <p:txBody>
+          <a:bodyPr wrap="square" rtlCol="0">
+            <a:spAutoFit/>
+          </a:bodyPr>
+          <a:lstStyle/>
+          <a:p>
+            <a:pPr algn="ctr"/>
+            <a:r>
+              <a:rPr lang="en-US" sz="1200" dirty="0">
+                <a:latin typeface="Helvetica" pitchFamily="2" charset="0"/>
+                <a:cs typeface="Arial" panose="020B0604020202020204" pitchFamily="34" charset="0"/>
+              </a:rPr>
+              <a:t>𝛿 = 0.6</a:t>
+            </a:r>
+          </a:p>
+        </p:txBody>
+      </p:sp>
+      <p:sp>
+        <p:nvSpPr>
+          <p:cNvPr id="44" name="TextBox 43">
+            <a:extLst>
+              <a:ext uri="{FF2B5EF4-FFF2-40B4-BE49-F238E27FC236}">
+                <a16:creationId xmlns:a16="http://schemas.microsoft.com/office/drawing/2014/main" id="{54A2134B-5A13-4C49-B96B-9FA335A22955}"/>
+              </a:ext>
+            </a:extLst>
+          </p:cNvPr>
+          <p:cNvSpPr txBox="1"/>
+          <p:nvPr/>
+        </p:nvSpPr>
+        <p:spPr>
+          <a:xfrm>
+            <a:off x="3415972" y="2356427"/>
+            <a:ext cx="1025694" cy="230832"/>
+          </a:xfrm>
+          <a:prstGeom prst="rect">
+            <a:avLst/>
+          </a:prstGeom>
+          <a:noFill/>
+          <a:ln w="3175">
             <a:noFill/>
-          </p:spPr>
-          <p:txBody>
-            <a:bodyPr wrap="square" rtlCol="0">
-              <a:spAutoFit/>
-            </a:bodyPr>
-            <a:lstStyle/>
-            <a:p>
-              <a:pPr algn="ctr"/>
-              <a:r>
-                <a:rPr lang="en-US" sz="1200" b="1" dirty="0">
-                  <a:latin typeface="Helvetica Neue" panose="02000503000000020004" pitchFamily="2" charset="0"/>
-                  <a:ea typeface="Helvetica Neue" panose="02000503000000020004" pitchFamily="2" charset="0"/>
-                  <a:cs typeface="Helvetica Neue" panose="02000503000000020004" pitchFamily="2" charset="0"/>
-                </a:rPr>
-                <a:t>a</a:t>
-              </a:r>
-            </a:p>
-          </p:txBody>
-        </p:sp>
-        <p:sp>
-          <p:nvSpPr>
-            <p:cNvPr id="18" name="TextBox 17">
-              <a:extLst>
-                <a:ext uri="{FF2B5EF4-FFF2-40B4-BE49-F238E27FC236}">
-                  <a16:creationId xmlns:a16="http://schemas.microsoft.com/office/drawing/2014/main" id="{46BBEC22-8FD3-4646-AE1A-C6C1C5D5E1E6}"/>
-                </a:ext>
-              </a:extLst>
-            </p:cNvPr>
-            <p:cNvSpPr txBox="1"/>
-            <p:nvPr/>
-          </p:nvSpPr>
-          <p:spPr>
-            <a:xfrm>
-              <a:off x="3983173" y="99363"/>
-              <a:ext cx="353026" cy="276999"/>
-            </a:xfrm>
-            <a:prstGeom prst="rect">
-              <a:avLst/>
-            </a:prstGeom>
+          </a:ln>
+        </p:spPr>
+        <p:txBody>
+          <a:bodyPr wrap="square" rtlCol="0">
+            <a:spAutoFit/>
+          </a:bodyPr>
+          <a:lstStyle/>
+          <a:p>
+            <a:pPr algn="ctr"/>
+            <a:r>
+              <a:rPr lang="en-US" sz="900" b="1" dirty="0">
+                <a:ln w="127">
+                  <a:solidFill>
+                    <a:schemeClr val="bg1">
+                      <a:alpha val="25000"/>
+                    </a:schemeClr>
+                  </a:solidFill>
+                </a:ln>
+                <a:solidFill>
+                  <a:srgbClr val="E52421"/>
+                </a:solidFill>
+                <a:latin typeface="Helvetica Neue" panose="02000503000000020004" pitchFamily="2" charset="0"/>
+                <a:ea typeface="Helvetica Neue" panose="02000503000000020004" pitchFamily="2" charset="0"/>
+                <a:cs typeface="Helvetica Neue" panose="02000503000000020004" pitchFamily="2" charset="0"/>
+              </a:rPr>
+              <a:t>X</a:t>
+            </a:r>
+          </a:p>
+        </p:txBody>
+      </p:sp>
+      <p:sp>
+        <p:nvSpPr>
+          <p:cNvPr id="52" name="TextBox 51">
+            <a:extLst>
+              <a:ext uri="{FF2B5EF4-FFF2-40B4-BE49-F238E27FC236}">
+                <a16:creationId xmlns:a16="http://schemas.microsoft.com/office/drawing/2014/main" id="{7AFF4DB9-24C9-1045-BC6C-A74414FEB7A7}"/>
+              </a:ext>
+            </a:extLst>
+          </p:cNvPr>
+          <p:cNvSpPr txBox="1"/>
+          <p:nvPr/>
+        </p:nvSpPr>
+        <p:spPr>
+          <a:xfrm>
+            <a:off x="7007332" y="1637391"/>
+            <a:ext cx="717463" cy="276999"/>
+          </a:xfrm>
+          <a:prstGeom prst="rect">
+            <a:avLst/>
+          </a:prstGeom>
+          <a:noFill/>
+          <a:ln>
+            <a:solidFill>
+              <a:schemeClr val="tx1"/>
+            </a:solidFill>
+          </a:ln>
+        </p:spPr>
+        <p:txBody>
+          <a:bodyPr wrap="square" rtlCol="0">
+            <a:spAutoFit/>
+          </a:bodyPr>
+          <a:lstStyle/>
+          <a:p>
+            <a:pPr algn="ctr"/>
+            <a:r>
+              <a:rPr lang="en-US" sz="1200" dirty="0">
+                <a:latin typeface="Helvetica" pitchFamily="2" charset="0"/>
+                <a:cs typeface="Arial" panose="020B0604020202020204" pitchFamily="34" charset="0"/>
+              </a:rPr>
+              <a:t>𝛿 = 1.3</a:t>
+            </a:r>
+          </a:p>
+        </p:txBody>
+      </p:sp>
+      <p:sp>
+        <p:nvSpPr>
+          <p:cNvPr id="51" name="Rectangle 50">
+            <a:extLst>
+              <a:ext uri="{FF2B5EF4-FFF2-40B4-BE49-F238E27FC236}">
+                <a16:creationId xmlns:a16="http://schemas.microsoft.com/office/drawing/2014/main" id="{1EED65E2-CAC8-D44A-B9C1-7B997B275260}"/>
+              </a:ext>
+            </a:extLst>
+          </p:cNvPr>
+          <p:cNvSpPr/>
+          <p:nvPr/>
+        </p:nvSpPr>
+        <p:spPr>
+          <a:xfrm>
+            <a:off x="84613" y="342441"/>
+            <a:ext cx="1920240" cy="2286000"/>
+          </a:xfrm>
+          <a:prstGeom prst="rect">
+            <a:avLst/>
+          </a:prstGeom>
+          <a:noFill/>
+          <a:ln w="12700">
+            <a:solidFill>
+              <a:schemeClr val="bg2">
+                <a:lumMod val="50000"/>
+              </a:schemeClr>
+            </a:solidFill>
+          </a:ln>
+        </p:spPr>
+        <p:style>
+          <a:lnRef idx="2">
+            <a:schemeClr val="accent1">
+              <a:shade val="50000"/>
+            </a:schemeClr>
+          </a:lnRef>
+          <a:fillRef idx="1">
+            <a:schemeClr val="accent1"/>
+          </a:fillRef>
+          <a:effectRef idx="0">
+            <a:schemeClr val="accent1"/>
+          </a:effectRef>
+          <a:fontRef idx="minor">
+            <a:schemeClr val="lt1"/>
+          </a:fontRef>
+        </p:style>
+        <p:txBody>
+          <a:bodyPr rtlCol="0" anchor="ctr"/>
+          <a:lstStyle/>
+          <a:p>
+            <a:pPr algn="ctr"/>
+            <a:endParaRPr lang="en-US" dirty="0"/>
+          </a:p>
+        </p:txBody>
+      </p:sp>
+      <p:sp>
+        <p:nvSpPr>
+          <p:cNvPr id="60" name="Rectangle 59">
+            <a:extLst>
+              <a:ext uri="{FF2B5EF4-FFF2-40B4-BE49-F238E27FC236}">
+                <a16:creationId xmlns:a16="http://schemas.microsoft.com/office/drawing/2014/main" id="{F68E48F6-57D3-DB42-ADBB-6699B2CD20E5}"/>
+              </a:ext>
+            </a:extLst>
+          </p:cNvPr>
+          <p:cNvSpPr/>
+          <p:nvPr/>
+        </p:nvSpPr>
+        <p:spPr>
+          <a:xfrm>
+            <a:off x="97605" y="3844620"/>
+            <a:ext cx="1920240" cy="2286000"/>
+          </a:xfrm>
+          <a:prstGeom prst="rect">
+            <a:avLst/>
+          </a:prstGeom>
+          <a:noFill/>
+          <a:ln w="12700">
+            <a:solidFill>
+              <a:schemeClr val="bg2">
+                <a:lumMod val="50000"/>
+              </a:schemeClr>
+            </a:solidFill>
+          </a:ln>
+        </p:spPr>
+        <p:style>
+          <a:lnRef idx="2">
+            <a:schemeClr val="accent1">
+              <a:shade val="50000"/>
+            </a:schemeClr>
+          </a:lnRef>
+          <a:fillRef idx="1">
+            <a:schemeClr val="accent1"/>
+          </a:fillRef>
+          <a:effectRef idx="0">
+            <a:schemeClr val="accent1"/>
+          </a:effectRef>
+          <a:fontRef idx="minor">
+            <a:schemeClr val="lt1"/>
+          </a:fontRef>
+        </p:style>
+        <p:txBody>
+          <a:bodyPr rtlCol="0" anchor="ctr"/>
+          <a:lstStyle/>
+          <a:p>
+            <a:pPr algn="ctr"/>
+            <a:endParaRPr lang="en-US" dirty="0"/>
+          </a:p>
+        </p:txBody>
+      </p:sp>
+      <p:sp>
+        <p:nvSpPr>
+          <p:cNvPr id="62" name="Rectangle 61">
+            <a:extLst>
+              <a:ext uri="{FF2B5EF4-FFF2-40B4-BE49-F238E27FC236}">
+                <a16:creationId xmlns:a16="http://schemas.microsoft.com/office/drawing/2014/main" id="{8A4AC4DA-3820-F543-A555-74C76CC7262E}"/>
+              </a:ext>
+            </a:extLst>
+          </p:cNvPr>
+          <p:cNvSpPr/>
+          <p:nvPr/>
+        </p:nvSpPr>
+        <p:spPr>
+          <a:xfrm>
+            <a:off x="5908387" y="3844620"/>
+            <a:ext cx="1920240" cy="2286000"/>
+          </a:xfrm>
+          <a:prstGeom prst="rect">
+            <a:avLst/>
+          </a:prstGeom>
+          <a:noFill/>
+          <a:ln w="12700">
+            <a:solidFill>
+              <a:schemeClr val="bg2">
+                <a:lumMod val="50000"/>
+              </a:schemeClr>
+            </a:solidFill>
+          </a:ln>
+        </p:spPr>
+        <p:style>
+          <a:lnRef idx="2">
+            <a:schemeClr val="accent1">
+              <a:shade val="50000"/>
+            </a:schemeClr>
+          </a:lnRef>
+          <a:fillRef idx="1">
+            <a:schemeClr val="accent1"/>
+          </a:fillRef>
+          <a:effectRef idx="0">
+            <a:schemeClr val="accent1"/>
+          </a:effectRef>
+          <a:fontRef idx="minor">
+            <a:schemeClr val="lt1"/>
+          </a:fontRef>
+        </p:style>
+        <p:txBody>
+          <a:bodyPr rtlCol="0" anchor="ctr"/>
+          <a:lstStyle/>
+          <a:p>
+            <a:pPr algn="ctr"/>
+            <a:endParaRPr lang="en-US" dirty="0"/>
+          </a:p>
+        </p:txBody>
+      </p:sp>
+      <p:sp>
+        <p:nvSpPr>
+          <p:cNvPr id="63" name="TextBox 62">
+            <a:extLst>
+              <a:ext uri="{FF2B5EF4-FFF2-40B4-BE49-F238E27FC236}">
+                <a16:creationId xmlns:a16="http://schemas.microsoft.com/office/drawing/2014/main" id="{EED5CF09-CA70-FD46-9C33-2D9E067F1BA9}"/>
+              </a:ext>
+            </a:extLst>
+          </p:cNvPr>
+          <p:cNvSpPr txBox="1"/>
+          <p:nvPr/>
+        </p:nvSpPr>
+        <p:spPr>
+          <a:xfrm>
+            <a:off x="4764570" y="3400165"/>
+            <a:ext cx="1025694" cy="230832"/>
+          </a:xfrm>
+          <a:prstGeom prst="rect">
+            <a:avLst/>
+          </a:prstGeom>
+          <a:noFill/>
+          <a:ln w="3175">
             <a:noFill/>
-          </p:spPr>
-          <p:txBody>
-            <a:bodyPr wrap="square" rtlCol="0">
-              <a:spAutoFit/>
-            </a:bodyPr>
-            <a:lstStyle/>
-            <a:p>
-              <a:pPr algn="ctr"/>
-              <a:r>
-                <a:rPr lang="en-US" sz="1200" b="1" dirty="0">
-                  <a:latin typeface="Helvetica Neue" panose="02000503000000020004" pitchFamily="2" charset="0"/>
-                  <a:ea typeface="Helvetica Neue" panose="02000503000000020004" pitchFamily="2" charset="0"/>
-                  <a:cs typeface="Helvetica Neue" panose="02000503000000020004" pitchFamily="2" charset="0"/>
-                </a:rPr>
-                <a:t>b</a:t>
-              </a:r>
-            </a:p>
-          </p:txBody>
-        </p:sp>
-      </p:grpSp>
+          </a:ln>
+        </p:spPr>
+        <p:txBody>
+          <a:bodyPr wrap="square" rtlCol="0">
+            <a:spAutoFit/>
+          </a:bodyPr>
+          <a:lstStyle/>
+          <a:p>
+            <a:pPr algn="ctr"/>
+            <a:r>
+              <a:rPr lang="en-US" sz="900" b="1" dirty="0">
+                <a:ln w="127">
+                  <a:solidFill>
+                    <a:schemeClr val="bg1">
+                      <a:alpha val="25000"/>
+                    </a:schemeClr>
+                  </a:solidFill>
+                </a:ln>
+                <a:solidFill>
+                  <a:srgbClr val="E52421"/>
+                </a:solidFill>
+                <a:latin typeface="Helvetica Neue" panose="02000503000000020004" pitchFamily="2" charset="0"/>
+                <a:ea typeface="Helvetica Neue" panose="02000503000000020004" pitchFamily="2" charset="0"/>
+                <a:cs typeface="Helvetica Neue" panose="02000503000000020004" pitchFamily="2" charset="0"/>
+              </a:rPr>
+              <a:t>X</a:t>
+            </a:r>
+          </a:p>
+        </p:txBody>
+      </p:sp>
+      <p:sp>
+        <p:nvSpPr>
+          <p:cNvPr id="64" name="TextBox 63">
+            <a:extLst>
+              <a:ext uri="{FF2B5EF4-FFF2-40B4-BE49-F238E27FC236}">
+                <a16:creationId xmlns:a16="http://schemas.microsoft.com/office/drawing/2014/main" id="{9F91AD4C-33F0-194C-8CD1-1D29F375FF9B}"/>
+              </a:ext>
+            </a:extLst>
+          </p:cNvPr>
+          <p:cNvSpPr txBox="1"/>
+          <p:nvPr/>
+        </p:nvSpPr>
+        <p:spPr>
+          <a:xfrm>
+            <a:off x="2742311" y="4183791"/>
+            <a:ext cx="1025694" cy="230832"/>
+          </a:xfrm>
+          <a:prstGeom prst="rect">
+            <a:avLst/>
+          </a:prstGeom>
+          <a:noFill/>
+          <a:ln w="3175">
+            <a:noFill/>
+          </a:ln>
+        </p:spPr>
+        <p:txBody>
+          <a:bodyPr wrap="square" rtlCol="0">
+            <a:spAutoFit/>
+          </a:bodyPr>
+          <a:lstStyle/>
+          <a:p>
+            <a:pPr algn="ctr"/>
+            <a:r>
+              <a:rPr lang="en-US" sz="900" b="1" dirty="0">
+                <a:ln w="127">
+                  <a:solidFill>
+                    <a:schemeClr val="bg1">
+                      <a:alpha val="25000"/>
+                    </a:schemeClr>
+                  </a:solidFill>
+                </a:ln>
+                <a:solidFill>
+                  <a:srgbClr val="E52421"/>
+                </a:solidFill>
+                <a:latin typeface="Helvetica Neue" panose="02000503000000020004" pitchFamily="2" charset="0"/>
+                <a:ea typeface="Helvetica Neue" panose="02000503000000020004" pitchFamily="2" charset="0"/>
+                <a:cs typeface="Helvetica Neue" panose="02000503000000020004" pitchFamily="2" charset="0"/>
+              </a:rPr>
+              <a:t>X</a:t>
+            </a:r>
+          </a:p>
+        </p:txBody>
+      </p:sp>
+      <p:sp>
+        <p:nvSpPr>
+          <p:cNvPr id="65" name="Arc 64">
+            <a:extLst>
+              <a:ext uri="{FF2B5EF4-FFF2-40B4-BE49-F238E27FC236}">
+                <a16:creationId xmlns:a16="http://schemas.microsoft.com/office/drawing/2014/main" id="{D4F6CE0C-62B2-994E-AB70-9EAC359E3381}"/>
+              </a:ext>
+            </a:extLst>
+          </p:cNvPr>
+          <p:cNvSpPr/>
+          <p:nvPr/>
+        </p:nvSpPr>
+        <p:spPr>
+          <a:xfrm rot="19482238">
+            <a:off x="-6274009" y="1931534"/>
+            <a:ext cx="11886935" cy="9254234"/>
+          </a:xfrm>
+          <a:prstGeom prst="arc">
+            <a:avLst>
+              <a:gd name="adj1" fmla="val 19828561"/>
+              <a:gd name="adj2" fmla="val 21039881"/>
+            </a:avLst>
+          </a:prstGeom>
+          <a:ln w="12700">
+            <a:solidFill>
+              <a:schemeClr val="bg2">
+                <a:lumMod val="50000"/>
+              </a:schemeClr>
+            </a:solidFill>
+            <a:tailEnd type="triangle" w="med" len="med"/>
+          </a:ln>
+        </p:spPr>
+        <p:style>
+          <a:lnRef idx="1">
+            <a:schemeClr val="accent1"/>
+          </a:lnRef>
+          <a:fillRef idx="0">
+            <a:schemeClr val="accent1"/>
+          </a:fillRef>
+          <a:effectRef idx="0">
+            <a:schemeClr val="accent1"/>
+          </a:effectRef>
+          <a:fontRef idx="minor">
+            <a:schemeClr val="tx1"/>
+          </a:fontRef>
+        </p:style>
+        <p:txBody>
+          <a:bodyPr rtlCol="0" anchor="ctr"/>
+          <a:lstStyle/>
+          <a:p>
+            <a:pPr algn="ctr"/>
+            <a:endParaRPr lang="en-US"/>
+          </a:p>
+        </p:txBody>
+      </p:sp>
+      <p:sp>
+        <p:nvSpPr>
+          <p:cNvPr id="66" name="Arc 65">
+            <a:extLst>
+              <a:ext uri="{FF2B5EF4-FFF2-40B4-BE49-F238E27FC236}">
+                <a16:creationId xmlns:a16="http://schemas.microsoft.com/office/drawing/2014/main" id="{C5B100A3-711E-1F4D-8DB4-61253E8D594C}"/>
+              </a:ext>
+            </a:extLst>
+          </p:cNvPr>
+          <p:cNvSpPr/>
+          <p:nvPr/>
+        </p:nvSpPr>
+        <p:spPr>
+          <a:xfrm rot="16362014" flipH="1" flipV="1">
+            <a:off x="979238" y="-3110150"/>
+            <a:ext cx="4974975" cy="6243740"/>
+          </a:xfrm>
+          <a:prstGeom prst="arc">
+            <a:avLst>
+              <a:gd name="adj1" fmla="val 18035080"/>
+              <a:gd name="adj2" fmla="val 20697222"/>
+            </a:avLst>
+          </a:prstGeom>
+          <a:ln w="12700">
+            <a:solidFill>
+              <a:schemeClr val="bg2">
+                <a:lumMod val="50000"/>
+              </a:schemeClr>
+            </a:solidFill>
+            <a:headEnd type="none"/>
+            <a:tailEnd type="triangle" w="med" len="med"/>
+          </a:ln>
+        </p:spPr>
+        <p:style>
+          <a:lnRef idx="1">
+            <a:schemeClr val="accent1"/>
+          </a:lnRef>
+          <a:fillRef idx="0">
+            <a:schemeClr val="accent1"/>
+          </a:fillRef>
+          <a:effectRef idx="0">
+            <a:schemeClr val="accent1"/>
+          </a:effectRef>
+          <a:fontRef idx="minor">
+            <a:schemeClr val="tx1"/>
+          </a:fontRef>
+        </p:style>
+        <p:txBody>
+          <a:bodyPr rtlCol="0" anchor="ctr"/>
+          <a:lstStyle/>
+          <a:p>
+            <a:pPr algn="ctr"/>
+            <a:endParaRPr lang="en-US"/>
+          </a:p>
+        </p:txBody>
+      </p:sp>
+      <p:sp>
+        <p:nvSpPr>
+          <p:cNvPr id="61" name="Rectangle 60">
+            <a:extLst>
+              <a:ext uri="{FF2B5EF4-FFF2-40B4-BE49-F238E27FC236}">
+                <a16:creationId xmlns:a16="http://schemas.microsoft.com/office/drawing/2014/main" id="{31703D9A-C85C-6C4E-91AB-5551ADBABA49}"/>
+              </a:ext>
+            </a:extLst>
+          </p:cNvPr>
+          <p:cNvSpPr/>
+          <p:nvPr/>
+        </p:nvSpPr>
+        <p:spPr>
+          <a:xfrm>
+            <a:off x="5908399" y="342441"/>
+            <a:ext cx="1920240" cy="2286000"/>
+          </a:xfrm>
+          <a:prstGeom prst="rect">
+            <a:avLst/>
+          </a:prstGeom>
+          <a:noFill/>
+          <a:ln w="12700">
+            <a:solidFill>
+              <a:schemeClr val="bg2">
+                <a:lumMod val="50000"/>
+              </a:schemeClr>
+            </a:solidFill>
+          </a:ln>
+        </p:spPr>
+        <p:style>
+          <a:lnRef idx="2">
+            <a:schemeClr val="accent1">
+              <a:shade val="50000"/>
+            </a:schemeClr>
+          </a:lnRef>
+          <a:fillRef idx="1">
+            <a:schemeClr val="accent1"/>
+          </a:fillRef>
+          <a:effectRef idx="0">
+            <a:schemeClr val="accent1"/>
+          </a:effectRef>
+          <a:fontRef idx="minor">
+            <a:schemeClr val="lt1"/>
+          </a:fontRef>
+        </p:style>
+        <p:txBody>
+          <a:bodyPr rtlCol="0" anchor="ctr"/>
+          <a:lstStyle/>
+          <a:p>
+            <a:pPr algn="ctr"/>
+            <a:endParaRPr lang="en-US" dirty="0"/>
+          </a:p>
+        </p:txBody>
+      </p:sp>
     </p:spTree>
     <p:extLst>
       <p:ext uri="{BB962C8B-B14F-4D97-AF65-F5344CB8AC3E}">
-        <p14:creationId xmlns:p14="http://schemas.microsoft.com/office/powerpoint/2010/main" val="3098672393"/>
+        <p14:creationId xmlns:p14="http://schemas.microsoft.com/office/powerpoint/2010/main" val="3758596749"/>
       </p:ext>
     </p:extLst>
   </p:cSld>

</xml_diff>

<commit_message>
minor updates on figures
</commit_message>
<xml_diff>
--- a/slides/figures_191206.pptx
+++ b/slides/figures_191206.pptx
@@ -6,7 +6,7 @@
     <p:sldMasterId id="2147483696" r:id="rId2"/>
   </p:sldMasterIdLst>
   <p:notesMasterIdLst>
-    <p:notesMasterId r:id="rId28"/>
+    <p:notesMasterId r:id="rId29"/>
   </p:notesMasterIdLst>
   <p:sldIdLst>
     <p:sldId id="256" r:id="rId3"/>
@@ -22,18 +22,19 @@
     <p:sldId id="276" r:id="rId13"/>
     <p:sldId id="279" r:id="rId14"/>
     <p:sldId id="259" r:id="rId15"/>
-    <p:sldId id="260" r:id="rId16"/>
-    <p:sldId id="269" r:id="rId17"/>
-    <p:sldId id="271" r:id="rId18"/>
-    <p:sldId id="270" r:id="rId19"/>
-    <p:sldId id="272" r:id="rId20"/>
-    <p:sldId id="265" r:id="rId21"/>
-    <p:sldId id="274" r:id="rId22"/>
-    <p:sldId id="275" r:id="rId23"/>
-    <p:sldId id="277" r:id="rId24"/>
-    <p:sldId id="278" r:id="rId25"/>
-    <p:sldId id="266" r:id="rId26"/>
-    <p:sldId id="267" r:id="rId27"/>
+    <p:sldId id="281" r:id="rId16"/>
+    <p:sldId id="260" r:id="rId17"/>
+    <p:sldId id="269" r:id="rId18"/>
+    <p:sldId id="271" r:id="rId19"/>
+    <p:sldId id="270" r:id="rId20"/>
+    <p:sldId id="272" r:id="rId21"/>
+    <p:sldId id="265" r:id="rId22"/>
+    <p:sldId id="274" r:id="rId23"/>
+    <p:sldId id="275" r:id="rId24"/>
+    <p:sldId id="277" r:id="rId25"/>
+    <p:sldId id="278" r:id="rId26"/>
+    <p:sldId id="266" r:id="rId27"/>
+    <p:sldId id="267" r:id="rId28"/>
   </p:sldIdLst>
   <p:sldSz cx="7918450" cy="6483350"/>
   <p:notesSz cx="6858000" cy="9144000"/>
@@ -222,7 +223,7 @@
           <a:p>
             <a:fld id="{5E7D9203-8D15-1F45-AFEF-29CE894B8122}" type="datetimeFigureOut">
               <a:rPr lang="en-US" smtClean="0"/>
-              <a:t>2/8/20</a:t>
+              <a:t>2/14/20</a:t>
             </a:fld>
             <a:endParaRPr lang="en-US"/>
           </a:p>
@@ -908,7 +909,7 @@
           <a:p>
             <a:r>
               <a:rPr lang="en-US" dirty="0"/>
-              <a:t>12/06/19 Fig. S4</a:t>
+              <a:t>2/14/20 Fig. S2</a:t>
             </a:r>
           </a:p>
         </p:txBody>
@@ -939,7 +940,7 @@
     </p:spTree>
     <p:extLst>
       <p:ext uri="{BB962C8B-B14F-4D97-AF65-F5344CB8AC3E}">
-        <p14:creationId xmlns:p14="http://schemas.microsoft.com/office/powerpoint/2010/main" val="561168434"/>
+        <p14:creationId xmlns:p14="http://schemas.microsoft.com/office/powerpoint/2010/main" val="4108603185"/>
       </p:ext>
     </p:extLst>
   </p:cSld>
@@ -1000,7 +1001,7 @@
           <a:p>
             <a:r>
               <a:rPr lang="en-US" dirty="0"/>
-              <a:t>1/23/20 Fig. S4</a:t>
+              <a:t>12/06/19 Fig. S4</a:t>
             </a:r>
           </a:p>
         </p:txBody>
@@ -1031,7 +1032,7 @@
     </p:spTree>
     <p:extLst>
       <p:ext uri="{BB962C8B-B14F-4D97-AF65-F5344CB8AC3E}">
-        <p14:creationId xmlns:p14="http://schemas.microsoft.com/office/powerpoint/2010/main" val="733968849"/>
+        <p14:creationId xmlns:p14="http://schemas.microsoft.com/office/powerpoint/2010/main" val="561168434"/>
       </p:ext>
     </p:extLst>
   </p:cSld>
@@ -1092,7 +1093,7 @@
           <a:p>
             <a:r>
               <a:rPr lang="en-US" dirty="0"/>
-              <a:t>2/8/20 Fig. S4 – tentative v2 with mu = 7.5</a:t>
+              <a:t>1/23/20 Fig. S4</a:t>
             </a:r>
           </a:p>
         </p:txBody>
@@ -1123,7 +1124,7 @@
     </p:spTree>
     <p:extLst>
       <p:ext uri="{BB962C8B-B14F-4D97-AF65-F5344CB8AC3E}">
-        <p14:creationId xmlns:p14="http://schemas.microsoft.com/office/powerpoint/2010/main" val="3198164349"/>
+        <p14:creationId xmlns:p14="http://schemas.microsoft.com/office/powerpoint/2010/main" val="733968849"/>
       </p:ext>
     </p:extLst>
   </p:cSld>
@@ -1184,7 +1185,7 @@
           <a:p>
             <a:r>
               <a:rPr lang="en-US" dirty="0"/>
-              <a:t>1/23/20 Fig. S5</a:t>
+              <a:t>2/8/20 Fig. S4 – tentative v2 with mu = 7.5</a:t>
             </a:r>
           </a:p>
         </p:txBody>
@@ -1215,7 +1216,7 @@
     </p:spTree>
     <p:extLst>
       <p:ext uri="{BB962C8B-B14F-4D97-AF65-F5344CB8AC3E}">
-        <p14:creationId xmlns:p14="http://schemas.microsoft.com/office/powerpoint/2010/main" val="753180207"/>
+        <p14:creationId xmlns:p14="http://schemas.microsoft.com/office/powerpoint/2010/main" val="3198164349"/>
       </p:ext>
     </p:extLst>
   </p:cSld>
@@ -1276,7 +1277,7 @@
           <a:p>
             <a:r>
               <a:rPr lang="en-US" dirty="0"/>
-              <a:t>1/23/20 Fig. S5 – tentative v2 with mu = 7.5</a:t>
+              <a:t>1/23/20 Fig. S5</a:t>
             </a:r>
           </a:p>
         </p:txBody>
@@ -1307,7 +1308,7 @@
     </p:spTree>
     <p:extLst>
       <p:ext uri="{BB962C8B-B14F-4D97-AF65-F5344CB8AC3E}">
-        <p14:creationId xmlns:p14="http://schemas.microsoft.com/office/powerpoint/2010/main" val="3971011124"/>
+        <p14:creationId xmlns:p14="http://schemas.microsoft.com/office/powerpoint/2010/main" val="753180207"/>
       </p:ext>
     </p:extLst>
   </p:cSld>
@@ -1368,7 +1369,7 @@
           <a:p>
             <a:r>
               <a:rPr lang="en-US" dirty="0"/>
-              <a:t>12/06/19 Fig. 5</a:t>
+              <a:t>1/23/20 Fig. S5 – tentative v2 with mu = 7.5</a:t>
             </a:r>
           </a:p>
         </p:txBody>
@@ -1399,7 +1400,7 @@
     </p:spTree>
     <p:extLst>
       <p:ext uri="{BB962C8B-B14F-4D97-AF65-F5344CB8AC3E}">
-        <p14:creationId xmlns:p14="http://schemas.microsoft.com/office/powerpoint/2010/main" val="4193511516"/>
+        <p14:creationId xmlns:p14="http://schemas.microsoft.com/office/powerpoint/2010/main" val="3971011124"/>
       </p:ext>
     </p:extLst>
   </p:cSld>
@@ -1460,7 +1461,7 @@
           <a:p>
             <a:r>
               <a:rPr lang="en-US" dirty="0"/>
-              <a:t>01/27/20 Fig. 5 – updated with new params, soon to add a new panel for complex mixes</a:t>
+              <a:t>12/06/19 Fig. 5</a:t>
             </a:r>
           </a:p>
         </p:txBody>
@@ -1491,7 +1492,7 @@
     </p:spTree>
     <p:extLst>
       <p:ext uri="{BB962C8B-B14F-4D97-AF65-F5344CB8AC3E}">
-        <p14:creationId xmlns:p14="http://schemas.microsoft.com/office/powerpoint/2010/main" val="2091408940"/>
+        <p14:creationId xmlns:p14="http://schemas.microsoft.com/office/powerpoint/2010/main" val="4193511516"/>
       </p:ext>
     </p:extLst>
   </p:cSld>
@@ -1675,7 +1676,7 @@
     </p:spTree>
     <p:extLst>
       <p:ext uri="{BB962C8B-B14F-4D97-AF65-F5344CB8AC3E}">
-        <p14:creationId xmlns:p14="http://schemas.microsoft.com/office/powerpoint/2010/main" val="1405225748"/>
+        <p14:creationId xmlns:p14="http://schemas.microsoft.com/office/powerpoint/2010/main" val="2091408940"/>
       </p:ext>
     </p:extLst>
   </p:cSld>
@@ -1736,7 +1737,7 @@
           <a:p>
             <a:r>
               <a:rPr lang="en-US" dirty="0"/>
-              <a:t>2/3/20 Fig. 5 – updated with new params, soon to add a new panel for complex mixes</a:t>
+              <a:t>01/27/20 Fig. 5 – updated with new params, soon to add a new panel for complex mixes</a:t>
             </a:r>
           </a:p>
         </p:txBody>
@@ -1767,7 +1768,7 @@
     </p:spTree>
     <p:extLst>
       <p:ext uri="{BB962C8B-B14F-4D97-AF65-F5344CB8AC3E}">
-        <p14:creationId xmlns:p14="http://schemas.microsoft.com/office/powerpoint/2010/main" val="27841797"/>
+        <p14:creationId xmlns:p14="http://schemas.microsoft.com/office/powerpoint/2010/main" val="1405225748"/>
       </p:ext>
     </p:extLst>
   </p:cSld>
@@ -1859,7 +1860,7 @@
     </p:spTree>
     <p:extLst>
       <p:ext uri="{BB962C8B-B14F-4D97-AF65-F5344CB8AC3E}">
-        <p14:creationId xmlns:p14="http://schemas.microsoft.com/office/powerpoint/2010/main" val="111411370"/>
+        <p14:creationId xmlns:p14="http://schemas.microsoft.com/office/powerpoint/2010/main" val="27841797"/>
       </p:ext>
     </p:extLst>
   </p:cSld>
@@ -1918,7 +1919,10 @@
           <a:bodyPr/>
           <a:lstStyle/>
           <a:p>
-            <a:endParaRPr lang="en-US" dirty="0"/>
+            <a:r>
+              <a:rPr lang="en-US" dirty="0"/>
+              <a:t>2/3/20 Fig. 5 – updated with new params, soon to add a new panel for complex mixes</a:t>
+            </a:r>
           </a:p>
         </p:txBody>
       </p:sp>
@@ -1948,7 +1952,7 @@
     </p:spTree>
     <p:extLst>
       <p:ext uri="{BB962C8B-B14F-4D97-AF65-F5344CB8AC3E}">
-        <p14:creationId xmlns:p14="http://schemas.microsoft.com/office/powerpoint/2010/main" val="4283938702"/>
+        <p14:creationId xmlns:p14="http://schemas.microsoft.com/office/powerpoint/2010/main" val="111411370"/>
       </p:ext>
     </p:extLst>
   </p:cSld>
@@ -2029,6 +2033,95 @@
             <a:fld id="{A697AF77-229E-5D4A-87D0-A949D969F47C}" type="slidenum">
               <a:rPr lang="en-US" smtClean="0"/>
               <a:t>25</a:t>
+            </a:fld>
+            <a:endParaRPr lang="en-US"/>
+          </a:p>
+        </p:txBody>
+      </p:sp>
+    </p:spTree>
+    <p:extLst>
+      <p:ext uri="{BB962C8B-B14F-4D97-AF65-F5344CB8AC3E}">
+        <p14:creationId xmlns:p14="http://schemas.microsoft.com/office/powerpoint/2010/main" val="4283938702"/>
+      </p:ext>
+    </p:extLst>
+  </p:cSld>
+  <p:clrMapOvr>
+    <a:masterClrMapping/>
+  </p:clrMapOvr>
+</p:notes>
+</file>
+
+<file path=ppt/notesSlides/notesSlide25.xml><?xml version="1.0" encoding="utf-8"?>
+<p:notes xmlns:a="http://schemas.openxmlformats.org/drawingml/2006/main" xmlns:r="http://schemas.openxmlformats.org/officeDocument/2006/relationships" xmlns:p="http://schemas.openxmlformats.org/presentationml/2006/main">
+  <p:cSld>
+    <p:spTree>
+      <p:nvGrpSpPr>
+        <p:cNvPr id="1" name=""/>
+        <p:cNvGrpSpPr/>
+        <p:nvPr/>
+      </p:nvGrpSpPr>
+      <p:grpSpPr>
+        <a:xfrm>
+          <a:off x="0" y="0"/>
+          <a:ext cx="0" cy="0"/>
+          <a:chOff x="0" y="0"/>
+          <a:chExt cx="0" cy="0"/>
+        </a:xfrm>
+      </p:grpSpPr>
+      <p:sp>
+        <p:nvSpPr>
+          <p:cNvPr id="2" name="Slide Image Placeholder 1"/>
+          <p:cNvSpPr>
+            <a:spLocks noGrp="1" noRot="1" noChangeAspect="1"/>
+          </p:cNvSpPr>
+          <p:nvPr>
+            <p:ph type="sldImg"/>
+          </p:nvPr>
+        </p:nvSpPr>
+        <p:spPr>
+          <a:xfrm>
+            <a:off x="1544638" y="1143000"/>
+            <a:ext cx="3768725" cy="3086100"/>
+          </a:xfrm>
+        </p:spPr>
+      </p:sp>
+      <p:sp>
+        <p:nvSpPr>
+          <p:cNvPr id="3" name="Notes Placeholder 2"/>
+          <p:cNvSpPr>
+            <a:spLocks noGrp="1"/>
+          </p:cNvSpPr>
+          <p:nvPr>
+            <p:ph type="body" idx="1"/>
+          </p:nvPr>
+        </p:nvSpPr>
+        <p:spPr/>
+        <p:txBody>
+          <a:bodyPr/>
+          <a:lstStyle/>
+          <a:p>
+            <a:endParaRPr lang="en-US" dirty="0"/>
+          </a:p>
+        </p:txBody>
+      </p:sp>
+      <p:sp>
+        <p:nvSpPr>
+          <p:cNvPr id="4" name="Slide Number Placeholder 3"/>
+          <p:cNvSpPr>
+            <a:spLocks noGrp="1"/>
+          </p:cNvSpPr>
+          <p:nvPr>
+            <p:ph type="sldNum" sz="quarter" idx="5"/>
+          </p:nvPr>
+        </p:nvSpPr>
+        <p:spPr/>
+        <p:txBody>
+          <a:bodyPr/>
+          <a:lstStyle/>
+          <a:p>
+            <a:fld id="{A697AF77-229E-5D4A-87D0-A949D969F47C}" type="slidenum">
+              <a:rPr lang="en-US" smtClean="0"/>
+              <a:t>26</a:t>
             </a:fld>
             <a:endParaRPr lang="en-US"/>
           </a:p>
@@ -2822,7 +2915,7 @@
           <a:p>
             <a:fld id="{AAC8E564-4E2A-8441-940F-9FCAA67208AC}" type="datetimeFigureOut">
               <a:rPr lang="en-US" smtClean="0"/>
-              <a:t>2/8/20</a:t>
+              <a:t>2/14/20</a:t>
             </a:fld>
             <a:endParaRPr lang="en-US"/>
           </a:p>
@@ -2992,7 +3085,7 @@
           <a:p>
             <a:fld id="{AAC8E564-4E2A-8441-940F-9FCAA67208AC}" type="datetimeFigureOut">
               <a:rPr lang="en-US" smtClean="0"/>
-              <a:t>2/8/20</a:t>
+              <a:t>2/14/20</a:t>
             </a:fld>
             <a:endParaRPr lang="en-US"/>
           </a:p>
@@ -3172,7 +3265,7 @@
           <a:p>
             <a:fld id="{AAC8E564-4E2A-8441-940F-9FCAA67208AC}" type="datetimeFigureOut">
               <a:rPr lang="en-US" smtClean="0"/>
-              <a:t>2/8/20</a:t>
+              <a:t>2/14/20</a:t>
             </a:fld>
             <a:endParaRPr lang="en-US"/>
           </a:p>
@@ -4592,7 +4685,7 @@
           <a:p>
             <a:fld id="{AAC8E564-4E2A-8441-940F-9FCAA67208AC}" type="datetimeFigureOut">
               <a:rPr lang="en-US" smtClean="0"/>
-              <a:t>2/8/20</a:t>
+              <a:t>2/14/20</a:t>
             </a:fld>
             <a:endParaRPr lang="en-US"/>
           </a:p>
@@ -5291,7 +5384,7 @@
           <a:p>
             <a:fld id="{AAC8E564-4E2A-8441-940F-9FCAA67208AC}" type="datetimeFigureOut">
               <a:rPr lang="en-US" smtClean="0"/>
-              <a:t>2/8/20</a:t>
+              <a:t>2/14/20</a:t>
             </a:fld>
             <a:endParaRPr lang="en-US"/>
           </a:p>
@@ -5523,7 +5616,7 @@
           <a:p>
             <a:fld id="{AAC8E564-4E2A-8441-940F-9FCAA67208AC}" type="datetimeFigureOut">
               <a:rPr lang="en-US" smtClean="0"/>
-              <a:t>2/8/20</a:t>
+              <a:t>2/14/20</a:t>
             </a:fld>
             <a:endParaRPr lang="en-US"/>
           </a:p>
@@ -5890,7 +5983,7 @@
           <a:p>
             <a:fld id="{AAC8E564-4E2A-8441-940F-9FCAA67208AC}" type="datetimeFigureOut">
               <a:rPr lang="en-US" smtClean="0"/>
-              <a:t>2/8/20</a:t>
+              <a:t>2/14/20</a:t>
             </a:fld>
             <a:endParaRPr lang="en-US"/>
           </a:p>
@@ -6008,7 +6101,7 @@
           <a:p>
             <a:fld id="{AAC8E564-4E2A-8441-940F-9FCAA67208AC}" type="datetimeFigureOut">
               <a:rPr lang="en-US" smtClean="0"/>
-              <a:t>2/8/20</a:t>
+              <a:t>2/14/20</a:t>
             </a:fld>
             <a:endParaRPr lang="en-US"/>
           </a:p>
@@ -6103,7 +6196,7 @@
           <a:p>
             <a:fld id="{AAC8E564-4E2A-8441-940F-9FCAA67208AC}" type="datetimeFigureOut">
               <a:rPr lang="en-US" smtClean="0"/>
-              <a:t>2/8/20</a:t>
+              <a:t>2/14/20</a:t>
             </a:fld>
             <a:endParaRPr lang="en-US"/>
           </a:p>
@@ -6380,7 +6473,7 @@
           <a:p>
             <a:fld id="{AAC8E564-4E2A-8441-940F-9FCAA67208AC}" type="datetimeFigureOut">
               <a:rPr lang="en-US" smtClean="0"/>
-              <a:t>2/8/20</a:t>
+              <a:t>2/14/20</a:t>
             </a:fld>
             <a:endParaRPr lang="en-US"/>
           </a:p>
@@ -6637,7 +6730,7 @@
           <a:p>
             <a:fld id="{AAC8E564-4E2A-8441-940F-9FCAA67208AC}" type="datetimeFigureOut">
               <a:rPr lang="en-US" smtClean="0"/>
-              <a:t>2/8/20</a:t>
+              <a:t>2/14/20</a:t>
             </a:fld>
             <a:endParaRPr lang="en-US"/>
           </a:p>
@@ -6850,7 +6943,7 @@
           <a:p>
             <a:fld id="{AAC8E564-4E2A-8441-940F-9FCAA67208AC}" type="datetimeFigureOut">
               <a:rPr lang="en-US" smtClean="0"/>
-              <a:t>2/8/20</a:t>
+              <a:t>2/14/20</a:t>
             </a:fld>
             <a:endParaRPr lang="en-US"/>
           </a:p>
@@ -7286,7 +7379,7 @@
           </a:ln>
           <a:extLst>
             <a:ext uri="{C572A759-6A51-4108-AA02-DFA0A04FC94B}">
-              <ma14:wrappingTextBoxFlag xmlns:ma14="http://schemas.microsoft.com/office/mac/drawingml/2011/main" xmlns:a14="http://schemas.microsoft.com/office/drawing/2010/main" xmlns:m="http://schemas.openxmlformats.org/officeDocument/2006/math" xmlns="" val="1"/>
+              <ma14:wrappingTextBoxFlag xmlns="" xmlns:m="http://schemas.openxmlformats.org/officeDocument/2006/math" xmlns:a14="http://schemas.microsoft.com/office/drawing/2010/main" xmlns:ma14="http://schemas.microsoft.com/office/mac/drawingml/2011/main" val="1"/>
             </a:ext>
           </a:extLst>
         </p:spPr>
@@ -7325,7 +7418,7 @@
           </a:ln>
           <a:extLst>
             <a:ext uri="{C572A759-6A51-4108-AA02-DFA0A04FC94B}">
-              <ma14:wrappingTextBoxFlag xmlns:ma14="http://schemas.microsoft.com/office/mac/drawingml/2011/main" xmlns:a14="http://schemas.microsoft.com/office/drawing/2010/main" xmlns:m="http://schemas.openxmlformats.org/officeDocument/2006/math" xmlns="" val="1"/>
+              <ma14:wrappingTextBoxFlag xmlns="" xmlns:m="http://schemas.openxmlformats.org/officeDocument/2006/math" xmlns:a14="http://schemas.microsoft.com/office/drawing/2010/main" xmlns:ma14="http://schemas.microsoft.com/office/mac/drawingml/2011/main" val="1"/>
             </a:ext>
           </a:extLst>
         </p:spPr>
@@ -8386,7 +8479,7 @@
 </file>
 
 <file path=ppt/slides/slide10.xml><?xml version="1.0" encoding="utf-8"?>
-<p:sld xmlns:a="http://schemas.openxmlformats.org/drawingml/2006/main" xmlns:r="http://schemas.openxmlformats.org/officeDocument/2006/relationships" xmlns:p="http://schemas.openxmlformats.org/presentationml/2006/main">
+<p:sld xmlns:a="http://schemas.openxmlformats.org/drawingml/2006/main" xmlns:r="http://schemas.openxmlformats.org/officeDocument/2006/relationships" xmlns:p="http://schemas.openxmlformats.org/presentationml/2006/main" show="0">
   <p:cSld>
     <p:spTree>
       <p:nvGrpSpPr>
@@ -9899,7 +9992,7 @@
 </file>
 
 <file path=ppt/slides/slide11.xml><?xml version="1.0" encoding="utf-8"?>
-<p:sld xmlns:a="http://schemas.openxmlformats.org/drawingml/2006/main" xmlns:r="http://schemas.openxmlformats.org/officeDocument/2006/relationships" xmlns:p="http://schemas.openxmlformats.org/presentationml/2006/main">
+<p:sld xmlns:a="http://schemas.openxmlformats.org/drawingml/2006/main" xmlns:r="http://schemas.openxmlformats.org/officeDocument/2006/relationships" xmlns:p="http://schemas.openxmlformats.org/presentationml/2006/main" show="0">
   <p:cSld>
     <p:spTree>
       <p:nvGrpSpPr>
@@ -13091,7 +13184,7 @@
 </file>
 
 <file path=ppt/slides/slide13.xml><?xml version="1.0" encoding="utf-8"?>
-<p:sld xmlns:a="http://schemas.openxmlformats.org/drawingml/2006/main" xmlns:r="http://schemas.openxmlformats.org/officeDocument/2006/relationships" xmlns:p="http://schemas.openxmlformats.org/presentationml/2006/main">
+<p:sld xmlns:a="http://schemas.openxmlformats.org/drawingml/2006/main" xmlns:r="http://schemas.openxmlformats.org/officeDocument/2006/relationships" xmlns:p="http://schemas.openxmlformats.org/presentationml/2006/main" show="0">
   <p:cSld>
     <p:spTree>
       <p:nvGrpSpPr>
@@ -13562,6 +13655,197 @@
 </file>
 
 <file path=ppt/slides/slide14.xml><?xml version="1.0" encoding="utf-8"?>
+<p:sld xmlns:a="http://schemas.openxmlformats.org/drawingml/2006/main" xmlns:r="http://schemas.openxmlformats.org/officeDocument/2006/relationships" xmlns:p="http://schemas.openxmlformats.org/presentationml/2006/main">
+  <p:cSld>
+    <p:spTree>
+      <p:nvGrpSpPr>
+        <p:cNvPr id="1" name=""/>
+        <p:cNvGrpSpPr/>
+        <p:nvPr/>
+      </p:nvGrpSpPr>
+      <p:grpSpPr>
+        <a:xfrm>
+          <a:off x="0" y="0"/>
+          <a:ext cx="0" cy="0"/>
+          <a:chOff x="0" y="0"/>
+          <a:chExt cx="0" cy="0"/>
+        </a:xfrm>
+      </p:grpSpPr>
+      <p:grpSp>
+        <p:nvGrpSpPr>
+          <p:cNvPr id="2" name="Group 1">
+            <a:extLst>
+              <a:ext uri="{FF2B5EF4-FFF2-40B4-BE49-F238E27FC236}">
+                <a16:creationId xmlns:a16="http://schemas.microsoft.com/office/drawing/2014/main" id="{75051133-72C8-8447-9162-BB56E002538D}"/>
+              </a:ext>
+            </a:extLst>
+          </p:cNvPr>
+          <p:cNvGrpSpPr/>
+          <p:nvPr/>
+        </p:nvGrpSpPr>
+        <p:grpSpPr>
+          <a:xfrm>
+            <a:off x="1122377" y="1339809"/>
+            <a:ext cx="5673695" cy="3821465"/>
+            <a:chOff x="2280698" y="54940"/>
+            <a:chExt cx="3364966" cy="2266442"/>
+          </a:xfrm>
+        </p:grpSpPr>
+        <p:pic>
+          <p:nvPicPr>
+            <p:cNvPr id="24" name="Picture 23">
+              <a:extLst>
+                <a:ext uri="{FF2B5EF4-FFF2-40B4-BE49-F238E27FC236}">
+                  <a16:creationId xmlns:a16="http://schemas.microsoft.com/office/drawing/2014/main" id="{3D53D49E-E61D-E846-9348-533DE7E0EFC8}"/>
+                </a:ext>
+              </a:extLst>
+            </p:cNvPr>
+            <p:cNvPicPr>
+              <a:picLocks noChangeAspect="1"/>
+            </p:cNvPicPr>
+            <p:nvPr/>
+          </p:nvPicPr>
+          <p:blipFill>
+            <a:blip r:embed="rId3"/>
+            <a:stretch>
+              <a:fillRect/>
+            </a:stretch>
+          </p:blipFill>
+          <p:spPr>
+            <a:xfrm>
+              <a:off x="3853735" y="263982"/>
+              <a:ext cx="1791929" cy="2057400"/>
+            </a:xfrm>
+            <a:prstGeom prst="rect">
+              <a:avLst/>
+            </a:prstGeom>
+          </p:spPr>
+        </p:pic>
+        <p:pic>
+          <p:nvPicPr>
+            <p:cNvPr id="6" name="Picture 5">
+              <a:extLst>
+                <a:ext uri="{FF2B5EF4-FFF2-40B4-BE49-F238E27FC236}">
+                  <a16:creationId xmlns:a16="http://schemas.microsoft.com/office/drawing/2014/main" id="{46E7E66B-0BF6-7B4E-88D3-93B364DF3628}"/>
+                </a:ext>
+              </a:extLst>
+            </p:cNvPr>
+            <p:cNvPicPr>
+              <a:picLocks noChangeAspect="1"/>
+            </p:cNvPicPr>
+            <p:nvPr/>
+          </p:nvPicPr>
+          <p:blipFill>
+            <a:blip r:embed="rId4"/>
+            <a:stretch>
+              <a:fillRect/>
+            </a:stretch>
+          </p:blipFill>
+          <p:spPr>
+            <a:xfrm>
+              <a:off x="2280698" y="263982"/>
+              <a:ext cx="1791929" cy="2057400"/>
+            </a:xfrm>
+            <a:prstGeom prst="rect">
+              <a:avLst/>
+            </a:prstGeom>
+          </p:spPr>
+        </p:pic>
+        <p:sp>
+          <p:nvSpPr>
+            <p:cNvPr id="16" name="TextBox 15">
+              <a:extLst>
+                <a:ext uri="{FF2B5EF4-FFF2-40B4-BE49-F238E27FC236}">
+                  <a16:creationId xmlns:a16="http://schemas.microsoft.com/office/drawing/2014/main" id="{0B8EA217-6F2C-0943-8D48-F70EC12EC200}"/>
+                </a:ext>
+              </a:extLst>
+            </p:cNvPr>
+            <p:cNvSpPr txBox="1"/>
+            <p:nvPr/>
+          </p:nvSpPr>
+          <p:spPr>
+            <a:xfrm>
+              <a:off x="2399287" y="57525"/>
+              <a:ext cx="353026" cy="200790"/>
+            </a:xfrm>
+            <a:prstGeom prst="rect">
+              <a:avLst/>
+            </a:prstGeom>
+            <a:noFill/>
+          </p:spPr>
+          <p:txBody>
+            <a:bodyPr wrap="square" rtlCol="0">
+              <a:spAutoFit/>
+            </a:bodyPr>
+            <a:lstStyle/>
+            <a:p>
+              <a:pPr algn="ctr"/>
+              <a:r>
+                <a:rPr lang="en-US" sz="1600" b="1" dirty="0">
+                  <a:latin typeface="Helvetica Neue" panose="02000503000000020004" pitchFamily="2" charset="0"/>
+                  <a:ea typeface="Helvetica Neue" panose="02000503000000020004" pitchFamily="2" charset="0"/>
+                  <a:cs typeface="Helvetica Neue" panose="02000503000000020004" pitchFamily="2" charset="0"/>
+                </a:rPr>
+                <a:t>a</a:t>
+              </a:r>
+            </a:p>
+          </p:txBody>
+        </p:sp>
+        <p:sp>
+          <p:nvSpPr>
+            <p:cNvPr id="18" name="TextBox 17">
+              <a:extLst>
+                <a:ext uri="{FF2B5EF4-FFF2-40B4-BE49-F238E27FC236}">
+                  <a16:creationId xmlns:a16="http://schemas.microsoft.com/office/drawing/2014/main" id="{46BBEC22-8FD3-4646-AE1A-C6C1C5D5E1E6}"/>
+                </a:ext>
+              </a:extLst>
+            </p:cNvPr>
+            <p:cNvSpPr txBox="1"/>
+            <p:nvPr/>
+          </p:nvSpPr>
+          <p:spPr>
+            <a:xfrm>
+              <a:off x="3983173" y="54940"/>
+              <a:ext cx="353026" cy="200790"/>
+            </a:xfrm>
+            <a:prstGeom prst="rect">
+              <a:avLst/>
+            </a:prstGeom>
+            <a:noFill/>
+          </p:spPr>
+          <p:txBody>
+            <a:bodyPr wrap="square" rtlCol="0">
+              <a:spAutoFit/>
+            </a:bodyPr>
+            <a:lstStyle/>
+            <a:p>
+              <a:pPr algn="ctr"/>
+              <a:r>
+                <a:rPr lang="en-US" sz="1600" b="1" dirty="0">
+                  <a:latin typeface="Helvetica Neue" panose="02000503000000020004" pitchFamily="2" charset="0"/>
+                  <a:ea typeface="Helvetica Neue" panose="02000503000000020004" pitchFamily="2" charset="0"/>
+                  <a:cs typeface="Helvetica Neue" panose="02000503000000020004" pitchFamily="2" charset="0"/>
+                </a:rPr>
+                <a:t>b</a:t>
+              </a:r>
+            </a:p>
+          </p:txBody>
+        </p:sp>
+      </p:grpSp>
+    </p:spTree>
+    <p:extLst>
+      <p:ext uri="{BB962C8B-B14F-4D97-AF65-F5344CB8AC3E}">
+        <p14:creationId xmlns:p14="http://schemas.microsoft.com/office/powerpoint/2010/main" val="3927161096"/>
+      </p:ext>
+    </p:extLst>
+  </p:cSld>
+  <p:clrMapOvr>
+    <a:masterClrMapping/>
+  </p:clrMapOvr>
+</p:sld>
+</file>
+
+<file path=ppt/slides/slide15.xml><?xml version="1.0" encoding="utf-8"?>
 <p:sld xmlns:a="http://schemas.openxmlformats.org/drawingml/2006/main" xmlns:r="http://schemas.openxmlformats.org/officeDocument/2006/relationships" xmlns:p="http://schemas.openxmlformats.org/presentationml/2006/main" show="0">
   <p:cSld>
     <p:spTree>
@@ -13871,7 +14155,7 @@
 </p:sld>
 </file>
 
-<file path=ppt/slides/slide15.xml><?xml version="1.0" encoding="utf-8"?>
+<file path=ppt/slides/slide16.xml><?xml version="1.0" encoding="utf-8"?>
 <p:sld xmlns:a="http://schemas.openxmlformats.org/drawingml/2006/main" xmlns:r="http://schemas.openxmlformats.org/officeDocument/2006/relationships" xmlns:p="http://schemas.openxmlformats.org/presentationml/2006/main" show="0">
   <p:cSld>
     <p:spTree>
@@ -14181,7 +14465,7 @@
 </p:sld>
 </file>
 
-<file path=ppt/slides/slide16.xml><?xml version="1.0" encoding="utf-8"?>
+<file path=ppt/slides/slide17.xml><?xml version="1.0" encoding="utf-8"?>
 <p:sld xmlns:a="http://schemas.openxmlformats.org/drawingml/2006/main" xmlns:r="http://schemas.openxmlformats.org/officeDocument/2006/relationships" xmlns:p="http://schemas.openxmlformats.org/presentationml/2006/main">
   <p:cSld>
     <p:spTree>
@@ -14491,7 +14775,7 @@
 </p:sld>
 </file>
 
-<file path=ppt/slides/slide17.xml><?xml version="1.0" encoding="utf-8"?>
+<file path=ppt/slides/slide18.xml><?xml version="1.0" encoding="utf-8"?>
 <p:sld xmlns:a="http://schemas.openxmlformats.org/drawingml/2006/main" xmlns:r="http://schemas.openxmlformats.org/officeDocument/2006/relationships" xmlns:p="http://schemas.openxmlformats.org/presentationml/2006/main" show="0">
   <p:cSld>
     <p:spTree>
@@ -14801,7 +15085,7 @@
 </p:sld>
 </file>
 
-<file path=ppt/slides/slide18.xml><?xml version="1.0" encoding="utf-8"?>
+<file path=ppt/slides/slide19.xml><?xml version="1.0" encoding="utf-8"?>
 <p:sld xmlns:a="http://schemas.openxmlformats.org/drawingml/2006/main" xmlns:r="http://schemas.openxmlformats.org/officeDocument/2006/relationships" xmlns:p="http://schemas.openxmlformats.org/presentationml/2006/main">
   <p:cSld>
     <p:spTree>
@@ -15102,1041 +15386,6 @@
     <p:extLst>
       <p:ext uri="{BB962C8B-B14F-4D97-AF65-F5344CB8AC3E}">
         <p14:creationId xmlns:p14="http://schemas.microsoft.com/office/powerpoint/2010/main" val="2352755481"/>
-      </p:ext>
-    </p:extLst>
-  </p:cSld>
-  <p:clrMapOvr>
-    <a:masterClrMapping/>
-  </p:clrMapOvr>
-</p:sld>
-</file>
-
-<file path=ppt/slides/slide19.xml><?xml version="1.0" encoding="utf-8"?>
-<p:sld xmlns:a="http://schemas.openxmlformats.org/drawingml/2006/main" xmlns:r="http://schemas.openxmlformats.org/officeDocument/2006/relationships" xmlns:p="http://schemas.openxmlformats.org/presentationml/2006/main" show="0">
-  <p:cSld>
-    <p:spTree>
-      <p:nvGrpSpPr>
-        <p:cNvPr id="1" name=""/>
-        <p:cNvGrpSpPr/>
-        <p:nvPr/>
-      </p:nvGrpSpPr>
-      <p:grpSpPr>
-        <a:xfrm>
-          <a:off x="0" y="0"/>
-          <a:ext cx="0" cy="0"/>
-          <a:chOff x="0" y="0"/>
-          <a:chExt cx="0" cy="0"/>
-        </a:xfrm>
-      </p:grpSpPr>
-      <p:grpSp>
-        <p:nvGrpSpPr>
-          <p:cNvPr id="31" name="Group 30">
-            <a:extLst>
-              <a:ext uri="{FF2B5EF4-FFF2-40B4-BE49-F238E27FC236}">
-                <a16:creationId xmlns:a16="http://schemas.microsoft.com/office/drawing/2014/main" id="{47C214A7-314B-DA4B-A577-30EEC875FB69}"/>
-              </a:ext>
-            </a:extLst>
-          </p:cNvPr>
-          <p:cNvGrpSpPr/>
-          <p:nvPr/>
-        </p:nvGrpSpPr>
-        <p:grpSpPr>
-          <a:xfrm>
-            <a:off x="6981783" y="2392783"/>
-            <a:ext cx="905467" cy="1258441"/>
-            <a:chOff x="6972084" y="2105534"/>
-            <a:chExt cx="905467" cy="1258441"/>
-          </a:xfrm>
-        </p:grpSpPr>
-        <p:pic>
-          <p:nvPicPr>
-            <p:cNvPr id="29" name="Picture 28">
-              <a:extLst>
-                <a:ext uri="{FF2B5EF4-FFF2-40B4-BE49-F238E27FC236}">
-                  <a16:creationId xmlns:a16="http://schemas.microsoft.com/office/drawing/2014/main" id="{47A2DE75-0F65-AD45-9C88-01A2B4AC7DE0}"/>
-                </a:ext>
-              </a:extLst>
-            </p:cNvPr>
-            <p:cNvPicPr>
-              <a:picLocks noChangeAspect="1"/>
-            </p:cNvPicPr>
-            <p:nvPr/>
-          </p:nvPicPr>
-          <p:blipFill rotWithShape="1">
-            <a:blip r:embed="rId3"/>
-            <a:srcRect l="83340" t="21017" r="3277" b="36380"/>
-            <a:stretch/>
-          </p:blipFill>
-          <p:spPr>
-            <a:xfrm>
-              <a:off x="7111404" y="2105534"/>
-              <a:ext cx="716620" cy="1136141"/>
-            </a:xfrm>
-            <a:prstGeom prst="rect">
-              <a:avLst/>
-            </a:prstGeom>
-          </p:spPr>
-        </p:pic>
-        <p:sp>
-          <p:nvSpPr>
-            <p:cNvPr id="30" name="TextBox 29">
-              <a:extLst>
-                <a:ext uri="{FF2B5EF4-FFF2-40B4-BE49-F238E27FC236}">
-                  <a16:creationId xmlns:a16="http://schemas.microsoft.com/office/drawing/2014/main" id="{7AC3745E-4836-B44F-8769-8C29FFAF708D}"/>
-                </a:ext>
-              </a:extLst>
-            </p:cNvPr>
-            <p:cNvSpPr txBox="1"/>
-            <p:nvPr/>
-          </p:nvSpPr>
-          <p:spPr>
-            <a:xfrm>
-              <a:off x="6972084" y="2994643"/>
-              <a:ext cx="905467" cy="369332"/>
-            </a:xfrm>
-            <a:prstGeom prst="rect">
-              <a:avLst/>
-            </a:prstGeom>
-            <a:noFill/>
-          </p:spPr>
-          <p:txBody>
-            <a:bodyPr wrap="square" rtlCol="0">
-              <a:spAutoFit/>
-            </a:bodyPr>
-            <a:lstStyle/>
-            <a:p>
-              <a:pPr algn="r"/>
-              <a:r>
-                <a:rPr lang="en-US" sz="1000" dirty="0">
-                  <a:solidFill>
-                    <a:schemeClr val="bg1">
-                      <a:lumMod val="50000"/>
-                    </a:schemeClr>
-                  </a:solidFill>
-                  <a:latin typeface="Helvetica Neue" panose="02000503000000020004" pitchFamily="2" charset="0"/>
-                  <a:ea typeface="Helvetica Neue" panose="02000503000000020004" pitchFamily="2" charset="0"/>
-                  <a:cs typeface="Helvetica Neue" panose="02000503000000020004" pitchFamily="2" charset="0"/>
-                </a:rPr>
-                <a:t>---</a:t>
-              </a:r>
-              <a:r>
-                <a:rPr lang="en-US" sz="1000" dirty="0">
-                  <a:latin typeface="Helvetica Neue" panose="02000503000000020004" pitchFamily="2" charset="0"/>
-                  <a:ea typeface="Helvetica Neue" panose="02000503000000020004" pitchFamily="2" charset="0"/>
-                  <a:cs typeface="Helvetica Neue" panose="02000503000000020004" pitchFamily="2" charset="0"/>
-                </a:rPr>
-                <a:t>  </a:t>
-              </a:r>
-              <a:r>
-                <a:rPr lang="en-US" sz="500" dirty="0">
-                  <a:latin typeface="Helvetica Neue" panose="02000503000000020004" pitchFamily="2" charset="0"/>
-                  <a:ea typeface="Helvetica Neue" panose="02000503000000020004" pitchFamily="2" charset="0"/>
-                  <a:cs typeface="Helvetica Neue" panose="02000503000000020004" pitchFamily="2" charset="0"/>
-                </a:rPr>
-                <a:t> </a:t>
-              </a:r>
-              <a:r>
-                <a:rPr lang="en-US" sz="1000" dirty="0">
-                  <a:latin typeface="Helvetica Neue" panose="02000503000000020004" pitchFamily="2" charset="0"/>
-                  <a:ea typeface="Helvetica Neue" panose="02000503000000020004" pitchFamily="2" charset="0"/>
-                  <a:cs typeface="Helvetica Neue" panose="02000503000000020004" pitchFamily="2" charset="0"/>
-                </a:rPr>
-                <a:t>Null H</a:t>
-              </a:r>
-              <a:r>
-                <a:rPr lang="en-US" sz="1000" baseline="-25000" dirty="0">
-                  <a:latin typeface="Helvetica Neue" panose="02000503000000020004" pitchFamily="2" charset="0"/>
-                  <a:ea typeface="Helvetica Neue" panose="02000503000000020004" pitchFamily="2" charset="0"/>
-                  <a:cs typeface="Helvetica Neue" panose="02000503000000020004" pitchFamily="2" charset="0"/>
-                </a:rPr>
-                <a:t>0</a:t>
-              </a:r>
-              <a:endParaRPr lang="en-US" sz="1000" dirty="0">
-                <a:latin typeface="Helvetica Neue" panose="02000503000000020004" pitchFamily="2" charset="0"/>
-                <a:ea typeface="Helvetica Neue" panose="02000503000000020004" pitchFamily="2" charset="0"/>
-                <a:cs typeface="Helvetica Neue" panose="02000503000000020004" pitchFamily="2" charset="0"/>
-              </a:endParaRPr>
-            </a:p>
-            <a:p>
-              <a:pPr algn="r"/>
-              <a:r>
-                <a:rPr lang="en-US" sz="800" dirty="0">
-                  <a:latin typeface="Helvetica Neue" panose="02000503000000020004" pitchFamily="2" charset="0"/>
-                  <a:ea typeface="Helvetica Neue" panose="02000503000000020004" pitchFamily="2" charset="0"/>
-                  <a:cs typeface="Helvetica Neue" panose="02000503000000020004" pitchFamily="2" charset="0"/>
-                </a:rPr>
-                <a:t>(linear mixing)</a:t>
-              </a:r>
-              <a:endParaRPr lang="en-US" sz="800" baseline="-25000" dirty="0">
-                <a:latin typeface="Helvetica Neue" panose="02000503000000020004" pitchFamily="2" charset="0"/>
-                <a:ea typeface="Helvetica Neue" panose="02000503000000020004" pitchFamily="2" charset="0"/>
-                <a:cs typeface="Helvetica Neue" panose="02000503000000020004" pitchFamily="2" charset="0"/>
-              </a:endParaRPr>
-            </a:p>
-          </p:txBody>
-        </p:sp>
-      </p:grpSp>
-      <p:grpSp>
-        <p:nvGrpSpPr>
-          <p:cNvPr id="64" name="Group 63">
-            <a:extLst>
-              <a:ext uri="{FF2B5EF4-FFF2-40B4-BE49-F238E27FC236}">
-                <a16:creationId xmlns:a16="http://schemas.microsoft.com/office/drawing/2014/main" id="{2307CD96-C70A-1047-A24B-0EF7304A3210}"/>
-              </a:ext>
-            </a:extLst>
-          </p:cNvPr>
-          <p:cNvGrpSpPr/>
-          <p:nvPr/>
-        </p:nvGrpSpPr>
-        <p:grpSpPr>
-          <a:xfrm>
-            <a:off x="-59571" y="1197522"/>
-            <a:ext cx="7180674" cy="4088306"/>
-            <a:chOff x="-59571" y="1257310"/>
-            <a:chExt cx="7180674" cy="4088306"/>
-          </a:xfrm>
-        </p:grpSpPr>
-        <p:pic>
-          <p:nvPicPr>
-            <p:cNvPr id="13" name="Picture 12">
-              <a:extLst>
-                <a:ext uri="{FF2B5EF4-FFF2-40B4-BE49-F238E27FC236}">
-                  <a16:creationId xmlns:a16="http://schemas.microsoft.com/office/drawing/2014/main" id="{DAB10650-9262-A442-818E-C32D8386224F}"/>
-                </a:ext>
-              </a:extLst>
-            </p:cNvPr>
-            <p:cNvPicPr>
-              <a:picLocks noChangeAspect="1"/>
-            </p:cNvPicPr>
-            <p:nvPr/>
-          </p:nvPicPr>
-          <p:blipFill>
-            <a:blip r:embed="rId4"/>
-            <a:stretch>
-              <a:fillRect/>
-            </a:stretch>
-          </p:blipFill>
-          <p:spPr>
-            <a:xfrm>
-              <a:off x="3609807" y="3596852"/>
-              <a:ext cx="3511296" cy="1748763"/>
-            </a:xfrm>
-            <a:prstGeom prst="rect">
-              <a:avLst/>
-            </a:prstGeom>
-          </p:spPr>
-        </p:pic>
-        <p:sp>
-          <p:nvSpPr>
-            <p:cNvPr id="18" name="TextBox 17">
-              <a:extLst>
-                <a:ext uri="{FF2B5EF4-FFF2-40B4-BE49-F238E27FC236}">
-                  <a16:creationId xmlns:a16="http://schemas.microsoft.com/office/drawing/2014/main" id="{46BBEC22-8FD3-4646-AE1A-C6C1C5D5E1E6}"/>
-                </a:ext>
-              </a:extLst>
-            </p:cNvPr>
-            <p:cNvSpPr txBox="1"/>
-            <p:nvPr/>
-          </p:nvSpPr>
-          <p:spPr>
-            <a:xfrm>
-              <a:off x="3478615" y="1257310"/>
-              <a:ext cx="532050" cy="311217"/>
-            </a:xfrm>
-            <a:prstGeom prst="rect">
-              <a:avLst/>
-            </a:prstGeom>
-            <a:noFill/>
-          </p:spPr>
-          <p:txBody>
-            <a:bodyPr wrap="square" rtlCol="0">
-              <a:spAutoFit/>
-            </a:bodyPr>
-            <a:lstStyle/>
-            <a:p>
-              <a:pPr algn="ctr"/>
-              <a:r>
-                <a:rPr lang="en-US" sz="1600" b="1" dirty="0">
-                  <a:latin typeface="Helvetica Neue" panose="02000503000000020004" pitchFamily="2" charset="0"/>
-                  <a:ea typeface="Helvetica Neue" panose="02000503000000020004" pitchFamily="2" charset="0"/>
-                  <a:cs typeface="Helvetica Neue" panose="02000503000000020004" pitchFamily="2" charset="0"/>
-                </a:rPr>
-                <a:t>b</a:t>
-              </a:r>
-            </a:p>
-          </p:txBody>
-        </p:sp>
-        <p:pic>
-          <p:nvPicPr>
-            <p:cNvPr id="11" name="Picture 10">
-              <a:extLst>
-                <a:ext uri="{FF2B5EF4-FFF2-40B4-BE49-F238E27FC236}">
-                  <a16:creationId xmlns:a16="http://schemas.microsoft.com/office/drawing/2014/main" id="{CDDBCA46-2431-8742-8B7E-7958F55115D8}"/>
-                </a:ext>
-              </a:extLst>
-            </p:cNvPr>
-            <p:cNvPicPr>
-              <a:picLocks noChangeAspect="1"/>
-            </p:cNvPicPr>
-            <p:nvPr/>
-          </p:nvPicPr>
-          <p:blipFill>
-            <a:blip r:embed="rId5"/>
-            <a:stretch>
-              <a:fillRect/>
-            </a:stretch>
-          </p:blipFill>
-          <p:spPr>
-            <a:xfrm>
-              <a:off x="83059" y="1568526"/>
-              <a:ext cx="3511296" cy="1748763"/>
-            </a:xfrm>
-            <a:prstGeom prst="rect">
-              <a:avLst/>
-            </a:prstGeom>
-          </p:spPr>
-        </p:pic>
-        <p:pic>
-          <p:nvPicPr>
-            <p:cNvPr id="17" name="Picture 16">
-              <a:extLst>
-                <a:ext uri="{FF2B5EF4-FFF2-40B4-BE49-F238E27FC236}">
-                  <a16:creationId xmlns:a16="http://schemas.microsoft.com/office/drawing/2014/main" id="{2B7D716C-7908-7040-B95B-AA7F33B09271}"/>
-                </a:ext>
-              </a:extLst>
-            </p:cNvPr>
-            <p:cNvPicPr>
-              <a:picLocks noChangeAspect="1"/>
-            </p:cNvPicPr>
-            <p:nvPr/>
-          </p:nvPicPr>
-          <p:blipFill>
-            <a:blip r:embed="rId6"/>
-            <a:stretch>
-              <a:fillRect/>
-            </a:stretch>
-          </p:blipFill>
-          <p:spPr>
-            <a:xfrm>
-              <a:off x="83059" y="3596853"/>
-              <a:ext cx="3511296" cy="1748763"/>
-            </a:xfrm>
-            <a:prstGeom prst="rect">
-              <a:avLst/>
-            </a:prstGeom>
-          </p:spPr>
-        </p:pic>
-        <p:pic>
-          <p:nvPicPr>
-            <p:cNvPr id="24" name="Picture 23">
-              <a:extLst>
-                <a:ext uri="{FF2B5EF4-FFF2-40B4-BE49-F238E27FC236}">
-                  <a16:creationId xmlns:a16="http://schemas.microsoft.com/office/drawing/2014/main" id="{E521139E-34DD-FC49-B81A-3E8E74C466B9}"/>
-                </a:ext>
-              </a:extLst>
-            </p:cNvPr>
-            <p:cNvPicPr>
-              <a:picLocks noChangeAspect="1"/>
-            </p:cNvPicPr>
-            <p:nvPr/>
-          </p:nvPicPr>
-          <p:blipFill>
-            <a:blip r:embed="rId7"/>
-            <a:stretch>
-              <a:fillRect/>
-            </a:stretch>
-          </p:blipFill>
-          <p:spPr>
-            <a:xfrm>
-              <a:off x="3609807" y="1568527"/>
-              <a:ext cx="3511296" cy="1748763"/>
-            </a:xfrm>
-            <a:prstGeom prst="rect">
-              <a:avLst/>
-            </a:prstGeom>
-          </p:spPr>
-        </p:pic>
-        <p:sp>
-          <p:nvSpPr>
-            <p:cNvPr id="16" name="TextBox 15">
-              <a:extLst>
-                <a:ext uri="{FF2B5EF4-FFF2-40B4-BE49-F238E27FC236}">
-                  <a16:creationId xmlns:a16="http://schemas.microsoft.com/office/drawing/2014/main" id="{0B8EA217-6F2C-0943-8D48-F70EC12EC200}"/>
-                </a:ext>
-              </a:extLst>
-            </p:cNvPr>
-            <p:cNvSpPr txBox="1"/>
-            <p:nvPr/>
-          </p:nvSpPr>
-          <p:spPr>
-            <a:xfrm>
-              <a:off x="-39178" y="1258440"/>
-              <a:ext cx="532050" cy="311217"/>
-            </a:xfrm>
-            <a:prstGeom prst="rect">
-              <a:avLst/>
-            </a:prstGeom>
-            <a:noFill/>
-          </p:spPr>
-          <p:txBody>
-            <a:bodyPr wrap="square" rtlCol="0">
-              <a:spAutoFit/>
-            </a:bodyPr>
-            <a:lstStyle/>
-            <a:p>
-              <a:pPr algn="ctr"/>
-              <a:r>
-                <a:rPr lang="en-US" sz="1600" b="1" dirty="0">
-                  <a:latin typeface="Helvetica Neue" panose="02000503000000020004" pitchFamily="2" charset="0"/>
-                  <a:ea typeface="Helvetica Neue" panose="02000503000000020004" pitchFamily="2" charset="0"/>
-                  <a:cs typeface="Helvetica Neue" panose="02000503000000020004" pitchFamily="2" charset="0"/>
-                </a:rPr>
-                <a:t>a</a:t>
-              </a:r>
-            </a:p>
-          </p:txBody>
-        </p:sp>
-        <p:sp>
-          <p:nvSpPr>
-            <p:cNvPr id="20" name="TextBox 19">
-              <a:extLst>
-                <a:ext uri="{FF2B5EF4-FFF2-40B4-BE49-F238E27FC236}">
-                  <a16:creationId xmlns:a16="http://schemas.microsoft.com/office/drawing/2014/main" id="{E8C86BD2-9FE9-8C4D-A835-2EAAEE829653}"/>
-                </a:ext>
-              </a:extLst>
-            </p:cNvPr>
-            <p:cNvSpPr txBox="1"/>
-            <p:nvPr/>
-          </p:nvSpPr>
-          <p:spPr>
-            <a:xfrm>
-              <a:off x="-59571" y="3276227"/>
-              <a:ext cx="532050" cy="311217"/>
-            </a:xfrm>
-            <a:prstGeom prst="rect">
-              <a:avLst/>
-            </a:prstGeom>
-            <a:noFill/>
-          </p:spPr>
-          <p:txBody>
-            <a:bodyPr wrap="square" rtlCol="0">
-              <a:spAutoFit/>
-            </a:bodyPr>
-            <a:lstStyle/>
-            <a:p>
-              <a:pPr algn="ctr"/>
-              <a:r>
-                <a:rPr lang="en-US" sz="1600" b="1" dirty="0">
-                  <a:latin typeface="Helvetica Neue" panose="02000503000000020004" pitchFamily="2" charset="0"/>
-                  <a:ea typeface="Helvetica Neue" panose="02000503000000020004" pitchFamily="2" charset="0"/>
-                  <a:cs typeface="Helvetica Neue" panose="02000503000000020004" pitchFamily="2" charset="0"/>
-                </a:rPr>
-                <a:t>c</a:t>
-              </a:r>
-            </a:p>
-          </p:txBody>
-        </p:sp>
-        <p:sp>
-          <p:nvSpPr>
-            <p:cNvPr id="22" name="TextBox 21">
-              <a:extLst>
-                <a:ext uri="{FF2B5EF4-FFF2-40B4-BE49-F238E27FC236}">
-                  <a16:creationId xmlns:a16="http://schemas.microsoft.com/office/drawing/2014/main" id="{9CC8A2EA-F668-DD43-A074-9F1F726F28A7}"/>
-                </a:ext>
-              </a:extLst>
-            </p:cNvPr>
-            <p:cNvSpPr txBox="1"/>
-            <p:nvPr/>
-          </p:nvSpPr>
-          <p:spPr>
-            <a:xfrm>
-              <a:off x="3478615" y="3281256"/>
-              <a:ext cx="532050" cy="311217"/>
-            </a:xfrm>
-            <a:prstGeom prst="rect">
-              <a:avLst/>
-            </a:prstGeom>
-            <a:noFill/>
-          </p:spPr>
-          <p:txBody>
-            <a:bodyPr wrap="square" rtlCol="0">
-              <a:spAutoFit/>
-            </a:bodyPr>
-            <a:lstStyle/>
-            <a:p>
-              <a:pPr algn="ctr"/>
-              <a:r>
-                <a:rPr lang="en-US" sz="1600" b="1" dirty="0">
-                  <a:latin typeface="Helvetica Neue" panose="02000503000000020004" pitchFamily="2" charset="0"/>
-                  <a:ea typeface="Helvetica Neue" panose="02000503000000020004" pitchFamily="2" charset="0"/>
-                  <a:cs typeface="Helvetica Neue" panose="02000503000000020004" pitchFamily="2" charset="0"/>
-                </a:rPr>
-                <a:t>d</a:t>
-              </a:r>
-            </a:p>
-          </p:txBody>
-        </p:sp>
-        <p:sp>
-          <p:nvSpPr>
-            <p:cNvPr id="34" name="Rectangle 33">
-              <a:extLst>
-                <a:ext uri="{FF2B5EF4-FFF2-40B4-BE49-F238E27FC236}">
-                  <a16:creationId xmlns:a16="http://schemas.microsoft.com/office/drawing/2014/main" id="{FCC82B76-D613-B14A-9751-C3404A7F5100}"/>
-                </a:ext>
-              </a:extLst>
-            </p:cNvPr>
-            <p:cNvSpPr/>
-            <p:nvPr/>
-          </p:nvSpPr>
-          <p:spPr>
-            <a:xfrm>
-              <a:off x="1859134" y="1755789"/>
-              <a:ext cx="253217" cy="1060972"/>
-            </a:xfrm>
-            <a:prstGeom prst="rect">
-              <a:avLst/>
-            </a:prstGeom>
-            <a:noFill/>
-            <a:ln w="6350">
-              <a:solidFill>
-                <a:schemeClr val="tx1"/>
-              </a:solidFill>
-            </a:ln>
-          </p:spPr>
-          <p:style>
-            <a:lnRef idx="2">
-              <a:schemeClr val="accent1">
-                <a:shade val="50000"/>
-              </a:schemeClr>
-            </a:lnRef>
-            <a:fillRef idx="1">
-              <a:schemeClr val="accent1"/>
-            </a:fillRef>
-            <a:effectRef idx="0">
-              <a:schemeClr val="accent1"/>
-            </a:effectRef>
-            <a:fontRef idx="minor">
-              <a:schemeClr val="lt1"/>
-            </a:fontRef>
-          </p:style>
-          <p:txBody>
-            <a:bodyPr rtlCol="0" anchor="ctr"/>
-            <a:lstStyle/>
-            <a:p>
-              <a:pPr algn="ctr"/>
-              <a:endParaRPr lang="en-US"/>
-            </a:p>
-          </p:txBody>
-        </p:sp>
-        <p:cxnSp>
-          <p:nvCxnSpPr>
-            <p:cNvPr id="36" name="Straight Arrow Connector 35">
-              <a:extLst>
-                <a:ext uri="{FF2B5EF4-FFF2-40B4-BE49-F238E27FC236}">
-                  <a16:creationId xmlns:a16="http://schemas.microsoft.com/office/drawing/2014/main" id="{FCB6A53D-8895-5444-BC26-FDB3CED3D01F}"/>
-                </a:ext>
-              </a:extLst>
-            </p:cNvPr>
-            <p:cNvCxnSpPr>
-              <a:cxnSpLocks/>
-            </p:cNvCxnSpPr>
-            <p:nvPr/>
-          </p:nvCxnSpPr>
-          <p:spPr>
-            <a:xfrm>
-              <a:off x="1985744" y="1552268"/>
-              <a:ext cx="0" cy="202381"/>
-            </a:xfrm>
-            <a:prstGeom prst="straightConnector1">
-              <a:avLst/>
-            </a:prstGeom>
-            <a:ln>
-              <a:solidFill>
-                <a:schemeClr val="tx1"/>
-              </a:solidFill>
-              <a:tailEnd type="triangle"/>
-            </a:ln>
-          </p:spPr>
-          <p:style>
-            <a:lnRef idx="1">
-              <a:schemeClr val="accent1"/>
-            </a:lnRef>
-            <a:fillRef idx="0">
-              <a:schemeClr val="accent1"/>
-            </a:fillRef>
-            <a:effectRef idx="0">
-              <a:schemeClr val="accent1"/>
-            </a:effectRef>
-            <a:fontRef idx="minor">
-              <a:schemeClr val="tx1"/>
-            </a:fontRef>
-          </p:style>
-        </p:cxnSp>
-        <p:sp>
-          <p:nvSpPr>
-            <p:cNvPr id="40" name="TextBox 39">
-              <a:extLst>
-                <a:ext uri="{FF2B5EF4-FFF2-40B4-BE49-F238E27FC236}">
-                  <a16:creationId xmlns:a16="http://schemas.microsoft.com/office/drawing/2014/main" id="{59710CE9-75A6-8E4F-BC0F-9128A72B5E28}"/>
-                </a:ext>
-              </a:extLst>
-            </p:cNvPr>
-            <p:cNvSpPr txBox="1"/>
-            <p:nvPr/>
-          </p:nvSpPr>
-          <p:spPr>
-            <a:xfrm>
-              <a:off x="1510959" y="1335504"/>
-              <a:ext cx="949569" cy="230832"/>
-            </a:xfrm>
-            <a:prstGeom prst="rect">
-              <a:avLst/>
-            </a:prstGeom>
-            <a:noFill/>
-          </p:spPr>
-          <p:txBody>
-            <a:bodyPr wrap="square" rtlCol="0">
-              <a:spAutoFit/>
-            </a:bodyPr>
-            <a:lstStyle/>
-            <a:p>
-              <a:pPr algn="ctr"/>
-              <a:r>
-                <a:rPr lang="en-US" sz="900" i="1" dirty="0">
-                  <a:solidFill>
-                    <a:srgbClr val="8FB132"/>
-                  </a:solidFill>
-                  <a:latin typeface="Helvetica Neue" panose="02000503000000020004" pitchFamily="2" charset="0"/>
-                  <a:ea typeface="Helvetica Neue" panose="02000503000000020004" pitchFamily="2" charset="0"/>
-                  <a:cs typeface="Helvetica Neue" panose="02000503000000020004" pitchFamily="2" charset="0"/>
-                </a:rPr>
-                <a:t>No effect</a:t>
-              </a:r>
-            </a:p>
-          </p:txBody>
-        </p:sp>
-        <p:sp>
-          <p:nvSpPr>
-            <p:cNvPr id="47" name="Rectangle 46">
-              <a:extLst>
-                <a:ext uri="{FF2B5EF4-FFF2-40B4-BE49-F238E27FC236}">
-                  <a16:creationId xmlns:a16="http://schemas.microsoft.com/office/drawing/2014/main" id="{B01074A1-2499-4948-9DBB-7D0A93A30FE8}"/>
-                </a:ext>
-              </a:extLst>
-            </p:cNvPr>
-            <p:cNvSpPr/>
-            <p:nvPr/>
-          </p:nvSpPr>
-          <p:spPr>
-            <a:xfrm>
-              <a:off x="5388331" y="1755789"/>
-              <a:ext cx="253217" cy="1057240"/>
-            </a:xfrm>
-            <a:prstGeom prst="rect">
-              <a:avLst/>
-            </a:prstGeom>
-            <a:noFill/>
-            <a:ln w="6350">
-              <a:solidFill>
-                <a:schemeClr val="tx1"/>
-              </a:solidFill>
-            </a:ln>
-          </p:spPr>
-          <p:style>
-            <a:lnRef idx="2">
-              <a:schemeClr val="accent1">
-                <a:shade val="50000"/>
-              </a:schemeClr>
-            </a:lnRef>
-            <a:fillRef idx="1">
-              <a:schemeClr val="accent1"/>
-            </a:fillRef>
-            <a:effectRef idx="0">
-              <a:schemeClr val="accent1"/>
-            </a:effectRef>
-            <a:fontRef idx="minor">
-              <a:schemeClr val="lt1"/>
-            </a:fontRef>
-          </p:style>
-          <p:txBody>
-            <a:bodyPr rtlCol="0" anchor="ctr"/>
-            <a:lstStyle/>
-            <a:p>
-              <a:pPr algn="ctr"/>
-              <a:endParaRPr lang="en-US"/>
-            </a:p>
-          </p:txBody>
-        </p:sp>
-        <p:cxnSp>
-          <p:nvCxnSpPr>
-            <p:cNvPr id="48" name="Straight Arrow Connector 47">
-              <a:extLst>
-                <a:ext uri="{FF2B5EF4-FFF2-40B4-BE49-F238E27FC236}">
-                  <a16:creationId xmlns:a16="http://schemas.microsoft.com/office/drawing/2014/main" id="{3673C9ED-1E77-ED4B-9332-C7996099B01B}"/>
-                </a:ext>
-              </a:extLst>
-            </p:cNvPr>
-            <p:cNvCxnSpPr>
-              <a:cxnSpLocks/>
-            </p:cNvCxnSpPr>
-            <p:nvPr/>
-          </p:nvCxnSpPr>
-          <p:spPr>
-            <a:xfrm>
-              <a:off x="5514940" y="1523669"/>
-              <a:ext cx="0" cy="227246"/>
-            </a:xfrm>
-            <a:prstGeom prst="straightConnector1">
-              <a:avLst/>
-            </a:prstGeom>
-            <a:ln>
-              <a:solidFill>
-                <a:schemeClr val="tx1"/>
-              </a:solidFill>
-              <a:tailEnd type="triangle"/>
-            </a:ln>
-          </p:spPr>
-          <p:style>
-            <a:lnRef idx="1">
-              <a:schemeClr val="accent1"/>
-            </a:lnRef>
-            <a:fillRef idx="0">
-              <a:schemeClr val="accent1"/>
-            </a:fillRef>
-            <a:effectRef idx="0">
-              <a:schemeClr val="accent1"/>
-            </a:effectRef>
-            <a:fontRef idx="minor">
-              <a:schemeClr val="tx1"/>
-            </a:fontRef>
-          </p:style>
-        </p:cxnSp>
-        <p:sp>
-          <p:nvSpPr>
-            <p:cNvPr id="49" name="TextBox 48">
-              <a:extLst>
-                <a:ext uri="{FF2B5EF4-FFF2-40B4-BE49-F238E27FC236}">
-                  <a16:creationId xmlns:a16="http://schemas.microsoft.com/office/drawing/2014/main" id="{2505A704-0B39-3948-B702-3DE6FB8A566F}"/>
-                </a:ext>
-              </a:extLst>
-            </p:cNvPr>
-            <p:cNvSpPr txBox="1"/>
-            <p:nvPr/>
-          </p:nvSpPr>
-          <p:spPr>
-            <a:xfrm>
-              <a:off x="4819867" y="1337694"/>
-              <a:ext cx="1367335" cy="230832"/>
-            </a:xfrm>
-            <a:prstGeom prst="rect">
-              <a:avLst/>
-            </a:prstGeom>
-            <a:noFill/>
-          </p:spPr>
-          <p:txBody>
-            <a:bodyPr wrap="square" rtlCol="0">
-              <a:spAutoFit/>
-            </a:bodyPr>
-            <a:lstStyle/>
-            <a:p>
-              <a:pPr algn="ctr"/>
-              <a:r>
-                <a:rPr lang="en-US" sz="900" i="1" dirty="0">
-                  <a:solidFill>
-                    <a:srgbClr val="8FB132"/>
-                  </a:solidFill>
-                  <a:latin typeface="Helvetica Neue" panose="02000503000000020004" pitchFamily="2" charset="0"/>
-                  <a:ea typeface="Helvetica Neue" panose="02000503000000020004" pitchFamily="2" charset="0"/>
-                  <a:cs typeface="Helvetica Neue" panose="02000503000000020004" pitchFamily="2" charset="0"/>
-                </a:rPr>
-                <a:t>Downward contagion</a:t>
-              </a:r>
-            </a:p>
-          </p:txBody>
-        </p:sp>
-        <p:sp>
-          <p:nvSpPr>
-            <p:cNvPr id="56" name="Rectangle 55">
-              <a:extLst>
-                <a:ext uri="{FF2B5EF4-FFF2-40B4-BE49-F238E27FC236}">
-                  <a16:creationId xmlns:a16="http://schemas.microsoft.com/office/drawing/2014/main" id="{946FFB0D-B0DB-7746-BE84-CA00A6AC6FC6}"/>
-                </a:ext>
-              </a:extLst>
-            </p:cNvPr>
-            <p:cNvSpPr/>
-            <p:nvPr/>
-          </p:nvSpPr>
-          <p:spPr>
-            <a:xfrm>
-              <a:off x="1870538" y="3779347"/>
-              <a:ext cx="253217" cy="1057240"/>
-            </a:xfrm>
-            <a:prstGeom prst="rect">
-              <a:avLst/>
-            </a:prstGeom>
-            <a:noFill/>
-            <a:ln w="6350">
-              <a:solidFill>
-                <a:schemeClr val="tx1"/>
-              </a:solidFill>
-            </a:ln>
-          </p:spPr>
-          <p:style>
-            <a:lnRef idx="2">
-              <a:schemeClr val="accent1">
-                <a:shade val="50000"/>
-              </a:schemeClr>
-            </a:lnRef>
-            <a:fillRef idx="1">
-              <a:schemeClr val="accent1"/>
-            </a:fillRef>
-            <a:effectRef idx="0">
-              <a:schemeClr val="accent1"/>
-            </a:effectRef>
-            <a:fontRef idx="minor">
-              <a:schemeClr val="lt1"/>
-            </a:fontRef>
-          </p:style>
-          <p:txBody>
-            <a:bodyPr rtlCol="0" anchor="ctr"/>
-            <a:lstStyle/>
-            <a:p>
-              <a:pPr algn="ctr"/>
-              <a:endParaRPr lang="en-US"/>
-            </a:p>
-          </p:txBody>
-        </p:sp>
-        <p:cxnSp>
-          <p:nvCxnSpPr>
-            <p:cNvPr id="57" name="Straight Arrow Connector 56">
-              <a:extLst>
-                <a:ext uri="{FF2B5EF4-FFF2-40B4-BE49-F238E27FC236}">
-                  <a16:creationId xmlns:a16="http://schemas.microsoft.com/office/drawing/2014/main" id="{D01545C1-233E-EA44-BA81-A519DB74EB76}"/>
-                </a:ext>
-              </a:extLst>
-            </p:cNvPr>
-            <p:cNvCxnSpPr>
-              <a:cxnSpLocks/>
-            </p:cNvCxnSpPr>
-            <p:nvPr/>
-          </p:nvCxnSpPr>
-          <p:spPr>
-            <a:xfrm>
-              <a:off x="1997147" y="3547227"/>
-              <a:ext cx="0" cy="227246"/>
-            </a:xfrm>
-            <a:prstGeom prst="straightConnector1">
-              <a:avLst/>
-            </a:prstGeom>
-            <a:ln>
-              <a:solidFill>
-                <a:schemeClr val="tx1"/>
-              </a:solidFill>
-              <a:tailEnd type="triangle"/>
-            </a:ln>
-          </p:spPr>
-          <p:style>
-            <a:lnRef idx="1">
-              <a:schemeClr val="accent1"/>
-            </a:lnRef>
-            <a:fillRef idx="0">
-              <a:schemeClr val="accent1"/>
-            </a:fillRef>
-            <a:effectRef idx="0">
-              <a:schemeClr val="accent1"/>
-            </a:effectRef>
-            <a:fontRef idx="minor">
-              <a:schemeClr val="tx1"/>
-            </a:fontRef>
-          </p:style>
-        </p:cxnSp>
-        <p:sp>
-          <p:nvSpPr>
-            <p:cNvPr id="58" name="TextBox 57">
-              <a:extLst>
-                <a:ext uri="{FF2B5EF4-FFF2-40B4-BE49-F238E27FC236}">
-                  <a16:creationId xmlns:a16="http://schemas.microsoft.com/office/drawing/2014/main" id="{01EAAFA9-AE9E-8246-A9FD-6D29F8274912}"/>
-                </a:ext>
-              </a:extLst>
-            </p:cNvPr>
-            <p:cNvSpPr txBox="1"/>
-            <p:nvPr/>
-          </p:nvSpPr>
-          <p:spPr>
-            <a:xfrm>
-              <a:off x="1302074" y="3361252"/>
-              <a:ext cx="1367335" cy="230832"/>
-            </a:xfrm>
-            <a:prstGeom prst="rect">
-              <a:avLst/>
-            </a:prstGeom>
-            <a:noFill/>
-          </p:spPr>
-          <p:txBody>
-            <a:bodyPr wrap="square" rtlCol="0">
-              <a:spAutoFit/>
-            </a:bodyPr>
-            <a:lstStyle/>
-            <a:p>
-              <a:pPr algn="ctr"/>
-              <a:r>
-                <a:rPr lang="en-US" sz="900" i="1" dirty="0">
-                  <a:solidFill>
-                    <a:srgbClr val="8FB132"/>
-                  </a:solidFill>
-                  <a:latin typeface="Helvetica Neue" panose="02000503000000020004" pitchFamily="2" charset="0"/>
-                  <a:ea typeface="Helvetica Neue" panose="02000503000000020004" pitchFamily="2" charset="0"/>
-                  <a:cs typeface="Helvetica Neue" panose="02000503000000020004" pitchFamily="2" charset="0"/>
-                </a:rPr>
-                <a:t>Upward contagion</a:t>
-              </a:r>
-            </a:p>
-          </p:txBody>
-        </p:sp>
-        <p:sp>
-          <p:nvSpPr>
-            <p:cNvPr id="60" name="Rectangle 59">
-              <a:extLst>
-                <a:ext uri="{FF2B5EF4-FFF2-40B4-BE49-F238E27FC236}">
-                  <a16:creationId xmlns:a16="http://schemas.microsoft.com/office/drawing/2014/main" id="{A32BC6D7-F7BC-9347-83A3-B3CCF91F5830}"/>
-                </a:ext>
-              </a:extLst>
-            </p:cNvPr>
-            <p:cNvSpPr/>
-            <p:nvPr/>
-          </p:nvSpPr>
-          <p:spPr>
-            <a:xfrm>
-              <a:off x="5404107" y="3819564"/>
-              <a:ext cx="253217" cy="1057240"/>
-            </a:xfrm>
-            <a:prstGeom prst="rect">
-              <a:avLst/>
-            </a:prstGeom>
-            <a:noFill/>
-            <a:ln w="6350">
-              <a:solidFill>
-                <a:schemeClr val="tx1"/>
-              </a:solidFill>
-            </a:ln>
-          </p:spPr>
-          <p:style>
-            <a:lnRef idx="2">
-              <a:schemeClr val="accent1">
-                <a:shade val="50000"/>
-              </a:schemeClr>
-            </a:lnRef>
-            <a:fillRef idx="1">
-              <a:schemeClr val="accent1"/>
-            </a:fillRef>
-            <a:effectRef idx="0">
-              <a:schemeClr val="accent1"/>
-            </a:effectRef>
-            <a:fontRef idx="minor">
-              <a:schemeClr val="lt1"/>
-            </a:fontRef>
-          </p:style>
-          <p:txBody>
-            <a:bodyPr rtlCol="0" anchor="ctr"/>
-            <a:lstStyle/>
-            <a:p>
-              <a:pPr algn="ctr"/>
-              <a:endParaRPr lang="en-US"/>
-            </a:p>
-          </p:txBody>
-        </p:sp>
-        <p:cxnSp>
-          <p:nvCxnSpPr>
-            <p:cNvPr id="61" name="Straight Arrow Connector 60">
-              <a:extLst>
-                <a:ext uri="{FF2B5EF4-FFF2-40B4-BE49-F238E27FC236}">
-                  <a16:creationId xmlns:a16="http://schemas.microsoft.com/office/drawing/2014/main" id="{9799F749-BB09-1044-AE8A-A5DAEEBC2F1E}"/>
-                </a:ext>
-              </a:extLst>
-            </p:cNvPr>
-            <p:cNvCxnSpPr>
-              <a:cxnSpLocks/>
-            </p:cNvCxnSpPr>
-            <p:nvPr/>
-          </p:nvCxnSpPr>
-          <p:spPr>
-            <a:xfrm>
-              <a:off x="5530716" y="3587444"/>
-              <a:ext cx="0" cy="227246"/>
-            </a:xfrm>
-            <a:prstGeom prst="straightConnector1">
-              <a:avLst/>
-            </a:prstGeom>
-            <a:ln>
-              <a:solidFill>
-                <a:schemeClr val="tx1"/>
-              </a:solidFill>
-              <a:tailEnd type="triangle"/>
-            </a:ln>
-          </p:spPr>
-          <p:style>
-            <a:lnRef idx="1">
-              <a:schemeClr val="accent1"/>
-            </a:lnRef>
-            <a:fillRef idx="0">
-              <a:schemeClr val="accent1"/>
-            </a:fillRef>
-            <a:effectRef idx="0">
-              <a:schemeClr val="accent1"/>
-            </a:effectRef>
-            <a:fontRef idx="minor">
-              <a:schemeClr val="tx1"/>
-            </a:fontRef>
-          </p:style>
-        </p:cxnSp>
-        <p:sp>
-          <p:nvSpPr>
-            <p:cNvPr id="62" name="TextBox 61">
-              <a:extLst>
-                <a:ext uri="{FF2B5EF4-FFF2-40B4-BE49-F238E27FC236}">
-                  <a16:creationId xmlns:a16="http://schemas.microsoft.com/office/drawing/2014/main" id="{D13988C2-B628-D948-9CFA-37C8D35D596B}"/>
-                </a:ext>
-              </a:extLst>
-            </p:cNvPr>
-            <p:cNvSpPr txBox="1"/>
-            <p:nvPr/>
-          </p:nvSpPr>
-          <p:spPr>
-            <a:xfrm>
-              <a:off x="4835643" y="3401469"/>
-              <a:ext cx="1367335" cy="230832"/>
-            </a:xfrm>
-            <a:prstGeom prst="rect">
-              <a:avLst/>
-            </a:prstGeom>
-            <a:noFill/>
-          </p:spPr>
-          <p:txBody>
-            <a:bodyPr wrap="square" rtlCol="0">
-              <a:spAutoFit/>
-            </a:bodyPr>
-            <a:lstStyle/>
-            <a:p>
-              <a:pPr algn="ctr"/>
-              <a:r>
-                <a:rPr lang="en-US" sz="900" i="1" dirty="0">
-                  <a:solidFill>
-                    <a:srgbClr val="8FB132"/>
-                  </a:solidFill>
-                  <a:latin typeface="Helvetica Neue" panose="02000503000000020004" pitchFamily="2" charset="0"/>
-                  <a:ea typeface="Helvetica Neue" panose="02000503000000020004" pitchFamily="2" charset="0"/>
-                  <a:cs typeface="Helvetica Neue" panose="02000503000000020004" pitchFamily="2" charset="0"/>
-                </a:rPr>
-                <a:t>Amplification</a:t>
-              </a:r>
-            </a:p>
-          </p:txBody>
-        </p:sp>
-      </p:grpSp>
-    </p:spTree>
-    <p:extLst>
-      <p:ext uri="{BB962C8B-B14F-4D97-AF65-F5344CB8AC3E}">
-        <p14:creationId xmlns:p14="http://schemas.microsoft.com/office/powerpoint/2010/main" val="580486317"/>
       </p:ext>
     </p:extLst>
   </p:cSld>
@@ -17753,7 +17002,7 @@
           </a:ln>
           <a:extLst>
             <a:ext uri="{C572A759-6A51-4108-AA02-DFA0A04FC94B}">
-              <ma14:wrappingTextBoxFlag xmlns:ma14="http://schemas.microsoft.com/office/mac/drawingml/2011/main" xmlns:a14="http://schemas.microsoft.com/office/drawing/2010/main" xmlns:m="http://schemas.openxmlformats.org/officeDocument/2006/math" xmlns="" val="1"/>
+              <ma14:wrappingTextBoxFlag xmlns="" xmlns:m="http://schemas.openxmlformats.org/officeDocument/2006/math" xmlns:a14="http://schemas.microsoft.com/office/drawing/2010/main" xmlns:ma14="http://schemas.microsoft.com/office/mac/drawingml/2011/main" val="1"/>
             </a:ext>
           </a:extLst>
         </p:spPr>
@@ -17838,7 +17087,7 @@
           </a:ln>
           <a:extLst>
             <a:ext uri="{C572A759-6A51-4108-AA02-DFA0A04FC94B}">
-              <ma14:wrappingTextBoxFlag xmlns:ma14="http://schemas.microsoft.com/office/mac/drawingml/2011/main" xmlns:a14="http://schemas.microsoft.com/office/drawing/2010/main" xmlns:m="http://schemas.openxmlformats.org/officeDocument/2006/math" xmlns="" val="1"/>
+              <ma14:wrappingTextBoxFlag xmlns="" xmlns:m="http://schemas.openxmlformats.org/officeDocument/2006/math" xmlns:a14="http://schemas.microsoft.com/office/drawing/2010/main" xmlns:ma14="http://schemas.microsoft.com/office/mac/drawingml/2011/main" val="1"/>
             </a:ext>
           </a:extLst>
         </p:spPr>
@@ -17923,7 +17172,7 @@
           </a:ln>
           <a:extLst>
             <a:ext uri="{C572A759-6A51-4108-AA02-DFA0A04FC94B}">
-              <ma14:wrappingTextBoxFlag xmlns:ma14="http://schemas.microsoft.com/office/mac/drawingml/2011/main" xmlns:a14="http://schemas.microsoft.com/office/drawing/2010/main" xmlns:m="http://schemas.openxmlformats.org/officeDocument/2006/math" xmlns="" val="1"/>
+              <ma14:wrappingTextBoxFlag xmlns="" xmlns:m="http://schemas.openxmlformats.org/officeDocument/2006/math" xmlns:a14="http://schemas.microsoft.com/office/drawing/2010/main" xmlns:ma14="http://schemas.microsoft.com/office/mac/drawingml/2011/main" val="1"/>
             </a:ext>
           </a:extLst>
         </p:spPr>
@@ -18318,6 +17567,1041 @@
           <a:chExt cx="0" cy="0"/>
         </a:xfrm>
       </p:grpSpPr>
+      <p:grpSp>
+        <p:nvGrpSpPr>
+          <p:cNvPr id="31" name="Group 30">
+            <a:extLst>
+              <a:ext uri="{FF2B5EF4-FFF2-40B4-BE49-F238E27FC236}">
+                <a16:creationId xmlns:a16="http://schemas.microsoft.com/office/drawing/2014/main" id="{47C214A7-314B-DA4B-A577-30EEC875FB69}"/>
+              </a:ext>
+            </a:extLst>
+          </p:cNvPr>
+          <p:cNvGrpSpPr/>
+          <p:nvPr/>
+        </p:nvGrpSpPr>
+        <p:grpSpPr>
+          <a:xfrm>
+            <a:off x="6981783" y="2392783"/>
+            <a:ext cx="905467" cy="1258441"/>
+            <a:chOff x="6972084" y="2105534"/>
+            <a:chExt cx="905467" cy="1258441"/>
+          </a:xfrm>
+        </p:grpSpPr>
+        <p:pic>
+          <p:nvPicPr>
+            <p:cNvPr id="29" name="Picture 28">
+              <a:extLst>
+                <a:ext uri="{FF2B5EF4-FFF2-40B4-BE49-F238E27FC236}">
+                  <a16:creationId xmlns:a16="http://schemas.microsoft.com/office/drawing/2014/main" id="{47A2DE75-0F65-AD45-9C88-01A2B4AC7DE0}"/>
+                </a:ext>
+              </a:extLst>
+            </p:cNvPr>
+            <p:cNvPicPr>
+              <a:picLocks noChangeAspect="1"/>
+            </p:cNvPicPr>
+            <p:nvPr/>
+          </p:nvPicPr>
+          <p:blipFill rotWithShape="1">
+            <a:blip r:embed="rId3"/>
+            <a:srcRect l="83340" t="21017" r="3277" b="36380"/>
+            <a:stretch/>
+          </p:blipFill>
+          <p:spPr>
+            <a:xfrm>
+              <a:off x="7111404" y="2105534"/>
+              <a:ext cx="716620" cy="1136141"/>
+            </a:xfrm>
+            <a:prstGeom prst="rect">
+              <a:avLst/>
+            </a:prstGeom>
+          </p:spPr>
+        </p:pic>
+        <p:sp>
+          <p:nvSpPr>
+            <p:cNvPr id="30" name="TextBox 29">
+              <a:extLst>
+                <a:ext uri="{FF2B5EF4-FFF2-40B4-BE49-F238E27FC236}">
+                  <a16:creationId xmlns:a16="http://schemas.microsoft.com/office/drawing/2014/main" id="{7AC3745E-4836-B44F-8769-8C29FFAF708D}"/>
+                </a:ext>
+              </a:extLst>
+            </p:cNvPr>
+            <p:cNvSpPr txBox="1"/>
+            <p:nvPr/>
+          </p:nvSpPr>
+          <p:spPr>
+            <a:xfrm>
+              <a:off x="6972084" y="2994643"/>
+              <a:ext cx="905467" cy="369332"/>
+            </a:xfrm>
+            <a:prstGeom prst="rect">
+              <a:avLst/>
+            </a:prstGeom>
+            <a:noFill/>
+          </p:spPr>
+          <p:txBody>
+            <a:bodyPr wrap="square" rtlCol="0">
+              <a:spAutoFit/>
+            </a:bodyPr>
+            <a:lstStyle/>
+            <a:p>
+              <a:pPr algn="r"/>
+              <a:r>
+                <a:rPr lang="en-US" sz="1000" dirty="0">
+                  <a:solidFill>
+                    <a:schemeClr val="bg1">
+                      <a:lumMod val="50000"/>
+                    </a:schemeClr>
+                  </a:solidFill>
+                  <a:latin typeface="Helvetica Neue" panose="02000503000000020004" pitchFamily="2" charset="0"/>
+                  <a:ea typeface="Helvetica Neue" panose="02000503000000020004" pitchFamily="2" charset="0"/>
+                  <a:cs typeface="Helvetica Neue" panose="02000503000000020004" pitchFamily="2" charset="0"/>
+                </a:rPr>
+                <a:t>---</a:t>
+              </a:r>
+              <a:r>
+                <a:rPr lang="en-US" sz="1000" dirty="0">
+                  <a:latin typeface="Helvetica Neue" panose="02000503000000020004" pitchFamily="2" charset="0"/>
+                  <a:ea typeface="Helvetica Neue" panose="02000503000000020004" pitchFamily="2" charset="0"/>
+                  <a:cs typeface="Helvetica Neue" panose="02000503000000020004" pitchFamily="2" charset="0"/>
+                </a:rPr>
+                <a:t>  </a:t>
+              </a:r>
+              <a:r>
+                <a:rPr lang="en-US" sz="500" dirty="0">
+                  <a:latin typeface="Helvetica Neue" panose="02000503000000020004" pitchFamily="2" charset="0"/>
+                  <a:ea typeface="Helvetica Neue" panose="02000503000000020004" pitchFamily="2" charset="0"/>
+                  <a:cs typeface="Helvetica Neue" panose="02000503000000020004" pitchFamily="2" charset="0"/>
+                </a:rPr>
+                <a:t> </a:t>
+              </a:r>
+              <a:r>
+                <a:rPr lang="en-US" sz="1000" dirty="0">
+                  <a:latin typeface="Helvetica Neue" panose="02000503000000020004" pitchFamily="2" charset="0"/>
+                  <a:ea typeface="Helvetica Neue" panose="02000503000000020004" pitchFamily="2" charset="0"/>
+                  <a:cs typeface="Helvetica Neue" panose="02000503000000020004" pitchFamily="2" charset="0"/>
+                </a:rPr>
+                <a:t>Null H</a:t>
+              </a:r>
+              <a:r>
+                <a:rPr lang="en-US" sz="1000" baseline="-25000" dirty="0">
+                  <a:latin typeface="Helvetica Neue" panose="02000503000000020004" pitchFamily="2" charset="0"/>
+                  <a:ea typeface="Helvetica Neue" panose="02000503000000020004" pitchFamily="2" charset="0"/>
+                  <a:cs typeface="Helvetica Neue" panose="02000503000000020004" pitchFamily="2" charset="0"/>
+                </a:rPr>
+                <a:t>0</a:t>
+              </a:r>
+              <a:endParaRPr lang="en-US" sz="1000" dirty="0">
+                <a:latin typeface="Helvetica Neue" panose="02000503000000020004" pitchFamily="2" charset="0"/>
+                <a:ea typeface="Helvetica Neue" panose="02000503000000020004" pitchFamily="2" charset="0"/>
+                <a:cs typeface="Helvetica Neue" panose="02000503000000020004" pitchFamily="2" charset="0"/>
+              </a:endParaRPr>
+            </a:p>
+            <a:p>
+              <a:pPr algn="r"/>
+              <a:r>
+                <a:rPr lang="en-US" sz="800" dirty="0">
+                  <a:latin typeface="Helvetica Neue" panose="02000503000000020004" pitchFamily="2" charset="0"/>
+                  <a:ea typeface="Helvetica Neue" panose="02000503000000020004" pitchFamily="2" charset="0"/>
+                  <a:cs typeface="Helvetica Neue" panose="02000503000000020004" pitchFamily="2" charset="0"/>
+                </a:rPr>
+                <a:t>(linear mixing)</a:t>
+              </a:r>
+              <a:endParaRPr lang="en-US" sz="800" baseline="-25000" dirty="0">
+                <a:latin typeface="Helvetica Neue" panose="02000503000000020004" pitchFamily="2" charset="0"/>
+                <a:ea typeface="Helvetica Neue" panose="02000503000000020004" pitchFamily="2" charset="0"/>
+                <a:cs typeface="Helvetica Neue" panose="02000503000000020004" pitchFamily="2" charset="0"/>
+              </a:endParaRPr>
+            </a:p>
+          </p:txBody>
+        </p:sp>
+      </p:grpSp>
+      <p:grpSp>
+        <p:nvGrpSpPr>
+          <p:cNvPr id="64" name="Group 63">
+            <a:extLst>
+              <a:ext uri="{FF2B5EF4-FFF2-40B4-BE49-F238E27FC236}">
+                <a16:creationId xmlns:a16="http://schemas.microsoft.com/office/drawing/2014/main" id="{2307CD96-C70A-1047-A24B-0EF7304A3210}"/>
+              </a:ext>
+            </a:extLst>
+          </p:cNvPr>
+          <p:cNvGrpSpPr/>
+          <p:nvPr/>
+        </p:nvGrpSpPr>
+        <p:grpSpPr>
+          <a:xfrm>
+            <a:off x="-59571" y="1197522"/>
+            <a:ext cx="7180674" cy="4088306"/>
+            <a:chOff x="-59571" y="1257310"/>
+            <a:chExt cx="7180674" cy="4088306"/>
+          </a:xfrm>
+        </p:grpSpPr>
+        <p:pic>
+          <p:nvPicPr>
+            <p:cNvPr id="13" name="Picture 12">
+              <a:extLst>
+                <a:ext uri="{FF2B5EF4-FFF2-40B4-BE49-F238E27FC236}">
+                  <a16:creationId xmlns:a16="http://schemas.microsoft.com/office/drawing/2014/main" id="{DAB10650-9262-A442-818E-C32D8386224F}"/>
+                </a:ext>
+              </a:extLst>
+            </p:cNvPr>
+            <p:cNvPicPr>
+              <a:picLocks noChangeAspect="1"/>
+            </p:cNvPicPr>
+            <p:nvPr/>
+          </p:nvPicPr>
+          <p:blipFill>
+            <a:blip r:embed="rId4"/>
+            <a:stretch>
+              <a:fillRect/>
+            </a:stretch>
+          </p:blipFill>
+          <p:spPr>
+            <a:xfrm>
+              <a:off x="3609807" y="3596852"/>
+              <a:ext cx="3511296" cy="1748763"/>
+            </a:xfrm>
+            <a:prstGeom prst="rect">
+              <a:avLst/>
+            </a:prstGeom>
+          </p:spPr>
+        </p:pic>
+        <p:sp>
+          <p:nvSpPr>
+            <p:cNvPr id="18" name="TextBox 17">
+              <a:extLst>
+                <a:ext uri="{FF2B5EF4-FFF2-40B4-BE49-F238E27FC236}">
+                  <a16:creationId xmlns:a16="http://schemas.microsoft.com/office/drawing/2014/main" id="{46BBEC22-8FD3-4646-AE1A-C6C1C5D5E1E6}"/>
+                </a:ext>
+              </a:extLst>
+            </p:cNvPr>
+            <p:cNvSpPr txBox="1"/>
+            <p:nvPr/>
+          </p:nvSpPr>
+          <p:spPr>
+            <a:xfrm>
+              <a:off x="3478615" y="1257310"/>
+              <a:ext cx="532050" cy="311217"/>
+            </a:xfrm>
+            <a:prstGeom prst="rect">
+              <a:avLst/>
+            </a:prstGeom>
+            <a:noFill/>
+          </p:spPr>
+          <p:txBody>
+            <a:bodyPr wrap="square" rtlCol="0">
+              <a:spAutoFit/>
+            </a:bodyPr>
+            <a:lstStyle/>
+            <a:p>
+              <a:pPr algn="ctr"/>
+              <a:r>
+                <a:rPr lang="en-US" sz="1600" b="1" dirty="0">
+                  <a:latin typeface="Helvetica Neue" panose="02000503000000020004" pitchFamily="2" charset="0"/>
+                  <a:ea typeface="Helvetica Neue" panose="02000503000000020004" pitchFamily="2" charset="0"/>
+                  <a:cs typeface="Helvetica Neue" panose="02000503000000020004" pitchFamily="2" charset="0"/>
+                </a:rPr>
+                <a:t>b</a:t>
+              </a:r>
+            </a:p>
+          </p:txBody>
+        </p:sp>
+        <p:pic>
+          <p:nvPicPr>
+            <p:cNvPr id="11" name="Picture 10">
+              <a:extLst>
+                <a:ext uri="{FF2B5EF4-FFF2-40B4-BE49-F238E27FC236}">
+                  <a16:creationId xmlns:a16="http://schemas.microsoft.com/office/drawing/2014/main" id="{CDDBCA46-2431-8742-8B7E-7958F55115D8}"/>
+                </a:ext>
+              </a:extLst>
+            </p:cNvPr>
+            <p:cNvPicPr>
+              <a:picLocks noChangeAspect="1"/>
+            </p:cNvPicPr>
+            <p:nvPr/>
+          </p:nvPicPr>
+          <p:blipFill>
+            <a:blip r:embed="rId5"/>
+            <a:stretch>
+              <a:fillRect/>
+            </a:stretch>
+          </p:blipFill>
+          <p:spPr>
+            <a:xfrm>
+              <a:off x="83059" y="1568526"/>
+              <a:ext cx="3511296" cy="1748763"/>
+            </a:xfrm>
+            <a:prstGeom prst="rect">
+              <a:avLst/>
+            </a:prstGeom>
+          </p:spPr>
+        </p:pic>
+        <p:pic>
+          <p:nvPicPr>
+            <p:cNvPr id="17" name="Picture 16">
+              <a:extLst>
+                <a:ext uri="{FF2B5EF4-FFF2-40B4-BE49-F238E27FC236}">
+                  <a16:creationId xmlns:a16="http://schemas.microsoft.com/office/drawing/2014/main" id="{2B7D716C-7908-7040-B95B-AA7F33B09271}"/>
+                </a:ext>
+              </a:extLst>
+            </p:cNvPr>
+            <p:cNvPicPr>
+              <a:picLocks noChangeAspect="1"/>
+            </p:cNvPicPr>
+            <p:nvPr/>
+          </p:nvPicPr>
+          <p:blipFill>
+            <a:blip r:embed="rId6"/>
+            <a:stretch>
+              <a:fillRect/>
+            </a:stretch>
+          </p:blipFill>
+          <p:spPr>
+            <a:xfrm>
+              <a:off x="83059" y="3596853"/>
+              <a:ext cx="3511296" cy="1748763"/>
+            </a:xfrm>
+            <a:prstGeom prst="rect">
+              <a:avLst/>
+            </a:prstGeom>
+          </p:spPr>
+        </p:pic>
+        <p:pic>
+          <p:nvPicPr>
+            <p:cNvPr id="24" name="Picture 23">
+              <a:extLst>
+                <a:ext uri="{FF2B5EF4-FFF2-40B4-BE49-F238E27FC236}">
+                  <a16:creationId xmlns:a16="http://schemas.microsoft.com/office/drawing/2014/main" id="{E521139E-34DD-FC49-B81A-3E8E74C466B9}"/>
+                </a:ext>
+              </a:extLst>
+            </p:cNvPr>
+            <p:cNvPicPr>
+              <a:picLocks noChangeAspect="1"/>
+            </p:cNvPicPr>
+            <p:nvPr/>
+          </p:nvPicPr>
+          <p:blipFill>
+            <a:blip r:embed="rId7"/>
+            <a:stretch>
+              <a:fillRect/>
+            </a:stretch>
+          </p:blipFill>
+          <p:spPr>
+            <a:xfrm>
+              <a:off x="3609807" y="1568527"/>
+              <a:ext cx="3511296" cy="1748763"/>
+            </a:xfrm>
+            <a:prstGeom prst="rect">
+              <a:avLst/>
+            </a:prstGeom>
+          </p:spPr>
+        </p:pic>
+        <p:sp>
+          <p:nvSpPr>
+            <p:cNvPr id="16" name="TextBox 15">
+              <a:extLst>
+                <a:ext uri="{FF2B5EF4-FFF2-40B4-BE49-F238E27FC236}">
+                  <a16:creationId xmlns:a16="http://schemas.microsoft.com/office/drawing/2014/main" id="{0B8EA217-6F2C-0943-8D48-F70EC12EC200}"/>
+                </a:ext>
+              </a:extLst>
+            </p:cNvPr>
+            <p:cNvSpPr txBox="1"/>
+            <p:nvPr/>
+          </p:nvSpPr>
+          <p:spPr>
+            <a:xfrm>
+              <a:off x="-39178" y="1258440"/>
+              <a:ext cx="532050" cy="311217"/>
+            </a:xfrm>
+            <a:prstGeom prst="rect">
+              <a:avLst/>
+            </a:prstGeom>
+            <a:noFill/>
+          </p:spPr>
+          <p:txBody>
+            <a:bodyPr wrap="square" rtlCol="0">
+              <a:spAutoFit/>
+            </a:bodyPr>
+            <a:lstStyle/>
+            <a:p>
+              <a:pPr algn="ctr"/>
+              <a:r>
+                <a:rPr lang="en-US" sz="1600" b="1" dirty="0">
+                  <a:latin typeface="Helvetica Neue" panose="02000503000000020004" pitchFamily="2" charset="0"/>
+                  <a:ea typeface="Helvetica Neue" panose="02000503000000020004" pitchFamily="2" charset="0"/>
+                  <a:cs typeface="Helvetica Neue" panose="02000503000000020004" pitchFamily="2" charset="0"/>
+                </a:rPr>
+                <a:t>a</a:t>
+              </a:r>
+            </a:p>
+          </p:txBody>
+        </p:sp>
+        <p:sp>
+          <p:nvSpPr>
+            <p:cNvPr id="20" name="TextBox 19">
+              <a:extLst>
+                <a:ext uri="{FF2B5EF4-FFF2-40B4-BE49-F238E27FC236}">
+                  <a16:creationId xmlns:a16="http://schemas.microsoft.com/office/drawing/2014/main" id="{E8C86BD2-9FE9-8C4D-A835-2EAAEE829653}"/>
+                </a:ext>
+              </a:extLst>
+            </p:cNvPr>
+            <p:cNvSpPr txBox="1"/>
+            <p:nvPr/>
+          </p:nvSpPr>
+          <p:spPr>
+            <a:xfrm>
+              <a:off x="-59571" y="3276227"/>
+              <a:ext cx="532050" cy="311217"/>
+            </a:xfrm>
+            <a:prstGeom prst="rect">
+              <a:avLst/>
+            </a:prstGeom>
+            <a:noFill/>
+          </p:spPr>
+          <p:txBody>
+            <a:bodyPr wrap="square" rtlCol="0">
+              <a:spAutoFit/>
+            </a:bodyPr>
+            <a:lstStyle/>
+            <a:p>
+              <a:pPr algn="ctr"/>
+              <a:r>
+                <a:rPr lang="en-US" sz="1600" b="1" dirty="0">
+                  <a:latin typeface="Helvetica Neue" panose="02000503000000020004" pitchFamily="2" charset="0"/>
+                  <a:ea typeface="Helvetica Neue" panose="02000503000000020004" pitchFamily="2" charset="0"/>
+                  <a:cs typeface="Helvetica Neue" panose="02000503000000020004" pitchFamily="2" charset="0"/>
+                </a:rPr>
+                <a:t>c</a:t>
+              </a:r>
+            </a:p>
+          </p:txBody>
+        </p:sp>
+        <p:sp>
+          <p:nvSpPr>
+            <p:cNvPr id="22" name="TextBox 21">
+              <a:extLst>
+                <a:ext uri="{FF2B5EF4-FFF2-40B4-BE49-F238E27FC236}">
+                  <a16:creationId xmlns:a16="http://schemas.microsoft.com/office/drawing/2014/main" id="{9CC8A2EA-F668-DD43-A074-9F1F726F28A7}"/>
+                </a:ext>
+              </a:extLst>
+            </p:cNvPr>
+            <p:cNvSpPr txBox="1"/>
+            <p:nvPr/>
+          </p:nvSpPr>
+          <p:spPr>
+            <a:xfrm>
+              <a:off x="3478615" y="3281256"/>
+              <a:ext cx="532050" cy="311217"/>
+            </a:xfrm>
+            <a:prstGeom prst="rect">
+              <a:avLst/>
+            </a:prstGeom>
+            <a:noFill/>
+          </p:spPr>
+          <p:txBody>
+            <a:bodyPr wrap="square" rtlCol="0">
+              <a:spAutoFit/>
+            </a:bodyPr>
+            <a:lstStyle/>
+            <a:p>
+              <a:pPr algn="ctr"/>
+              <a:r>
+                <a:rPr lang="en-US" sz="1600" b="1" dirty="0">
+                  <a:latin typeface="Helvetica Neue" panose="02000503000000020004" pitchFamily="2" charset="0"/>
+                  <a:ea typeface="Helvetica Neue" panose="02000503000000020004" pitchFamily="2" charset="0"/>
+                  <a:cs typeface="Helvetica Neue" panose="02000503000000020004" pitchFamily="2" charset="0"/>
+                </a:rPr>
+                <a:t>d</a:t>
+              </a:r>
+            </a:p>
+          </p:txBody>
+        </p:sp>
+        <p:sp>
+          <p:nvSpPr>
+            <p:cNvPr id="34" name="Rectangle 33">
+              <a:extLst>
+                <a:ext uri="{FF2B5EF4-FFF2-40B4-BE49-F238E27FC236}">
+                  <a16:creationId xmlns:a16="http://schemas.microsoft.com/office/drawing/2014/main" id="{FCC82B76-D613-B14A-9751-C3404A7F5100}"/>
+                </a:ext>
+              </a:extLst>
+            </p:cNvPr>
+            <p:cNvSpPr/>
+            <p:nvPr/>
+          </p:nvSpPr>
+          <p:spPr>
+            <a:xfrm>
+              <a:off x="1859134" y="1755789"/>
+              <a:ext cx="253217" cy="1060972"/>
+            </a:xfrm>
+            <a:prstGeom prst="rect">
+              <a:avLst/>
+            </a:prstGeom>
+            <a:noFill/>
+            <a:ln w="6350">
+              <a:solidFill>
+                <a:schemeClr val="tx1"/>
+              </a:solidFill>
+            </a:ln>
+          </p:spPr>
+          <p:style>
+            <a:lnRef idx="2">
+              <a:schemeClr val="accent1">
+                <a:shade val="50000"/>
+              </a:schemeClr>
+            </a:lnRef>
+            <a:fillRef idx="1">
+              <a:schemeClr val="accent1"/>
+            </a:fillRef>
+            <a:effectRef idx="0">
+              <a:schemeClr val="accent1"/>
+            </a:effectRef>
+            <a:fontRef idx="minor">
+              <a:schemeClr val="lt1"/>
+            </a:fontRef>
+          </p:style>
+          <p:txBody>
+            <a:bodyPr rtlCol="0" anchor="ctr"/>
+            <a:lstStyle/>
+            <a:p>
+              <a:pPr algn="ctr"/>
+              <a:endParaRPr lang="en-US"/>
+            </a:p>
+          </p:txBody>
+        </p:sp>
+        <p:cxnSp>
+          <p:nvCxnSpPr>
+            <p:cNvPr id="36" name="Straight Arrow Connector 35">
+              <a:extLst>
+                <a:ext uri="{FF2B5EF4-FFF2-40B4-BE49-F238E27FC236}">
+                  <a16:creationId xmlns:a16="http://schemas.microsoft.com/office/drawing/2014/main" id="{FCB6A53D-8895-5444-BC26-FDB3CED3D01F}"/>
+                </a:ext>
+              </a:extLst>
+            </p:cNvPr>
+            <p:cNvCxnSpPr>
+              <a:cxnSpLocks/>
+            </p:cNvCxnSpPr>
+            <p:nvPr/>
+          </p:nvCxnSpPr>
+          <p:spPr>
+            <a:xfrm>
+              <a:off x="1985744" y="1552268"/>
+              <a:ext cx="0" cy="202381"/>
+            </a:xfrm>
+            <a:prstGeom prst="straightConnector1">
+              <a:avLst/>
+            </a:prstGeom>
+            <a:ln>
+              <a:solidFill>
+                <a:schemeClr val="tx1"/>
+              </a:solidFill>
+              <a:tailEnd type="triangle"/>
+            </a:ln>
+          </p:spPr>
+          <p:style>
+            <a:lnRef idx="1">
+              <a:schemeClr val="accent1"/>
+            </a:lnRef>
+            <a:fillRef idx="0">
+              <a:schemeClr val="accent1"/>
+            </a:fillRef>
+            <a:effectRef idx="0">
+              <a:schemeClr val="accent1"/>
+            </a:effectRef>
+            <a:fontRef idx="minor">
+              <a:schemeClr val="tx1"/>
+            </a:fontRef>
+          </p:style>
+        </p:cxnSp>
+        <p:sp>
+          <p:nvSpPr>
+            <p:cNvPr id="40" name="TextBox 39">
+              <a:extLst>
+                <a:ext uri="{FF2B5EF4-FFF2-40B4-BE49-F238E27FC236}">
+                  <a16:creationId xmlns:a16="http://schemas.microsoft.com/office/drawing/2014/main" id="{59710CE9-75A6-8E4F-BC0F-9128A72B5E28}"/>
+                </a:ext>
+              </a:extLst>
+            </p:cNvPr>
+            <p:cNvSpPr txBox="1"/>
+            <p:nvPr/>
+          </p:nvSpPr>
+          <p:spPr>
+            <a:xfrm>
+              <a:off x="1510959" y="1335504"/>
+              <a:ext cx="949569" cy="230832"/>
+            </a:xfrm>
+            <a:prstGeom prst="rect">
+              <a:avLst/>
+            </a:prstGeom>
+            <a:noFill/>
+          </p:spPr>
+          <p:txBody>
+            <a:bodyPr wrap="square" rtlCol="0">
+              <a:spAutoFit/>
+            </a:bodyPr>
+            <a:lstStyle/>
+            <a:p>
+              <a:pPr algn="ctr"/>
+              <a:r>
+                <a:rPr lang="en-US" sz="900" i="1" dirty="0">
+                  <a:solidFill>
+                    <a:srgbClr val="8FB132"/>
+                  </a:solidFill>
+                  <a:latin typeface="Helvetica Neue" panose="02000503000000020004" pitchFamily="2" charset="0"/>
+                  <a:ea typeface="Helvetica Neue" panose="02000503000000020004" pitchFamily="2" charset="0"/>
+                  <a:cs typeface="Helvetica Neue" panose="02000503000000020004" pitchFamily="2" charset="0"/>
+                </a:rPr>
+                <a:t>No effect</a:t>
+              </a:r>
+            </a:p>
+          </p:txBody>
+        </p:sp>
+        <p:sp>
+          <p:nvSpPr>
+            <p:cNvPr id="47" name="Rectangle 46">
+              <a:extLst>
+                <a:ext uri="{FF2B5EF4-FFF2-40B4-BE49-F238E27FC236}">
+                  <a16:creationId xmlns:a16="http://schemas.microsoft.com/office/drawing/2014/main" id="{B01074A1-2499-4948-9DBB-7D0A93A30FE8}"/>
+                </a:ext>
+              </a:extLst>
+            </p:cNvPr>
+            <p:cNvSpPr/>
+            <p:nvPr/>
+          </p:nvSpPr>
+          <p:spPr>
+            <a:xfrm>
+              <a:off x="5388331" y="1755789"/>
+              <a:ext cx="253217" cy="1057240"/>
+            </a:xfrm>
+            <a:prstGeom prst="rect">
+              <a:avLst/>
+            </a:prstGeom>
+            <a:noFill/>
+            <a:ln w="6350">
+              <a:solidFill>
+                <a:schemeClr val="tx1"/>
+              </a:solidFill>
+            </a:ln>
+          </p:spPr>
+          <p:style>
+            <a:lnRef idx="2">
+              <a:schemeClr val="accent1">
+                <a:shade val="50000"/>
+              </a:schemeClr>
+            </a:lnRef>
+            <a:fillRef idx="1">
+              <a:schemeClr val="accent1"/>
+            </a:fillRef>
+            <a:effectRef idx="0">
+              <a:schemeClr val="accent1"/>
+            </a:effectRef>
+            <a:fontRef idx="minor">
+              <a:schemeClr val="lt1"/>
+            </a:fontRef>
+          </p:style>
+          <p:txBody>
+            <a:bodyPr rtlCol="0" anchor="ctr"/>
+            <a:lstStyle/>
+            <a:p>
+              <a:pPr algn="ctr"/>
+              <a:endParaRPr lang="en-US"/>
+            </a:p>
+          </p:txBody>
+        </p:sp>
+        <p:cxnSp>
+          <p:nvCxnSpPr>
+            <p:cNvPr id="48" name="Straight Arrow Connector 47">
+              <a:extLst>
+                <a:ext uri="{FF2B5EF4-FFF2-40B4-BE49-F238E27FC236}">
+                  <a16:creationId xmlns:a16="http://schemas.microsoft.com/office/drawing/2014/main" id="{3673C9ED-1E77-ED4B-9332-C7996099B01B}"/>
+                </a:ext>
+              </a:extLst>
+            </p:cNvPr>
+            <p:cNvCxnSpPr>
+              <a:cxnSpLocks/>
+            </p:cNvCxnSpPr>
+            <p:nvPr/>
+          </p:nvCxnSpPr>
+          <p:spPr>
+            <a:xfrm>
+              <a:off x="5514940" y="1523669"/>
+              <a:ext cx="0" cy="227246"/>
+            </a:xfrm>
+            <a:prstGeom prst="straightConnector1">
+              <a:avLst/>
+            </a:prstGeom>
+            <a:ln>
+              <a:solidFill>
+                <a:schemeClr val="tx1"/>
+              </a:solidFill>
+              <a:tailEnd type="triangle"/>
+            </a:ln>
+          </p:spPr>
+          <p:style>
+            <a:lnRef idx="1">
+              <a:schemeClr val="accent1"/>
+            </a:lnRef>
+            <a:fillRef idx="0">
+              <a:schemeClr val="accent1"/>
+            </a:fillRef>
+            <a:effectRef idx="0">
+              <a:schemeClr val="accent1"/>
+            </a:effectRef>
+            <a:fontRef idx="minor">
+              <a:schemeClr val="tx1"/>
+            </a:fontRef>
+          </p:style>
+        </p:cxnSp>
+        <p:sp>
+          <p:nvSpPr>
+            <p:cNvPr id="49" name="TextBox 48">
+              <a:extLst>
+                <a:ext uri="{FF2B5EF4-FFF2-40B4-BE49-F238E27FC236}">
+                  <a16:creationId xmlns:a16="http://schemas.microsoft.com/office/drawing/2014/main" id="{2505A704-0B39-3948-B702-3DE6FB8A566F}"/>
+                </a:ext>
+              </a:extLst>
+            </p:cNvPr>
+            <p:cNvSpPr txBox="1"/>
+            <p:nvPr/>
+          </p:nvSpPr>
+          <p:spPr>
+            <a:xfrm>
+              <a:off x="4819867" y="1337694"/>
+              <a:ext cx="1367335" cy="230832"/>
+            </a:xfrm>
+            <a:prstGeom prst="rect">
+              <a:avLst/>
+            </a:prstGeom>
+            <a:noFill/>
+          </p:spPr>
+          <p:txBody>
+            <a:bodyPr wrap="square" rtlCol="0">
+              <a:spAutoFit/>
+            </a:bodyPr>
+            <a:lstStyle/>
+            <a:p>
+              <a:pPr algn="ctr"/>
+              <a:r>
+                <a:rPr lang="en-US" sz="900" i="1" dirty="0">
+                  <a:solidFill>
+                    <a:srgbClr val="8FB132"/>
+                  </a:solidFill>
+                  <a:latin typeface="Helvetica Neue" panose="02000503000000020004" pitchFamily="2" charset="0"/>
+                  <a:ea typeface="Helvetica Neue" panose="02000503000000020004" pitchFamily="2" charset="0"/>
+                  <a:cs typeface="Helvetica Neue" panose="02000503000000020004" pitchFamily="2" charset="0"/>
+                </a:rPr>
+                <a:t>Downward contagion</a:t>
+              </a:r>
+            </a:p>
+          </p:txBody>
+        </p:sp>
+        <p:sp>
+          <p:nvSpPr>
+            <p:cNvPr id="56" name="Rectangle 55">
+              <a:extLst>
+                <a:ext uri="{FF2B5EF4-FFF2-40B4-BE49-F238E27FC236}">
+                  <a16:creationId xmlns:a16="http://schemas.microsoft.com/office/drawing/2014/main" id="{946FFB0D-B0DB-7746-BE84-CA00A6AC6FC6}"/>
+                </a:ext>
+              </a:extLst>
+            </p:cNvPr>
+            <p:cNvSpPr/>
+            <p:nvPr/>
+          </p:nvSpPr>
+          <p:spPr>
+            <a:xfrm>
+              <a:off x="1870538" y="3779347"/>
+              <a:ext cx="253217" cy="1057240"/>
+            </a:xfrm>
+            <a:prstGeom prst="rect">
+              <a:avLst/>
+            </a:prstGeom>
+            <a:noFill/>
+            <a:ln w="6350">
+              <a:solidFill>
+                <a:schemeClr val="tx1"/>
+              </a:solidFill>
+            </a:ln>
+          </p:spPr>
+          <p:style>
+            <a:lnRef idx="2">
+              <a:schemeClr val="accent1">
+                <a:shade val="50000"/>
+              </a:schemeClr>
+            </a:lnRef>
+            <a:fillRef idx="1">
+              <a:schemeClr val="accent1"/>
+            </a:fillRef>
+            <a:effectRef idx="0">
+              <a:schemeClr val="accent1"/>
+            </a:effectRef>
+            <a:fontRef idx="minor">
+              <a:schemeClr val="lt1"/>
+            </a:fontRef>
+          </p:style>
+          <p:txBody>
+            <a:bodyPr rtlCol="0" anchor="ctr"/>
+            <a:lstStyle/>
+            <a:p>
+              <a:pPr algn="ctr"/>
+              <a:endParaRPr lang="en-US"/>
+            </a:p>
+          </p:txBody>
+        </p:sp>
+        <p:cxnSp>
+          <p:nvCxnSpPr>
+            <p:cNvPr id="57" name="Straight Arrow Connector 56">
+              <a:extLst>
+                <a:ext uri="{FF2B5EF4-FFF2-40B4-BE49-F238E27FC236}">
+                  <a16:creationId xmlns:a16="http://schemas.microsoft.com/office/drawing/2014/main" id="{D01545C1-233E-EA44-BA81-A519DB74EB76}"/>
+                </a:ext>
+              </a:extLst>
+            </p:cNvPr>
+            <p:cNvCxnSpPr>
+              <a:cxnSpLocks/>
+            </p:cNvCxnSpPr>
+            <p:nvPr/>
+          </p:nvCxnSpPr>
+          <p:spPr>
+            <a:xfrm>
+              <a:off x="1997147" y="3547227"/>
+              <a:ext cx="0" cy="227246"/>
+            </a:xfrm>
+            <a:prstGeom prst="straightConnector1">
+              <a:avLst/>
+            </a:prstGeom>
+            <a:ln>
+              <a:solidFill>
+                <a:schemeClr val="tx1"/>
+              </a:solidFill>
+              <a:tailEnd type="triangle"/>
+            </a:ln>
+          </p:spPr>
+          <p:style>
+            <a:lnRef idx="1">
+              <a:schemeClr val="accent1"/>
+            </a:lnRef>
+            <a:fillRef idx="0">
+              <a:schemeClr val="accent1"/>
+            </a:fillRef>
+            <a:effectRef idx="0">
+              <a:schemeClr val="accent1"/>
+            </a:effectRef>
+            <a:fontRef idx="minor">
+              <a:schemeClr val="tx1"/>
+            </a:fontRef>
+          </p:style>
+        </p:cxnSp>
+        <p:sp>
+          <p:nvSpPr>
+            <p:cNvPr id="58" name="TextBox 57">
+              <a:extLst>
+                <a:ext uri="{FF2B5EF4-FFF2-40B4-BE49-F238E27FC236}">
+                  <a16:creationId xmlns:a16="http://schemas.microsoft.com/office/drawing/2014/main" id="{01EAAFA9-AE9E-8246-A9FD-6D29F8274912}"/>
+                </a:ext>
+              </a:extLst>
+            </p:cNvPr>
+            <p:cNvSpPr txBox="1"/>
+            <p:nvPr/>
+          </p:nvSpPr>
+          <p:spPr>
+            <a:xfrm>
+              <a:off x="1302074" y="3361252"/>
+              <a:ext cx="1367335" cy="230832"/>
+            </a:xfrm>
+            <a:prstGeom prst="rect">
+              <a:avLst/>
+            </a:prstGeom>
+            <a:noFill/>
+          </p:spPr>
+          <p:txBody>
+            <a:bodyPr wrap="square" rtlCol="0">
+              <a:spAutoFit/>
+            </a:bodyPr>
+            <a:lstStyle/>
+            <a:p>
+              <a:pPr algn="ctr"/>
+              <a:r>
+                <a:rPr lang="en-US" sz="900" i="1" dirty="0">
+                  <a:solidFill>
+                    <a:srgbClr val="8FB132"/>
+                  </a:solidFill>
+                  <a:latin typeface="Helvetica Neue" panose="02000503000000020004" pitchFamily="2" charset="0"/>
+                  <a:ea typeface="Helvetica Neue" panose="02000503000000020004" pitchFamily="2" charset="0"/>
+                  <a:cs typeface="Helvetica Neue" panose="02000503000000020004" pitchFamily="2" charset="0"/>
+                </a:rPr>
+                <a:t>Upward contagion</a:t>
+              </a:r>
+            </a:p>
+          </p:txBody>
+        </p:sp>
+        <p:sp>
+          <p:nvSpPr>
+            <p:cNvPr id="60" name="Rectangle 59">
+              <a:extLst>
+                <a:ext uri="{FF2B5EF4-FFF2-40B4-BE49-F238E27FC236}">
+                  <a16:creationId xmlns:a16="http://schemas.microsoft.com/office/drawing/2014/main" id="{A32BC6D7-F7BC-9347-83A3-B3CCF91F5830}"/>
+                </a:ext>
+              </a:extLst>
+            </p:cNvPr>
+            <p:cNvSpPr/>
+            <p:nvPr/>
+          </p:nvSpPr>
+          <p:spPr>
+            <a:xfrm>
+              <a:off x="5404107" y="3819564"/>
+              <a:ext cx="253217" cy="1057240"/>
+            </a:xfrm>
+            <a:prstGeom prst="rect">
+              <a:avLst/>
+            </a:prstGeom>
+            <a:noFill/>
+            <a:ln w="6350">
+              <a:solidFill>
+                <a:schemeClr val="tx1"/>
+              </a:solidFill>
+            </a:ln>
+          </p:spPr>
+          <p:style>
+            <a:lnRef idx="2">
+              <a:schemeClr val="accent1">
+                <a:shade val="50000"/>
+              </a:schemeClr>
+            </a:lnRef>
+            <a:fillRef idx="1">
+              <a:schemeClr val="accent1"/>
+            </a:fillRef>
+            <a:effectRef idx="0">
+              <a:schemeClr val="accent1"/>
+            </a:effectRef>
+            <a:fontRef idx="minor">
+              <a:schemeClr val="lt1"/>
+            </a:fontRef>
+          </p:style>
+          <p:txBody>
+            <a:bodyPr rtlCol="0" anchor="ctr"/>
+            <a:lstStyle/>
+            <a:p>
+              <a:pPr algn="ctr"/>
+              <a:endParaRPr lang="en-US"/>
+            </a:p>
+          </p:txBody>
+        </p:sp>
+        <p:cxnSp>
+          <p:nvCxnSpPr>
+            <p:cNvPr id="61" name="Straight Arrow Connector 60">
+              <a:extLst>
+                <a:ext uri="{FF2B5EF4-FFF2-40B4-BE49-F238E27FC236}">
+                  <a16:creationId xmlns:a16="http://schemas.microsoft.com/office/drawing/2014/main" id="{9799F749-BB09-1044-AE8A-A5DAEEBC2F1E}"/>
+                </a:ext>
+              </a:extLst>
+            </p:cNvPr>
+            <p:cNvCxnSpPr>
+              <a:cxnSpLocks/>
+            </p:cNvCxnSpPr>
+            <p:nvPr/>
+          </p:nvCxnSpPr>
+          <p:spPr>
+            <a:xfrm>
+              <a:off x="5530716" y="3587444"/>
+              <a:ext cx="0" cy="227246"/>
+            </a:xfrm>
+            <a:prstGeom prst="straightConnector1">
+              <a:avLst/>
+            </a:prstGeom>
+            <a:ln>
+              <a:solidFill>
+                <a:schemeClr val="tx1"/>
+              </a:solidFill>
+              <a:tailEnd type="triangle"/>
+            </a:ln>
+          </p:spPr>
+          <p:style>
+            <a:lnRef idx="1">
+              <a:schemeClr val="accent1"/>
+            </a:lnRef>
+            <a:fillRef idx="0">
+              <a:schemeClr val="accent1"/>
+            </a:fillRef>
+            <a:effectRef idx="0">
+              <a:schemeClr val="accent1"/>
+            </a:effectRef>
+            <a:fontRef idx="minor">
+              <a:schemeClr val="tx1"/>
+            </a:fontRef>
+          </p:style>
+        </p:cxnSp>
+        <p:sp>
+          <p:nvSpPr>
+            <p:cNvPr id="62" name="TextBox 61">
+              <a:extLst>
+                <a:ext uri="{FF2B5EF4-FFF2-40B4-BE49-F238E27FC236}">
+                  <a16:creationId xmlns:a16="http://schemas.microsoft.com/office/drawing/2014/main" id="{D13988C2-B628-D948-9CFA-37C8D35D596B}"/>
+                </a:ext>
+              </a:extLst>
+            </p:cNvPr>
+            <p:cNvSpPr txBox="1"/>
+            <p:nvPr/>
+          </p:nvSpPr>
+          <p:spPr>
+            <a:xfrm>
+              <a:off x="4835643" y="3401469"/>
+              <a:ext cx="1367335" cy="230832"/>
+            </a:xfrm>
+            <a:prstGeom prst="rect">
+              <a:avLst/>
+            </a:prstGeom>
+            <a:noFill/>
+          </p:spPr>
+          <p:txBody>
+            <a:bodyPr wrap="square" rtlCol="0">
+              <a:spAutoFit/>
+            </a:bodyPr>
+            <a:lstStyle/>
+            <a:p>
+              <a:pPr algn="ctr"/>
+              <a:r>
+                <a:rPr lang="en-US" sz="900" i="1" dirty="0">
+                  <a:solidFill>
+                    <a:srgbClr val="8FB132"/>
+                  </a:solidFill>
+                  <a:latin typeface="Helvetica Neue" panose="02000503000000020004" pitchFamily="2" charset="0"/>
+                  <a:ea typeface="Helvetica Neue" panose="02000503000000020004" pitchFamily="2" charset="0"/>
+                  <a:cs typeface="Helvetica Neue" panose="02000503000000020004" pitchFamily="2" charset="0"/>
+                </a:rPr>
+                <a:t>Amplification</a:t>
+              </a:r>
+            </a:p>
+          </p:txBody>
+        </p:sp>
+      </p:grpSp>
+    </p:spTree>
+    <p:extLst>
+      <p:ext uri="{BB962C8B-B14F-4D97-AF65-F5344CB8AC3E}">
+        <p14:creationId xmlns:p14="http://schemas.microsoft.com/office/powerpoint/2010/main" val="580486317"/>
+      </p:ext>
+    </p:extLst>
+  </p:cSld>
+  <p:clrMapOvr>
+    <a:masterClrMapping/>
+  </p:clrMapOvr>
+</p:sld>
+</file>
+
+<file path=ppt/slides/slide21.xml><?xml version="1.0" encoding="utf-8"?>
+<p:sld xmlns:a="http://schemas.openxmlformats.org/drawingml/2006/main" xmlns:r="http://schemas.openxmlformats.org/officeDocument/2006/relationships" xmlns:p="http://schemas.openxmlformats.org/presentationml/2006/main" show="0">
+  <p:cSld>
+    <p:spTree>
+      <p:nvGrpSpPr>
+        <p:cNvPr id="1" name=""/>
+        <p:cNvGrpSpPr/>
+        <p:nvPr/>
+      </p:nvGrpSpPr>
+      <p:grpSpPr>
+        <a:xfrm>
+          <a:off x="0" y="0"/>
+          <a:ext cx="0" cy="0"/>
+          <a:chOff x="0" y="0"/>
+          <a:chExt cx="0" cy="0"/>
+        </a:xfrm>
+      </p:grpSpPr>
       <p:pic>
         <p:nvPicPr>
           <p:cNvPr id="3" name="Picture 2">
@@ -19315,7 +19599,7 @@
 </p:sld>
 </file>
 
-<file path=ppt/slides/slide21.xml><?xml version="1.0" encoding="utf-8"?>
+<file path=ppt/slides/slide22.xml><?xml version="1.0" encoding="utf-8"?>
 <p:sld xmlns:a="http://schemas.openxmlformats.org/drawingml/2006/main" xmlns:r="http://schemas.openxmlformats.org/officeDocument/2006/relationships" xmlns:p="http://schemas.openxmlformats.org/presentationml/2006/main" show="0">
   <p:cSld>
     <p:spTree>
@@ -20417,7 +20701,7 @@
 </p:sld>
 </file>
 
-<file path=ppt/slides/slide22.xml><?xml version="1.0" encoding="utf-8"?>
+<file path=ppt/slides/slide23.xml><?xml version="1.0" encoding="utf-8"?>
 <p:sld xmlns:a="http://schemas.openxmlformats.org/drawingml/2006/main" xmlns:r="http://schemas.openxmlformats.org/officeDocument/2006/relationships" xmlns:p="http://schemas.openxmlformats.org/presentationml/2006/main" show="0">
   <p:cSld>
     <p:spTree>
@@ -22005,7 +22289,7 @@
 </p:sld>
 </file>
 
-<file path=ppt/slides/slide23.xml><?xml version="1.0" encoding="utf-8"?>
+<file path=ppt/slides/slide24.xml><?xml version="1.0" encoding="utf-8"?>
 <p:sld xmlns:a="http://schemas.openxmlformats.org/drawingml/2006/main" xmlns:r="http://schemas.openxmlformats.org/officeDocument/2006/relationships" xmlns:p="http://schemas.openxmlformats.org/presentationml/2006/main">
   <p:cSld>
     <p:spTree>
@@ -23423,7 +23707,7 @@
 </p:sld>
 </file>
 
-<file path=ppt/slides/slide24.xml><?xml version="1.0" encoding="utf-8"?>
+<file path=ppt/slides/slide25.xml><?xml version="1.0" encoding="utf-8"?>
 <p:sld xmlns:a="http://schemas.openxmlformats.org/drawingml/2006/main" xmlns:r="http://schemas.openxmlformats.org/officeDocument/2006/relationships" xmlns:p="http://schemas.openxmlformats.org/presentationml/2006/main">
   <p:cSld>
     <p:spTree>
@@ -23593,7 +23877,7 @@
 </p:sld>
 </file>
 
-<file path=ppt/slides/slide25.xml><?xml version="1.0" encoding="utf-8"?>
+<file path=ppt/slides/slide26.xml><?xml version="1.0" encoding="utf-8"?>
 <p:sld xmlns:a="http://schemas.openxmlformats.org/drawingml/2006/main" xmlns:r="http://schemas.openxmlformats.org/officeDocument/2006/relationships" xmlns:p="http://schemas.openxmlformats.org/presentationml/2006/main">
   <p:cSld>
     <p:spTree>

</xml_diff>